<commit_message>
Added Images; TODO: Add networks op slide 7 en 8.
</commit_message>
<xml_diff>
--- a/PPP1_WV.pptx
+++ b/PPP1_WV.pptx
@@ -204,7 +204,7 @@
           <a:p>
             <a:fld id="{9AFCC6B9-8706-0F4D-A3CC-6A72CC9B9592}" type="datetimeFigureOut">
               <a:rPr lang="nl-NL" smtClean="0"/>
-              <a:t>25/10/15</a:t>
+              <a:t>25-10-2015</a:t>
             </a:fld>
             <a:endParaRPr lang="nl-NL"/>
           </a:p>
@@ -363,7 +363,7 @@
           <a:p>
             <a:fld id="{8787E021-A170-414E-8B92-16820204145C}" type="slidenum">
               <a:rPr lang="nl-NL" smtClean="0"/>
-              <a:t>‹nr.›</a:t>
+              <a:t>‹#›</a:t>
             </a:fld>
             <a:endParaRPr lang="nl-NL"/>
           </a:p>
@@ -575,7 +575,7 @@
       </p:grpSpPr>
       <p:sp>
         <p:nvSpPr>
-          <p:cNvPr id="2" name="Tijdelijke aanduiding voor dia-afbeelding 1"/>
+          <p:cNvPr id="2" name="Slide Image Placeholder 1"/>
           <p:cNvSpPr>
             <a:spLocks noGrp="1" noRot="1" noChangeAspect="1"/>
           </p:cNvSpPr>
@@ -587,7 +587,7 @@
       </p:sp>
       <p:sp>
         <p:nvSpPr>
-          <p:cNvPr id="3" name="Tijdelijke aanduiding voor notities 2"/>
+          <p:cNvPr id="3" name="Notes Placeholder 2"/>
           <p:cNvSpPr>
             <a:spLocks noGrp="1"/>
           </p:cNvSpPr>
@@ -601,32 +601,20 @@
           <a:lstStyle/>
           <a:p>
             <a:r>
-              <a:rPr lang="nl-NL" dirty="0" smtClean="0"/>
-              <a:t>Uitleggen </a:t>
-            </a:r>
-            <a:r>
-              <a:rPr lang="nl-NL" dirty="0" err="1" smtClean="0"/>
-              <a:t>layers</a:t>
-            </a:r>
-            <a:r>
-              <a:rPr lang="nl-NL" dirty="0" smtClean="0"/>
-              <a:t> </a:t>
-            </a:r>
-            <a:r>
-              <a:rPr lang="nl-NL" dirty="0" err="1" smtClean="0"/>
-              <a:t>ahv</a:t>
-            </a:r>
-            <a:r>
-              <a:rPr lang="nl-NL" dirty="0" smtClean="0"/>
-              <a:t> voorbeelden</a:t>
-            </a:r>
-            <a:endParaRPr lang="nl-NL" dirty="0"/>
-          </a:p>
-        </p:txBody>
-      </p:sp>
-      <p:sp>
-        <p:nvSpPr>
-          <p:cNvPr id="4" name="Tijdelijke aanduiding voor dianummer 3"/>
+              <a:rPr lang="nl-BE" dirty="0" smtClean="0"/>
+              <a:t>i</a:t>
+            </a:r>
+            <a:r>
+              <a:rPr lang="nl-BE" baseline="0" dirty="0" smtClean="0"/>
+              <a:t> &lt; j vermelden!</a:t>
+            </a:r>
+            <a:endParaRPr lang="nl-BE" dirty="0"/>
+          </a:p>
+        </p:txBody>
+      </p:sp>
+      <p:sp>
+        <p:nvSpPr>
+          <p:cNvPr id="4" name="Slide Number Placeholder 3"/>
           <p:cNvSpPr>
             <a:spLocks noGrp="1"/>
           </p:cNvSpPr>
@@ -641,7 +629,7 @@
           <a:p>
             <a:fld id="{8787E021-A170-414E-8B92-16820204145C}" type="slidenum">
               <a:rPr lang="nl-NL" smtClean="0"/>
-              <a:t>7</a:t>
+              <a:t>3</a:t>
             </a:fld>
             <a:endParaRPr lang="nl-NL"/>
           </a:p>
@@ -650,7 +638,7 @@
     </p:spTree>
     <p:extLst>
       <p:ext uri="{BB962C8B-B14F-4D97-AF65-F5344CB8AC3E}">
-        <p14:creationId xmlns:p14="http://schemas.microsoft.com/office/powerpoint/2010/main" val="2352307695"/>
+        <p14:creationId xmlns:p14="http://schemas.microsoft.com/office/powerpoint/2010/main" val="979629243"/>
       </p:ext>
     </p:extLst>
   </p:cSld>
@@ -706,27 +694,23 @@
           <a:p>
             <a:r>
               <a:rPr lang="nl-NL" dirty="0" smtClean="0"/>
-              <a:t>Uitleg hoe we aan de 55</a:t>
-            </a:r>
-            <a:r>
-              <a:rPr lang="nl-NL" dirty="0" smtClean="0"/>
-              <a:t>^33 komen.</a:t>
-            </a:r>
-          </a:p>
-          <a:p>
-            <a:r>
-              <a:rPr lang="nl-NL" dirty="0" smtClean="0"/>
-              <a:t>55^^33 = </a:t>
-            </a:r>
-            <a:r>
-              <a:rPr lang="nl-NL" baseline="0" dirty="0" smtClean="0"/>
-              <a:t>2,7*10^57</a:t>
-            </a:r>
-          </a:p>
-          <a:p>
-            <a:r>
-              <a:rPr lang="nl-NL" dirty="0" smtClean="0"/>
-              <a:t>55^^35 = 8,1*10^60</a:t>
+              <a:t>Uitleggen </a:t>
+            </a:r>
+            <a:r>
+              <a:rPr lang="nl-NL" dirty="0" err="1" smtClean="0"/>
+              <a:t>layers</a:t>
+            </a:r>
+            <a:r>
+              <a:rPr lang="nl-NL" dirty="0" smtClean="0"/>
+              <a:t> </a:t>
+            </a:r>
+            <a:r>
+              <a:rPr lang="nl-NL" dirty="0" err="1" smtClean="0"/>
+              <a:t>ahv</a:t>
+            </a:r>
+            <a:r>
+              <a:rPr lang="nl-NL" dirty="0" smtClean="0"/>
+              <a:t> voorbeelden</a:t>
             </a:r>
             <a:endParaRPr lang="nl-NL" dirty="0"/>
           </a:p>
@@ -749,7 +733,7 @@
           <a:p>
             <a:fld id="{8787E021-A170-414E-8B92-16820204145C}" type="slidenum">
               <a:rPr lang="nl-NL" smtClean="0"/>
-              <a:t>8</a:t>
+              <a:t>7</a:t>
             </a:fld>
             <a:endParaRPr lang="nl-NL"/>
           </a:p>
@@ -814,35 +798,28 @@
           <a:p>
             <a:r>
               <a:rPr lang="nl-NL" dirty="0" smtClean="0"/>
-              <a:t>Als n</a:t>
+              <a:t>Uitleg hoe we aan de 55^33 komen.</a:t>
+            </a:r>
+          </a:p>
+          <a:p>
+            <a:r>
+              <a:rPr lang="nl-NL" dirty="0" smtClean="0"/>
+              <a:t>55^^33 = </a:t>
             </a:r>
             <a:r>
               <a:rPr lang="nl-NL" baseline="0" dirty="0" smtClean="0"/>
-              <a:t> gevonden -&gt; </a:t>
-            </a:r>
-            <a:r>
-              <a:rPr lang="nl-NL" baseline="0" dirty="0" err="1" smtClean="0"/>
-              <a:t>lower</a:t>
-            </a:r>
-            <a:r>
-              <a:rPr lang="nl-NL" baseline="0" dirty="0" smtClean="0"/>
-              <a:t>/</a:t>
-            </a:r>
-            <a:r>
-              <a:rPr lang="nl-NL" baseline="0" dirty="0" err="1" smtClean="0"/>
-              <a:t>upper</a:t>
-            </a:r>
-            <a:r>
-              <a:rPr lang="nl-NL" baseline="0" dirty="0" smtClean="0"/>
-              <a:t> </a:t>
-            </a:r>
-            <a:r>
-              <a:rPr lang="nl-NL" baseline="0" dirty="0" err="1" smtClean="0"/>
-              <a:t>bound</a:t>
-            </a:r>
-            <a:r>
-              <a:rPr lang="nl-NL" baseline="0" dirty="0" smtClean="0"/>
-              <a:t> verbetert</a:t>
+              <a:t>2 7*10^57</a:t>
+            </a:r>
+            <a:endParaRPr lang="nl-NL" baseline="0" dirty="0" smtClean="0"/>
+          </a:p>
+          <a:p>
+            <a:r>
+              <a:rPr lang="nl-NL" dirty="0" smtClean="0"/>
+              <a:t>55^^35 = </a:t>
+            </a:r>
+            <a:r>
+              <a:rPr lang="nl-NL" dirty="0" smtClean="0"/>
+              <a:t>8 1*10^60</a:t>
             </a:r>
             <a:endParaRPr lang="nl-NL" dirty="0"/>
           </a:p>
@@ -865,7 +842,7 @@
           <a:p>
             <a:fld id="{8787E021-A170-414E-8B92-16820204145C}" type="slidenum">
               <a:rPr lang="nl-NL" smtClean="0"/>
-              <a:t>9</a:t>
+              <a:t>8</a:t>
             </a:fld>
             <a:endParaRPr lang="nl-NL"/>
           </a:p>
@@ -929,16 +906,38 @@
           <a:lstStyle/>
           <a:p>
             <a:r>
-              <a:rPr lang="nl-NL" dirty="0" err="1" smtClean="0"/>
-              <a:t>Prunen</a:t>
+              <a:rPr lang="nl-NL" dirty="0" smtClean="0"/>
+              <a:t>Als n</a:t>
             </a:r>
             <a:r>
               <a:rPr lang="nl-NL" baseline="0" dirty="0" smtClean="0"/>
-              <a:t> = schrap de HELE TAK voor de generatie</a:t>
-            </a:r>
-          </a:p>
-          <a:p>
-            <a:endParaRPr lang="nl-NL" baseline="0" dirty="0" smtClean="0"/>
+              <a:t> gevonden -&gt; </a:t>
+            </a:r>
+            <a:r>
+              <a:rPr lang="nl-NL" baseline="0" dirty="0" err="1" smtClean="0"/>
+              <a:t>lower</a:t>
+            </a:r>
+            <a:r>
+              <a:rPr lang="nl-NL" baseline="0" dirty="0" smtClean="0"/>
+              <a:t>/</a:t>
+            </a:r>
+            <a:r>
+              <a:rPr lang="nl-NL" baseline="0" dirty="0" err="1" smtClean="0"/>
+              <a:t>upper</a:t>
+            </a:r>
+            <a:r>
+              <a:rPr lang="nl-NL" baseline="0" dirty="0" smtClean="0"/>
+              <a:t> </a:t>
+            </a:r>
+            <a:r>
+              <a:rPr lang="nl-NL" baseline="0" dirty="0" err="1" smtClean="0"/>
+              <a:t>bound</a:t>
+            </a:r>
+            <a:r>
+              <a:rPr lang="nl-NL" baseline="0" dirty="0" smtClean="0"/>
+              <a:t> verbetert</a:t>
+            </a:r>
+            <a:endParaRPr lang="nl-NL" dirty="0"/>
           </a:p>
         </p:txBody>
       </p:sp>
@@ -959,7 +958,7 @@
           <a:p>
             <a:fld id="{8787E021-A170-414E-8B92-16820204145C}" type="slidenum">
               <a:rPr lang="nl-NL" smtClean="0"/>
-              <a:t>10</a:t>
+              <a:t>9</a:t>
             </a:fld>
             <a:endParaRPr lang="nl-NL"/>
           </a:p>
@@ -968,7 +967,7 @@
     </p:spTree>
     <p:extLst>
       <p:ext uri="{BB962C8B-B14F-4D97-AF65-F5344CB8AC3E}">
-        <p14:creationId xmlns:p14="http://schemas.microsoft.com/office/powerpoint/2010/main" val="4034858920"/>
+        <p14:creationId xmlns:p14="http://schemas.microsoft.com/office/powerpoint/2010/main" val="2352307695"/>
       </p:ext>
     </p:extLst>
   </p:cSld>
@@ -1023,6 +1022,100 @@
           <a:lstStyle/>
           <a:p>
             <a:r>
+              <a:rPr lang="nl-NL" dirty="0" err="1" smtClean="0"/>
+              <a:t>Prunen</a:t>
+            </a:r>
+            <a:r>
+              <a:rPr lang="nl-NL" baseline="0" dirty="0" smtClean="0"/>
+              <a:t> = schrap de HELE TAK voor de generatie</a:t>
+            </a:r>
+          </a:p>
+          <a:p>
+            <a:endParaRPr lang="nl-NL" baseline="0" dirty="0" smtClean="0"/>
+          </a:p>
+        </p:txBody>
+      </p:sp>
+      <p:sp>
+        <p:nvSpPr>
+          <p:cNvPr id="4" name="Tijdelijke aanduiding voor dianummer 3"/>
+          <p:cNvSpPr>
+            <a:spLocks noGrp="1"/>
+          </p:cNvSpPr>
+          <p:nvPr>
+            <p:ph type="sldNum" sz="quarter" idx="10"/>
+          </p:nvPr>
+        </p:nvSpPr>
+        <p:spPr/>
+        <p:txBody>
+          <a:bodyPr/>
+          <a:lstStyle/>
+          <a:p>
+            <a:fld id="{8787E021-A170-414E-8B92-16820204145C}" type="slidenum">
+              <a:rPr lang="nl-NL" smtClean="0"/>
+              <a:t>10</a:t>
+            </a:fld>
+            <a:endParaRPr lang="nl-NL"/>
+          </a:p>
+        </p:txBody>
+      </p:sp>
+    </p:spTree>
+    <p:extLst>
+      <p:ext uri="{BB962C8B-B14F-4D97-AF65-F5344CB8AC3E}">
+        <p14:creationId xmlns:p14="http://schemas.microsoft.com/office/powerpoint/2010/main" val="4034858920"/>
+      </p:ext>
+    </p:extLst>
+  </p:cSld>
+  <p:clrMapOvr>
+    <a:masterClrMapping/>
+  </p:clrMapOvr>
+</p:notes>
+</file>
+
+<file path=ppt/notesSlides/notesSlide7.xml><?xml version="1.0" encoding="utf-8"?>
+<p:notes xmlns:a="http://schemas.openxmlformats.org/drawingml/2006/main" xmlns:r="http://schemas.openxmlformats.org/officeDocument/2006/relationships" xmlns:p="http://schemas.openxmlformats.org/presentationml/2006/main">
+  <p:cSld>
+    <p:spTree>
+      <p:nvGrpSpPr>
+        <p:cNvPr id="1" name=""/>
+        <p:cNvGrpSpPr/>
+        <p:nvPr/>
+      </p:nvGrpSpPr>
+      <p:grpSpPr>
+        <a:xfrm>
+          <a:off x="0" y="0"/>
+          <a:ext cx="0" cy="0"/>
+          <a:chOff x="0" y="0"/>
+          <a:chExt cx="0" cy="0"/>
+        </a:xfrm>
+      </p:grpSpPr>
+      <p:sp>
+        <p:nvSpPr>
+          <p:cNvPr id="2" name="Tijdelijke aanduiding voor dia-afbeelding 1"/>
+          <p:cNvSpPr>
+            <a:spLocks noGrp="1" noRot="1" noChangeAspect="1"/>
+          </p:cNvSpPr>
+          <p:nvPr>
+            <p:ph type="sldImg"/>
+          </p:nvPr>
+        </p:nvSpPr>
+        <p:spPr/>
+      </p:sp>
+      <p:sp>
+        <p:nvSpPr>
+          <p:cNvPr id="3" name="Tijdelijke aanduiding voor notities 2"/>
+          <p:cNvSpPr>
+            <a:spLocks noGrp="1"/>
+          </p:cNvSpPr>
+          <p:nvPr>
+            <p:ph type="body" idx="1"/>
+          </p:nvPr>
+        </p:nvSpPr>
+        <p:spPr/>
+        <p:txBody>
+          <a:bodyPr/>
+          <a:lstStyle/>
+          <a:p>
+            <a:r>
               <a:rPr lang="nl-NL" dirty="0" smtClean="0"/>
               <a:t>Vermeldt onderaan equivalent mits parallel.</a:t>
             </a:r>
@@ -1066,7 +1159,7 @@
 </p:notes>
 </file>
 
-<file path=ppt/notesSlides/notesSlide7.xml><?xml version="1.0" encoding="utf-8"?>
+<file path=ppt/notesSlides/notesSlide8.xml><?xml version="1.0" encoding="utf-8"?>
 <p:notes xmlns:a="http://schemas.openxmlformats.org/drawingml/2006/main" xmlns:r="http://schemas.openxmlformats.org/officeDocument/2006/relationships" xmlns:p="http://schemas.openxmlformats.org/presentationml/2006/main">
   <p:cSld>
     <p:spTree>
@@ -1553,7 +1646,7 @@
           <a:p>
             <a:fld id="{4708D4E0-8E34-BE43-A9D9-F58B6D72D4C6}" type="datetimeFigureOut">
               <a:rPr lang="nl-NL" smtClean="0"/>
-              <a:t>25/10/15</a:t>
+              <a:t>25-10-2015</a:t>
             </a:fld>
             <a:endParaRPr lang="nl-NL"/>
           </a:p>
@@ -1982,7 +2075,7 @@
           <a:p>
             <a:fld id="{4708D4E0-8E34-BE43-A9D9-F58B6D72D4C6}" type="datetimeFigureOut">
               <a:rPr lang="nl-NL" smtClean="0"/>
-              <a:t>25/10/15</a:t>
+              <a:t>25-10-2015</a:t>
             </a:fld>
             <a:endParaRPr lang="nl-NL"/>
           </a:p>
@@ -2038,7 +2131,7 @@
           <a:p>
             <a:fld id="{2817EBE5-85DD-144A-B1FE-756E61FED028}" type="slidenum">
               <a:rPr lang="nl-NL" smtClean="0"/>
-              <a:t>‹nr.›</a:t>
+              <a:t>‹#›</a:t>
             </a:fld>
             <a:endParaRPr lang="nl-NL"/>
           </a:p>
@@ -2187,7 +2280,7 @@
           <a:p>
             <a:fld id="{4708D4E0-8E34-BE43-A9D9-F58B6D72D4C6}" type="datetimeFigureOut">
               <a:rPr lang="nl-NL" smtClean="0"/>
-              <a:t>25/10/15</a:t>
+              <a:t>25-10-2015</a:t>
             </a:fld>
             <a:endParaRPr lang="nl-NL"/>
           </a:p>
@@ -2229,7 +2322,7 @@
           <a:p>
             <a:fld id="{19371D3E-5A18-49EB-AD2A-429AF165759F}" type="slidenum">
               <a:rPr lang="en-US" smtClean="0"/>
-              <a:t>‹nr.›</a:t>
+              <a:t>‹#›</a:t>
             </a:fld>
             <a:endParaRPr lang="en-US"/>
           </a:p>
@@ -2458,7 +2551,7 @@
           <a:p>
             <a:fld id="{4708D4E0-8E34-BE43-A9D9-F58B6D72D4C6}" type="datetimeFigureOut">
               <a:rPr lang="nl-NL" smtClean="0"/>
-              <a:t>25/10/15</a:t>
+              <a:t>25-10-2015</a:t>
             </a:fld>
             <a:endParaRPr lang="nl-NL"/>
           </a:p>
@@ -2500,7 +2593,7 @@
           <a:p>
             <a:fld id="{2817EBE5-85DD-144A-B1FE-756E61FED028}" type="slidenum">
               <a:rPr lang="nl-NL" smtClean="0"/>
-              <a:t>‹nr.›</a:t>
+              <a:t>‹#›</a:t>
             </a:fld>
             <a:endParaRPr lang="nl-NL"/>
           </a:p>
@@ -2739,7 +2832,7 @@
           <a:p>
             <a:fld id="{4708D4E0-8E34-BE43-A9D9-F58B6D72D4C6}" type="datetimeFigureOut">
               <a:rPr lang="nl-NL" smtClean="0"/>
-              <a:t>25/10/15</a:t>
+              <a:t>25-10-2015</a:t>
             </a:fld>
             <a:endParaRPr lang="nl-NL"/>
           </a:p>
@@ -2781,7 +2874,7 @@
           <a:p>
             <a:fld id="{2817EBE5-85DD-144A-B1FE-756E61FED028}" type="slidenum">
               <a:rPr lang="nl-NL" smtClean="0"/>
-              <a:t>‹nr.›</a:t>
+              <a:t>‹#›</a:t>
             </a:fld>
             <a:endParaRPr lang="nl-NL"/>
           </a:p>
@@ -2974,7 +3067,7 @@
           <a:p>
             <a:fld id="{4708D4E0-8E34-BE43-A9D9-F58B6D72D4C6}" type="datetimeFigureOut">
               <a:rPr lang="nl-NL" smtClean="0"/>
-              <a:t>25/10/15</a:t>
+              <a:t>25-10-2015</a:t>
             </a:fld>
             <a:endParaRPr lang="nl-NL"/>
           </a:p>
@@ -3016,7 +3109,7 @@
           <a:p>
             <a:fld id="{2817EBE5-85DD-144A-B1FE-756E61FED028}" type="slidenum">
               <a:rPr lang="nl-NL" smtClean="0"/>
-              <a:t>‹nr.›</a:t>
+              <a:t>‹#›</a:t>
             </a:fld>
             <a:endParaRPr lang="nl-NL"/>
           </a:p>
@@ -3255,7 +3348,7 @@
           <a:p>
             <a:fld id="{4708D4E0-8E34-BE43-A9D9-F58B6D72D4C6}" type="datetimeFigureOut">
               <a:rPr lang="nl-NL" smtClean="0"/>
-              <a:t>25/10/15</a:t>
+              <a:t>25-10-2015</a:t>
             </a:fld>
             <a:endParaRPr lang="nl-NL"/>
           </a:p>
@@ -3297,7 +3390,7 @@
           <a:p>
             <a:fld id="{2817EBE5-85DD-144A-B1FE-756E61FED028}" type="slidenum">
               <a:rPr lang="nl-NL" smtClean="0"/>
-              <a:t>‹nr.›</a:t>
+              <a:t>‹#›</a:t>
             </a:fld>
             <a:endParaRPr lang="nl-NL"/>
           </a:p>
@@ -3682,7 +3775,7 @@
           <a:p>
             <a:fld id="{4708D4E0-8E34-BE43-A9D9-F58B6D72D4C6}" type="datetimeFigureOut">
               <a:rPr lang="nl-NL" smtClean="0"/>
-              <a:t>25/10/15</a:t>
+              <a:t>25-10-2015</a:t>
             </a:fld>
             <a:endParaRPr lang="nl-NL"/>
           </a:p>
@@ -4205,7 +4298,7 @@
           <a:p>
             <a:fld id="{4708D4E0-8E34-BE43-A9D9-F58B6D72D4C6}" type="datetimeFigureOut">
               <a:rPr lang="nl-NL" smtClean="0"/>
-              <a:t>25/10/15</a:t>
+              <a:t>25-10-2015</a:t>
             </a:fld>
             <a:endParaRPr lang="nl-NL"/>
           </a:p>
@@ -4567,7 +4660,7 @@
           <a:p>
             <a:fld id="{4708D4E0-8E34-BE43-A9D9-F58B6D72D4C6}" type="datetimeFigureOut">
               <a:rPr lang="nl-NL" smtClean="0"/>
-              <a:t>25/10/15</a:t>
+              <a:t>25-10-2015</a:t>
             </a:fld>
             <a:endParaRPr lang="nl-NL"/>
           </a:p>
@@ -4609,7 +4702,7 @@
           <a:p>
             <a:fld id="{2817EBE5-85DD-144A-B1FE-756E61FED028}" type="slidenum">
               <a:rPr lang="nl-NL" smtClean="0"/>
-              <a:t>‹nr.›</a:t>
+              <a:t>‹#›</a:t>
             </a:fld>
             <a:endParaRPr lang="nl-NL"/>
           </a:p>
@@ -5123,7 +5216,7 @@
           <a:p>
             <a:fld id="{4708D4E0-8E34-BE43-A9D9-F58B6D72D4C6}" type="datetimeFigureOut">
               <a:rPr lang="nl-NL" smtClean="0"/>
-              <a:t>25/10/15</a:t>
+              <a:t>25-10-2015</a:t>
             </a:fld>
             <a:endParaRPr lang="nl-NL"/>
           </a:p>
@@ -5165,7 +5258,7 @@
           <a:p>
             <a:fld id="{2817EBE5-85DD-144A-B1FE-756E61FED028}" type="slidenum">
               <a:rPr lang="nl-NL" smtClean="0"/>
-              <a:t>‹nr.›</a:t>
+              <a:t>‹#›</a:t>
             </a:fld>
             <a:endParaRPr lang="nl-NL"/>
           </a:p>
@@ -5348,7 +5441,7 @@
           <a:p>
             <a:fld id="{4708D4E0-8E34-BE43-A9D9-F58B6D72D4C6}" type="datetimeFigureOut">
               <a:rPr lang="nl-NL" smtClean="0"/>
-              <a:t>25/10/15</a:t>
+              <a:t>25-10-2015</a:t>
             </a:fld>
             <a:endParaRPr lang="nl-NL"/>
           </a:p>
@@ -5390,7 +5483,7 @@
           <a:p>
             <a:fld id="{2817EBE5-85DD-144A-B1FE-756E61FED028}" type="slidenum">
               <a:rPr lang="nl-NL" smtClean="0"/>
-              <a:t>‹nr.›</a:t>
+              <a:t>‹#›</a:t>
             </a:fld>
             <a:endParaRPr lang="nl-NL"/>
           </a:p>
@@ -5494,7 +5587,7 @@
           <a:p>
             <a:fld id="{4708D4E0-8E34-BE43-A9D9-F58B6D72D4C6}" type="datetimeFigureOut">
               <a:rPr lang="nl-NL" smtClean="0"/>
-              <a:t>25/10/15</a:t>
+              <a:t>25-10-2015</a:t>
             </a:fld>
             <a:endParaRPr lang="nl-NL"/>
           </a:p>
@@ -5536,7 +5629,7 @@
           <a:p>
             <a:fld id="{2817EBE5-85DD-144A-B1FE-756E61FED028}" type="slidenum">
               <a:rPr lang="nl-NL" smtClean="0"/>
-              <a:t>‹nr.›</a:t>
+              <a:t>‹#›</a:t>
             </a:fld>
             <a:endParaRPr lang="nl-NL"/>
           </a:p>
@@ -5959,7 +6052,7 @@
           <a:p>
             <a:fld id="{4708D4E0-8E34-BE43-A9D9-F58B6D72D4C6}" type="datetimeFigureOut">
               <a:rPr lang="nl-NL" smtClean="0"/>
-              <a:t>25/10/15</a:t>
+              <a:t>25-10-2015</a:t>
             </a:fld>
             <a:endParaRPr lang="nl-NL"/>
           </a:p>
@@ -6015,7 +6108,7 @@
           <a:p>
             <a:fld id="{2817EBE5-85DD-144A-B1FE-756E61FED028}" type="slidenum">
               <a:rPr lang="nl-NL" smtClean="0"/>
-              <a:t>‹nr.›</a:t>
+              <a:t>‹#›</a:t>
             </a:fld>
             <a:endParaRPr lang="nl-NL"/>
           </a:p>
@@ -6181,7 +6274,7 @@
           <a:p>
             <a:fld id="{4708D4E0-8E34-BE43-A9D9-F58B6D72D4C6}" type="datetimeFigureOut">
               <a:rPr lang="nl-NL" smtClean="0"/>
-              <a:t>25/10/15</a:t>
+              <a:t>25-10-2015</a:t>
             </a:fld>
             <a:endParaRPr lang="nl-NL"/>
           </a:p>
@@ -6259,7 +6352,7 @@
           <a:p>
             <a:fld id="{2817EBE5-85DD-144A-B1FE-756E61FED028}" type="slidenum">
               <a:rPr lang="nl-NL" smtClean="0"/>
-              <a:t>‹nr.›</a:t>
+              <a:t>‹#›</a:t>
             </a:fld>
             <a:endParaRPr lang="nl-NL"/>
           </a:p>
@@ -6727,7 +6820,7 @@
   <p:timing>
     <p:tnLst>
       <p:par>
-        <p:cTn xmlns:p14="http://schemas.microsoft.com/office/powerpoint/2010/main" id="1" dur="indefinite" restart="never" nodeType="tmRoot"/>
+        <p:cTn id="1" dur="indefinite" restart="never" nodeType="tmRoot"/>
       </p:par>
     </p:tnLst>
   </p:timing>
@@ -6841,49 +6934,88 @@
           </a:p>
         </p:txBody>
       </p:sp>
-      <p:sp>
-        <p:nvSpPr>
-          <p:cNvPr id="4" name="Tijdelijke aanduiding voor inhoud 3"/>
-          <p:cNvSpPr>
-            <a:spLocks noGrp="1"/>
-          </p:cNvSpPr>
-          <p:nvPr>
-            <p:ph sz="half" idx="2"/>
-          </p:nvPr>
-        </p:nvSpPr>
-        <p:spPr/>
-        <p:txBody>
-          <a:bodyPr/>
-          <a:lstStyle/>
-          <a:p>
-            <a:r>
-              <a:rPr lang="nl-NL" dirty="0" smtClean="0"/>
-              <a:t>(voorbeeld met overbodige </a:t>
-            </a:r>
-            <a:r>
-              <a:rPr lang="nl-NL" dirty="0" err="1" smtClean="0"/>
-              <a:t>comparator</a:t>
-            </a:r>
-            <a:r>
-              <a:rPr lang="nl-NL" dirty="0" smtClean="0"/>
-              <a:t> + parallel </a:t>
-            </a:r>
-            <a:r>
-              <a:rPr lang="nl-NL" dirty="0" err="1" smtClean="0"/>
-              <a:t>comparators</a:t>
-            </a:r>
-            <a:r>
-              <a:rPr lang="nl-NL" dirty="0"/>
-              <a:t> </a:t>
-            </a:r>
-            <a:r>
-              <a:rPr lang="nl-NL" dirty="0" smtClean="0"/>
-              <a:t>naast elkaar)</a:t>
-            </a:r>
-            <a:endParaRPr lang="nl-NL" dirty="0"/>
-          </a:p>
-        </p:txBody>
-      </p:sp>
+      <p:pic>
+        <p:nvPicPr>
+          <p:cNvPr id="2050" name="Picture 2" descr="C:\Users\Admin\Desktop\Overbodige5.png"/>
+          <p:cNvPicPr>
+            <a:picLocks noChangeAspect="1" noChangeArrowheads="1"/>
+          </p:cNvPicPr>
+          <p:nvPr/>
+        </p:nvPicPr>
+        <p:blipFill>
+          <a:blip r:embed="rId3">
+            <a:extLst>
+              <a:ext uri="{28A0092B-C50C-407E-A947-70E740481C1C}">
+                <a14:useLocalDpi xmlns:a14="http://schemas.microsoft.com/office/drawing/2010/main" val="0"/>
+              </a:ext>
+            </a:extLst>
+          </a:blip>
+          <a:srcRect/>
+          <a:stretch>
+            <a:fillRect/>
+          </a:stretch>
+        </p:blipFill>
+        <p:spPr bwMode="auto">
+          <a:xfrm>
+            <a:off x="4780344" y="2108525"/>
+            <a:ext cx="2685335" cy="1532105"/>
+          </a:xfrm>
+          <a:prstGeom prst="rect">
+            <a:avLst/>
+          </a:prstGeom>
+          <a:noFill/>
+          <a:extLst>
+            <a:ext uri="{909E8E84-426E-40DD-AFC4-6F175D3DCCD1}">
+              <a14:hiddenFill xmlns:a14="http://schemas.microsoft.com/office/drawing/2010/main">
+                <a:solidFill>
+                  <a:srgbClr val="FFFFFF"/>
+                </a:solidFill>
+              </a14:hiddenFill>
+            </a:ext>
+          </a:extLst>
+        </p:spPr>
+      </p:pic>
+      <p:pic>
+        <p:nvPicPr>
+          <p:cNvPr id="2051" name="Picture 3" descr="C:\Users\Admin\Desktop\Overbodige52.png"/>
+          <p:cNvPicPr>
+            <a:picLocks noChangeAspect="1" noChangeArrowheads="1"/>
+          </p:cNvPicPr>
+          <p:nvPr/>
+        </p:nvPicPr>
+        <p:blipFill>
+          <a:blip r:embed="rId4">
+            <a:extLst>
+              <a:ext uri="{28A0092B-C50C-407E-A947-70E740481C1C}">
+                <a14:useLocalDpi xmlns:a14="http://schemas.microsoft.com/office/drawing/2010/main" val="0"/>
+              </a:ext>
+            </a:extLst>
+          </a:blip>
+          <a:srcRect/>
+          <a:stretch>
+            <a:fillRect/>
+          </a:stretch>
+        </p:blipFill>
+        <p:spPr bwMode="auto">
+          <a:xfrm>
+            <a:off x="4780344" y="3960478"/>
+            <a:ext cx="2696910" cy="1532105"/>
+          </a:xfrm>
+          <a:prstGeom prst="rect">
+            <a:avLst/>
+          </a:prstGeom>
+          <a:noFill/>
+          <a:extLst>
+            <a:ext uri="{909E8E84-426E-40DD-AFC4-6F175D3DCCD1}">
+              <a14:hiddenFill xmlns:a14="http://schemas.microsoft.com/office/drawing/2010/main">
+                <a:solidFill>
+                  <a:srgbClr val="FFFFFF"/>
+                </a:solidFill>
+              </a14:hiddenFill>
+            </a:ext>
+          </a:extLst>
+        </p:spPr>
+      </p:pic>
     </p:spTree>
     <p:extLst>
       <p:ext uri="{BB962C8B-B14F-4D97-AF65-F5344CB8AC3E}">
@@ -6897,7 +7029,7 @@
   <p:timing>
     <p:tnLst>
       <p:par>
-        <p:cTn xmlns:p14="http://schemas.microsoft.com/office/powerpoint/2010/main" id="1" dur="indefinite" restart="never" nodeType="tmRoot"/>
+        <p:cTn id="1" dur="indefinite" restart="never" nodeType="tmRoot"/>
       </p:par>
     </p:tnLst>
   </p:timing>
@@ -6974,14 +7106,106 @@
             </a:pPr>
             <a:r>
               <a:rPr lang="nl-NL" dirty="0" smtClean="0"/>
-              <a:t>(1,2)(3,4)(1,4)(1,3)(2,4)(2,3)</a:t>
+              <a:t>a=(1 2</a:t>
+            </a:r>
+            <a:r>
+              <a:rPr lang="nl-NL" dirty="0" smtClean="0"/>
+              <a:t>)(</a:t>
+            </a:r>
+            <a:r>
+              <a:rPr lang="nl-NL" dirty="0" smtClean="0"/>
+              <a:t>3 4</a:t>
+            </a:r>
+            <a:r>
+              <a:rPr lang="nl-NL" dirty="0" smtClean="0"/>
+              <a:t>)(</a:t>
+            </a:r>
+            <a:r>
+              <a:rPr lang="nl-NL" dirty="0" smtClean="0"/>
+              <a:t>1 4</a:t>
+            </a:r>
+            <a:r>
+              <a:rPr lang="nl-NL" dirty="0" smtClean="0"/>
+              <a:t>)(</a:t>
+            </a:r>
+            <a:r>
+              <a:rPr lang="nl-NL" dirty="0" smtClean="0"/>
+              <a:t>1 3</a:t>
+            </a:r>
+            <a:r>
+              <a:rPr lang="nl-NL" dirty="0" smtClean="0"/>
+              <a:t>)(</a:t>
+            </a:r>
+            <a:r>
+              <a:rPr lang="nl-NL" dirty="0" smtClean="0"/>
+              <a:t>2 4</a:t>
+            </a:r>
+            <a:r>
+              <a:rPr lang="nl-NL" dirty="0" smtClean="0"/>
+              <a:t>)(</a:t>
+            </a:r>
+            <a:r>
+              <a:rPr lang="nl-NL" dirty="0" smtClean="0"/>
+              <a:t>2 3</a:t>
+            </a:r>
+            <a:r>
+              <a:rPr lang="nl-NL" dirty="0" smtClean="0"/>
+              <a:t>)</a:t>
             </a:r>
             <a:br>
               <a:rPr lang="nl-NL" dirty="0" smtClean="0"/>
             </a:br>
             <a:r>
               <a:rPr lang="nl-NL" dirty="0" smtClean="0"/>
-              <a:t>(3,4)(1,2)(3,2)(3,1)(4,2)(4,1)</a:t>
+              <a:t>(</a:t>
+            </a:r>
+            <a:r>
+              <a:rPr lang="nl-NL" dirty="0" smtClean="0"/>
+              <a:t>3 4</a:t>
+            </a:r>
+            <a:r>
+              <a:rPr lang="nl-NL" dirty="0" smtClean="0"/>
+              <a:t>)(</a:t>
+            </a:r>
+            <a:r>
+              <a:rPr lang="nl-NL" dirty="0" smtClean="0"/>
+              <a:t>1 2</a:t>
+            </a:r>
+            <a:r>
+              <a:rPr lang="nl-NL" dirty="0" smtClean="0"/>
+              <a:t>)(</a:t>
+            </a:r>
+            <a:r>
+              <a:rPr lang="nl-NL" dirty="0" smtClean="0"/>
+              <a:t>3 2</a:t>
+            </a:r>
+            <a:r>
+              <a:rPr lang="nl-NL" dirty="0" smtClean="0"/>
+              <a:t>)(</a:t>
+            </a:r>
+            <a:r>
+              <a:rPr lang="nl-NL" dirty="0" smtClean="0"/>
+              <a:t>3 1</a:t>
+            </a:r>
+            <a:r>
+              <a:rPr lang="nl-NL" dirty="0" smtClean="0"/>
+              <a:t>)(</a:t>
+            </a:r>
+            <a:r>
+              <a:rPr lang="nl-NL" dirty="0" smtClean="0"/>
+              <a:t>4 2</a:t>
+            </a:r>
+            <a:r>
+              <a:rPr lang="nl-NL" dirty="0" smtClean="0"/>
+              <a:t>)(</a:t>
+            </a:r>
+            <a:r>
+              <a:rPr lang="nl-NL" dirty="0" smtClean="0"/>
+              <a:t>4 1</a:t>
+            </a:r>
+            <a:r>
+              <a:rPr lang="nl-NL" dirty="0" smtClean="0"/>
+              <a:t>)</a:t>
             </a:r>
             <a:r>
               <a:rPr lang="nl-NL" dirty="0"/>
@@ -6991,7 +7215,7 @@
               <a:rPr lang="nl-NL" dirty="0"/>
             </a:br>
             <a:r>
-              <a:rPr lang="nl-NL" dirty="0" err="1" smtClean="0"/>
+              <a:rPr lang="nl-NL" dirty="0" smtClean="0"/>
               <a:t>Untangling</a:t>
             </a:r>
             <a:r>
@@ -7003,7 +7227,23 @@
             </a:br>
             <a:r>
               <a:rPr lang="nl-NL" dirty="0" smtClean="0"/>
-              <a:t>(3,4)(1,2)</a:t>
+              <a:t>(</a:t>
+            </a:r>
+            <a:r>
+              <a:rPr lang="nl-NL" dirty="0" smtClean="0"/>
+              <a:t>3 4</a:t>
+            </a:r>
+            <a:r>
+              <a:rPr lang="nl-NL" dirty="0" smtClean="0"/>
+              <a:t>)(</a:t>
+            </a:r>
+            <a:r>
+              <a:rPr lang="nl-NL" dirty="0" smtClean="0"/>
+              <a:t>1 2</a:t>
+            </a:r>
+            <a:r>
+              <a:rPr lang="nl-NL" dirty="0" smtClean="0"/>
+              <a:t>)</a:t>
             </a:r>
             <a:r>
               <a:rPr lang="nl-NL" dirty="0" smtClean="0">
@@ -7011,11 +7251,51 @@
                   <a:srgbClr val="FF0000"/>
                 </a:solidFill>
               </a:rPr>
-              <a:t>(2,3)</a:t>
-            </a:r>
-            <a:r>
-              <a:rPr lang="nl-NL" dirty="0" smtClean="0"/>
-              <a:t>(2,1)(4,3)(4,1)</a:t>
+              <a:t>(</a:t>
+            </a:r>
+            <a:r>
+              <a:rPr lang="nl-NL" dirty="0" smtClean="0">
+                <a:solidFill>
+                  <a:srgbClr val="FF0000"/>
+                </a:solidFill>
+              </a:rPr>
+              <a:t>2 3</a:t>
+            </a:r>
+            <a:r>
+              <a:rPr lang="nl-NL" dirty="0" smtClean="0">
+                <a:solidFill>
+                  <a:srgbClr val="FF0000"/>
+                </a:solidFill>
+              </a:rPr>
+              <a:t>)</a:t>
+            </a:r>
+            <a:r>
+              <a:rPr lang="nl-NL" dirty="0" smtClean="0"/>
+              <a:t>(</a:t>
+            </a:r>
+            <a:r>
+              <a:rPr lang="nl-NL" dirty="0" smtClean="0"/>
+              <a:t>2 1</a:t>
+            </a:r>
+            <a:r>
+              <a:rPr lang="nl-NL" dirty="0" smtClean="0"/>
+              <a:t>)(</a:t>
+            </a:r>
+            <a:r>
+              <a:rPr lang="nl-NL" dirty="0" smtClean="0"/>
+              <a:t>4 3</a:t>
+            </a:r>
+            <a:r>
+              <a:rPr lang="nl-NL" dirty="0" smtClean="0"/>
+              <a:t>)(</a:t>
+            </a:r>
+            <a:r>
+              <a:rPr lang="nl-NL" dirty="0" smtClean="0"/>
+              <a:t>4 1</a:t>
+            </a:r>
+            <a:r>
+              <a:rPr lang="nl-NL" dirty="0" smtClean="0"/>
+              <a:t>)</a:t>
             </a:r>
             <a:br>
               <a:rPr lang="nl-NL" dirty="0" smtClean="0"/>
@@ -7026,7 +7306,55 @@
                   <a:srgbClr val="FFFFFF"/>
                 </a:solidFill>
               </a:rPr>
-              <a:t>(3,4)(1,2)(2,3)</a:t>
+              <a:t>(</a:t>
+            </a:r>
+            <a:r>
+              <a:rPr lang="nl-NL" dirty="0" smtClean="0">
+                <a:solidFill>
+                  <a:srgbClr val="FFFFFF"/>
+                </a:solidFill>
+              </a:rPr>
+              <a:t>3 4</a:t>
+            </a:r>
+            <a:r>
+              <a:rPr lang="nl-NL" dirty="0" smtClean="0">
+                <a:solidFill>
+                  <a:srgbClr val="FFFFFF"/>
+                </a:solidFill>
+              </a:rPr>
+              <a:t>)(</a:t>
+            </a:r>
+            <a:r>
+              <a:rPr lang="nl-NL" dirty="0" smtClean="0">
+                <a:solidFill>
+                  <a:srgbClr val="FFFFFF"/>
+                </a:solidFill>
+              </a:rPr>
+              <a:t>1 2</a:t>
+            </a:r>
+            <a:r>
+              <a:rPr lang="nl-NL" dirty="0" smtClean="0">
+                <a:solidFill>
+                  <a:srgbClr val="FFFFFF"/>
+                </a:solidFill>
+              </a:rPr>
+              <a:t>)(</a:t>
+            </a:r>
+            <a:r>
+              <a:rPr lang="nl-NL" dirty="0" smtClean="0">
+                <a:solidFill>
+                  <a:srgbClr val="FFFFFF"/>
+                </a:solidFill>
+              </a:rPr>
+              <a:t>2 3</a:t>
+            </a:r>
+            <a:r>
+              <a:rPr lang="nl-NL" dirty="0" smtClean="0">
+                <a:solidFill>
+                  <a:srgbClr val="FFFFFF"/>
+                </a:solidFill>
+              </a:rPr>
+              <a:t>)</a:t>
             </a:r>
             <a:r>
               <a:rPr lang="nl-NL" dirty="0" smtClean="0">
@@ -7034,11 +7362,43 @@
                   <a:srgbClr val="FF0000"/>
                 </a:solidFill>
               </a:rPr>
-              <a:t>(1,2)</a:t>
-            </a:r>
-            <a:r>
-              <a:rPr lang="nl-NL" dirty="0" smtClean="0"/>
-              <a:t>(4,3)(4,2)</a:t>
+              <a:t>(</a:t>
+            </a:r>
+            <a:r>
+              <a:rPr lang="nl-NL" dirty="0" smtClean="0">
+                <a:solidFill>
+                  <a:srgbClr val="FF0000"/>
+                </a:solidFill>
+              </a:rPr>
+              <a:t>1 2</a:t>
+            </a:r>
+            <a:r>
+              <a:rPr lang="nl-NL" dirty="0" smtClean="0">
+                <a:solidFill>
+                  <a:srgbClr val="FF0000"/>
+                </a:solidFill>
+              </a:rPr>
+              <a:t>)</a:t>
+            </a:r>
+            <a:r>
+              <a:rPr lang="nl-NL" dirty="0" smtClean="0"/>
+              <a:t>(</a:t>
+            </a:r>
+            <a:r>
+              <a:rPr lang="nl-NL" dirty="0" smtClean="0"/>
+              <a:t>4 3</a:t>
+            </a:r>
+            <a:r>
+              <a:rPr lang="nl-NL" dirty="0" smtClean="0"/>
+              <a:t>)(</a:t>
+            </a:r>
+            <a:r>
+              <a:rPr lang="nl-NL" dirty="0" smtClean="0"/>
+              <a:t>4 2</a:t>
+            </a:r>
+            <a:r>
+              <a:rPr lang="nl-NL" dirty="0" smtClean="0"/>
+              <a:t>)</a:t>
             </a:r>
             <a:br>
               <a:rPr lang="nl-NL" dirty="0" smtClean="0"/>
@@ -7049,7 +7409,71 @@
                   <a:schemeClr val="bg1"/>
                 </a:solidFill>
               </a:rPr>
-              <a:t>(3,4)(1,2)(2,3)(1,2)</a:t>
+              <a:t>(</a:t>
+            </a:r>
+            <a:r>
+              <a:rPr lang="nl-NL" dirty="0" smtClean="0">
+                <a:solidFill>
+                  <a:schemeClr val="bg1"/>
+                </a:solidFill>
+              </a:rPr>
+              <a:t>3 4</a:t>
+            </a:r>
+            <a:r>
+              <a:rPr lang="nl-NL" dirty="0" smtClean="0">
+                <a:solidFill>
+                  <a:schemeClr val="bg1"/>
+                </a:solidFill>
+              </a:rPr>
+              <a:t>)(</a:t>
+            </a:r>
+            <a:r>
+              <a:rPr lang="nl-NL" dirty="0" smtClean="0">
+                <a:solidFill>
+                  <a:schemeClr val="bg1"/>
+                </a:solidFill>
+              </a:rPr>
+              <a:t>1 2</a:t>
+            </a:r>
+            <a:r>
+              <a:rPr lang="nl-NL" dirty="0" smtClean="0">
+                <a:solidFill>
+                  <a:schemeClr val="bg1"/>
+                </a:solidFill>
+              </a:rPr>
+              <a:t>)(</a:t>
+            </a:r>
+            <a:r>
+              <a:rPr lang="nl-NL" dirty="0" smtClean="0">
+                <a:solidFill>
+                  <a:schemeClr val="bg1"/>
+                </a:solidFill>
+              </a:rPr>
+              <a:t>2 3</a:t>
+            </a:r>
+            <a:r>
+              <a:rPr lang="nl-NL" dirty="0" smtClean="0">
+                <a:solidFill>
+                  <a:schemeClr val="bg1"/>
+                </a:solidFill>
+              </a:rPr>
+              <a:t>)(</a:t>
+            </a:r>
+            <a:r>
+              <a:rPr lang="nl-NL" dirty="0" smtClean="0">
+                <a:solidFill>
+                  <a:schemeClr val="bg1"/>
+                </a:solidFill>
+              </a:rPr>
+              <a:t>1 2</a:t>
+            </a:r>
+            <a:r>
+              <a:rPr lang="nl-NL" dirty="0" smtClean="0">
+                <a:solidFill>
+                  <a:schemeClr val="bg1"/>
+                </a:solidFill>
+              </a:rPr>
+              <a:t>)</a:t>
             </a:r>
             <a:r>
               <a:rPr lang="nl-NL" dirty="0" smtClean="0">
@@ -7057,18 +7481,7 @@
                   <a:srgbClr val="FF0000"/>
                 </a:solidFill>
               </a:rPr>
-              <a:t>(3,4)</a:t>
-            </a:r>
-            <a:r>
-              <a:rPr lang="nl-NL" dirty="0" smtClean="0"/>
-              <a:t>(3,2)</a:t>
-            </a:r>
-            <a:br>
-              <a:rPr lang="nl-NL" dirty="0" smtClean="0"/>
-            </a:br>
-            <a:r>
-              <a:rPr lang="nl-NL" dirty="0" smtClean="0"/>
-              <a:t>(3,4)(1,2)(2,3)(1,2)(3,4)</a:t>
+              <a:t>(</a:t>
             </a:r>
             <a:r>
               <a:rPr lang="nl-NL" dirty="0" smtClean="0">
@@ -7076,7 +7489,98 @@
                   <a:srgbClr val="FF0000"/>
                 </a:solidFill>
               </a:rPr>
-              <a:t>(2,3)</a:t>
+              <a:t>3 4</a:t>
+            </a:r>
+            <a:r>
+              <a:rPr lang="nl-NL" dirty="0" smtClean="0">
+                <a:solidFill>
+                  <a:srgbClr val="FF0000"/>
+                </a:solidFill>
+              </a:rPr>
+              <a:t>)</a:t>
+            </a:r>
+            <a:r>
+              <a:rPr lang="nl-NL" dirty="0" smtClean="0"/>
+              <a:t>(</a:t>
+            </a:r>
+            <a:r>
+              <a:rPr lang="nl-NL" dirty="0" smtClean="0"/>
+              <a:t>3 2</a:t>
+            </a:r>
+            <a:r>
+              <a:rPr lang="nl-NL" dirty="0" smtClean="0"/>
+              <a:t>)</a:t>
+            </a:r>
+            <a:br>
+              <a:rPr lang="nl-NL" dirty="0" smtClean="0"/>
+            </a:br>
+            <a:r>
+              <a:rPr lang="nl-NL" dirty="0" smtClean="0"/>
+              <a:t>(</a:t>
+            </a:r>
+            <a:r>
+              <a:rPr lang="nl-NL" dirty="0" smtClean="0"/>
+              <a:t>3 4</a:t>
+            </a:r>
+            <a:r>
+              <a:rPr lang="nl-NL" dirty="0" smtClean="0"/>
+              <a:t>)(</a:t>
+            </a:r>
+            <a:r>
+              <a:rPr lang="nl-NL" dirty="0" smtClean="0"/>
+              <a:t>1 2</a:t>
+            </a:r>
+            <a:r>
+              <a:rPr lang="nl-NL" dirty="0" smtClean="0"/>
+              <a:t>)(</a:t>
+            </a:r>
+            <a:r>
+              <a:rPr lang="nl-NL" dirty="0" smtClean="0"/>
+              <a:t>2 3</a:t>
+            </a:r>
+            <a:r>
+              <a:rPr lang="nl-NL" dirty="0" smtClean="0"/>
+              <a:t>)(</a:t>
+            </a:r>
+            <a:r>
+              <a:rPr lang="nl-NL" dirty="0" smtClean="0"/>
+              <a:t>1 2</a:t>
+            </a:r>
+            <a:r>
+              <a:rPr lang="nl-NL" dirty="0" smtClean="0"/>
+              <a:t>)(</a:t>
+            </a:r>
+            <a:r>
+              <a:rPr lang="nl-NL" dirty="0" smtClean="0"/>
+              <a:t>3 4</a:t>
+            </a:r>
+            <a:r>
+              <a:rPr lang="nl-NL" dirty="0" smtClean="0"/>
+              <a:t>)</a:t>
+            </a:r>
+            <a:r>
+              <a:rPr lang="nl-NL" dirty="0" smtClean="0">
+                <a:solidFill>
+                  <a:srgbClr val="FF0000"/>
+                </a:solidFill>
+              </a:rPr>
+              <a:t>(</a:t>
+            </a:r>
+            <a:r>
+              <a:rPr lang="nl-NL" dirty="0" smtClean="0">
+                <a:solidFill>
+                  <a:srgbClr val="FF0000"/>
+                </a:solidFill>
+              </a:rPr>
+              <a:t>2 3</a:t>
+            </a:r>
+            <a:r>
+              <a:rPr lang="nl-NL" dirty="0" smtClean="0">
+                <a:solidFill>
+                  <a:srgbClr val="FF0000"/>
+                </a:solidFill>
+              </a:rPr>
+              <a:t>)</a:t>
             </a:r>
           </a:p>
         </p:txBody>
@@ -7091,19 +7595,141 @@
             <p:ph sz="half" idx="2"/>
           </p:nvPr>
         </p:nvSpPr>
-        <p:spPr/>
+        <p:spPr>
+          <a:xfrm>
+            <a:off x="4705351" y="1992776"/>
+            <a:ext cx="3657600" cy="3975100"/>
+          </a:xfrm>
+        </p:spPr>
         <p:txBody>
           <a:bodyPr/>
           <a:lstStyle/>
           <a:p>
-            <a:r>
-              <a:rPr lang="nl-NL" dirty="0" smtClean="0"/>
-              <a:t>(voorbeeld 2 netwerken a, b + tekstuele representatie)</a:t>
-            </a:r>
+            <a:pPr marL="0" indent="0">
+              <a:buNone/>
+            </a:pPr>
+            <a:endParaRPr lang="nl-NL" dirty="0" smtClean="0"/>
+          </a:p>
+          <a:p>
+            <a:pPr marL="0" indent="0">
+              <a:buNone/>
+            </a:pPr>
             <a:endParaRPr lang="nl-NL" dirty="0"/>
           </a:p>
-        </p:txBody>
-      </p:sp>
+          <a:p>
+            <a:pPr marL="0" indent="0">
+              <a:buNone/>
+            </a:pPr>
+            <a:r>
+              <a:rPr lang="nl-NL" dirty="0" smtClean="0"/>
+              <a:t/>
+            </a:r>
+            <a:br>
+              <a:rPr lang="nl-NL" dirty="0" smtClean="0"/>
+            </a:br>
+            <a:r>
+              <a:rPr lang="nl-NL" dirty="0" smtClean="0"/>
+              <a:t>	a	             b</a:t>
+            </a:r>
+            <a:br>
+              <a:rPr lang="nl-NL" dirty="0" smtClean="0"/>
+            </a:br>
+            <a:r>
+              <a:rPr lang="nl-NL" dirty="0" smtClean="0"/>
+              <a:t>a) (1 2)(3 4)(1 4)(1 3)(2 4)(2 3)</a:t>
+            </a:r>
+            <a:br>
+              <a:rPr lang="nl-NL" dirty="0" smtClean="0"/>
+            </a:br>
+            <a:r>
+              <a:rPr lang="nl-NL" dirty="0" smtClean="0"/>
+              <a:t>b) (1 2)(3 4)(2 3)(1 2)(3 4)(2 3)</a:t>
+            </a:r>
+          </a:p>
+        </p:txBody>
+      </p:sp>
+      <p:pic>
+        <p:nvPicPr>
+          <p:cNvPr id="3074" name="Picture 2" descr="C:\Users\Admin\Desktop\B.png"/>
+          <p:cNvPicPr>
+            <a:picLocks noChangeAspect="1" noChangeArrowheads="1"/>
+          </p:cNvPicPr>
+          <p:nvPr/>
+        </p:nvPicPr>
+        <p:blipFill>
+          <a:blip r:embed="rId3">
+            <a:extLst>
+              <a:ext uri="{28A0092B-C50C-407E-A947-70E740481C1C}">
+                <a14:useLocalDpi xmlns:a14="http://schemas.microsoft.com/office/drawing/2010/main" val="0"/>
+              </a:ext>
+            </a:extLst>
+          </a:blip>
+          <a:srcRect/>
+          <a:stretch>
+            <a:fillRect/>
+          </a:stretch>
+        </p:blipFill>
+        <p:spPr bwMode="auto">
+          <a:xfrm>
+            <a:off x="6580501" y="2221827"/>
+            <a:ext cx="1566418" cy="1171623"/>
+          </a:xfrm>
+          <a:prstGeom prst="rect">
+            <a:avLst/>
+          </a:prstGeom>
+          <a:noFill/>
+          <a:extLst>
+            <a:ext uri="{909E8E84-426E-40DD-AFC4-6F175D3DCCD1}">
+              <a14:hiddenFill xmlns:a14="http://schemas.microsoft.com/office/drawing/2010/main">
+                <a:solidFill>
+                  <a:srgbClr val="FFFFFF"/>
+                </a:solidFill>
+              </a14:hiddenFill>
+            </a:ext>
+          </a:extLst>
+        </p:spPr>
+      </p:pic>
+      <p:pic>
+        <p:nvPicPr>
+          <p:cNvPr id="3076" name="Picture 4" descr="C:\Users\Admin\Desktop\A.png"/>
+          <p:cNvPicPr>
+            <a:picLocks noChangeAspect="1" noChangeArrowheads="1"/>
+          </p:cNvPicPr>
+          <p:nvPr/>
+        </p:nvPicPr>
+        <p:blipFill>
+          <a:blip r:embed="rId4">
+            <a:extLst>
+              <a:ext uri="{28A0092B-C50C-407E-A947-70E740481C1C}">
+                <a14:useLocalDpi xmlns:a14="http://schemas.microsoft.com/office/drawing/2010/main" val="0"/>
+              </a:ext>
+            </a:extLst>
+          </a:blip>
+          <a:srcRect/>
+          <a:stretch>
+            <a:fillRect/>
+          </a:stretch>
+        </p:blipFill>
+        <p:spPr bwMode="auto">
+          <a:xfrm>
+            <a:off x="4863513" y="2221827"/>
+            <a:ext cx="1566418" cy="1171623"/>
+          </a:xfrm>
+          <a:prstGeom prst="rect">
+            <a:avLst/>
+          </a:prstGeom>
+          <a:noFill/>
+          <a:extLst>
+            <a:ext uri="{909E8E84-426E-40DD-AFC4-6F175D3DCCD1}">
+              <a14:hiddenFill xmlns:a14="http://schemas.microsoft.com/office/drawing/2010/main">
+                <a:solidFill>
+                  <a:srgbClr val="FFFFFF"/>
+                </a:solidFill>
+              </a14:hiddenFill>
+            </a:ext>
+          </a:extLst>
+        </p:spPr>
+      </p:pic>
     </p:spTree>
     <p:extLst>
       <p:ext uri="{BB962C8B-B14F-4D97-AF65-F5344CB8AC3E}">
@@ -7117,7 +7743,7 @@
   <p:timing>
     <p:tnLst>
       <p:par>
-        <p:cTn xmlns:p14="http://schemas.microsoft.com/office/powerpoint/2010/main" id="1" dur="indefinite" restart="never" nodeType="tmRoot"/>
+        <p:cTn id="1" dur="indefinite" restart="never" nodeType="tmRoot"/>
       </p:par>
     </p:tnLst>
   </p:timing>
@@ -7196,14 +7822,10 @@
             </a:r>
             <a:r>
               <a:rPr lang="nl-NL" dirty="0" smtClean="0"/>
-              <a:t>: (1 2) en </a:t>
-            </a:r>
-            <a:r>
-              <a:rPr lang="nl-NL" dirty="0" err="1" smtClean="0"/>
-              <a:t>C</a:t>
-            </a:r>
-            <a:r>
-              <a:rPr lang="nl-NL" baseline="-25000" dirty="0" err="1" smtClean="0"/>
+              <a:t>: (1 2) en C</a:t>
+            </a:r>
+            <a:r>
+              <a:rPr lang="nl-NL" baseline="-25000" dirty="0" smtClean="0"/>
               <a:t>b</a:t>
             </a:r>
             <a:r>
@@ -7214,12 +7836,8 @@
               <a:rPr lang="nl-NL" dirty="0" smtClean="0"/>
             </a:br>
             <a:r>
-              <a:rPr lang="nl-NL" dirty="0" err="1" smtClean="0"/>
-              <a:t>outputs</a:t>
-            </a:r>
-            <a:r>
-              <a:rPr lang="nl-NL" dirty="0" smtClean="0"/>
-              <a:t>(C</a:t>
+              <a:rPr lang="nl-NL" dirty="0" smtClean="0"/>
+              <a:t>outputs(C</a:t>
             </a:r>
             <a:r>
               <a:rPr lang="nl-NL" baseline="-25000" dirty="0" smtClean="0"/>
@@ -7231,66 +7849,78 @@
             </a:r>
             <a:r>
               <a:rPr lang="nl-NL" dirty="0"/>
-              <a:t>(0,0,0), (0,0,1), (0,1,0), </a:t>
-            </a:r>
-            <a:r>
-              <a:rPr lang="nl-NL" strike="sngStrike" dirty="0">
+              <a:t>(</a:t>
+            </a:r>
+            <a:r>
+              <a:rPr lang="nl-NL" dirty="0" smtClean="0"/>
+              <a:t>0 0 0),(0 0 1),(0 1 0),</a:t>
+            </a:r>
+            <a:r>
+              <a:rPr lang="nl-NL" strike="sngStrike" dirty="0" smtClean="0">
                 <a:solidFill>
                   <a:srgbClr val="FF0000"/>
                 </a:solidFill>
               </a:rPr>
-              <a:t>(1,0,0)</a:t>
+              <a:t>(1 0 0)</a:t>
             </a:r>
             <a:r>
               <a:rPr lang="nl-NL" dirty="0"/>
-              <a:t>, (0,1,1), </a:t>
-            </a:r>
-            <a:r>
-              <a:rPr lang="nl-NL" strike="sngStrike" dirty="0">
+              <a:t>,</a:t>
+            </a:r>
+            <a:r>
+              <a:rPr lang="nl-NL" dirty="0" smtClean="0"/>
+              <a:t>(0 1 1),</a:t>
+            </a:r>
+            <a:r>
+              <a:rPr lang="nl-NL" strike="sngStrike" dirty="0" smtClean="0">
                 <a:solidFill>
                   <a:srgbClr val="FF0000"/>
                 </a:solidFill>
               </a:rPr>
-              <a:t>(1,0,1)</a:t>
+              <a:t>(1 0 1)</a:t>
             </a:r>
             <a:r>
               <a:rPr lang="nl-NL" dirty="0"/>
-              <a:t>, (1,1,0), (1,1,1)}</a:t>
+              <a:t>,</a:t>
+            </a:r>
+            <a:r>
+              <a:rPr lang="nl-NL" dirty="0" smtClean="0"/>
+              <a:t>(1 1 0), (1 1 1</a:t>
+            </a:r>
+            <a:r>
+              <a:rPr lang="nl-NL" dirty="0"/>
+              <a:t>)}</a:t>
             </a:r>
             <a:br>
               <a:rPr lang="nl-NL" dirty="0"/>
             </a:br>
             <a:r>
-              <a:rPr lang="nl-NL" dirty="0" err="1" smtClean="0"/>
-              <a:t>outputs</a:t>
-            </a:r>
-            <a:r>
-              <a:rPr lang="nl-NL" dirty="0" smtClean="0"/>
+              <a:rPr lang="nl-NL" dirty="0" smtClean="0"/>
+              <a:t>outputs(C</a:t>
+            </a:r>
+            <a:r>
+              <a:rPr lang="nl-NL" baseline="-25000" dirty="0" smtClean="0"/>
+              <a:t>b</a:t>
+            </a:r>
+            <a:r>
+              <a:rPr lang="nl-NL" dirty="0" smtClean="0"/>
+              <a:t>) = {</a:t>
+            </a:r>
+            <a:r>
+              <a:rPr lang="nl-NL" dirty="0"/>
               <a:t>(</a:t>
             </a:r>
             <a:r>
-              <a:rPr lang="nl-NL" dirty="0" err="1" smtClean="0"/>
-              <a:t>C</a:t>
-            </a:r>
-            <a:r>
-              <a:rPr lang="nl-NL" baseline="-25000" dirty="0" err="1" smtClean="0"/>
-              <a:t>b</a:t>
-            </a:r>
-            <a:r>
-              <a:rPr lang="nl-NL" dirty="0" smtClean="0"/>
-              <a:t>) = {</a:t>
-            </a:r>
-            <a:r>
-              <a:rPr lang="nl-NL" dirty="0"/>
-              <a:t>(0,0,0), (0,0,1), </a:t>
-            </a:r>
-            <a:r>
-              <a:rPr lang="nl-NL" strike="sngStrike" dirty="0">
+              <a:rPr lang="nl-NL" dirty="0" smtClean="0"/>
+              <a:t>0 0 0),(0 0 1),</a:t>
+            </a:r>
+            <a:r>
+              <a:rPr lang="nl-NL" strike="sngStrike" dirty="0" smtClean="0">
                 <a:solidFill>
                   <a:srgbClr val="FF0000"/>
                 </a:solidFill>
               </a:rPr>
-              <a:t>(0,1,0)</a:t>
+              <a:t>(0 1 0)</a:t>
             </a:r>
             <a:r>
               <a:rPr lang="nl-NL" dirty="0">
@@ -7298,35 +7928,51 @@
                   <a:schemeClr val="tx1"/>
                 </a:solidFill>
               </a:rPr>
-              <a:t>, (1,0,0)</a:t>
+              <a:t>,</a:t>
+            </a:r>
+            <a:r>
+              <a:rPr lang="nl-NL" dirty="0" smtClean="0">
+                <a:solidFill>
+                  <a:schemeClr val="tx1"/>
+                </a:solidFill>
+              </a:rPr>
+              <a:t>(1 0 0)</a:t>
             </a:r>
             <a:r>
               <a:rPr lang="nl-NL" dirty="0"/>
-              <a:t>, (0,1,1), </a:t>
-            </a:r>
-            <a:r>
-              <a:rPr lang="nl-NL" dirty="0">
+              <a:t>,</a:t>
+            </a:r>
+            <a:r>
+              <a:rPr lang="nl-NL" dirty="0" smtClean="0"/>
+              <a:t>(0 1 1),</a:t>
+            </a:r>
+            <a:r>
+              <a:rPr lang="nl-NL" dirty="0" smtClean="0">
                 <a:solidFill>
                   <a:srgbClr val="103154"/>
                 </a:solidFill>
               </a:rPr>
-              <a:t>(1,0,1)</a:t>
+              <a:t>(1 0 1)</a:t>
             </a:r>
             <a:r>
               <a:rPr lang="nl-NL" dirty="0"/>
-              <a:t>, </a:t>
-            </a:r>
-            <a:r>
-              <a:rPr lang="nl-NL" strike="sngStrike" dirty="0">
+              <a:t>,</a:t>
+            </a:r>
+            <a:r>
+              <a:rPr lang="nl-NL" strike="sngStrike" dirty="0" smtClean="0">
                 <a:solidFill>
                   <a:srgbClr val="FF0000"/>
                 </a:solidFill>
               </a:rPr>
-              <a:t>(1,1,0)</a:t>
+              <a:t>(1 1 0),</a:t>
             </a:r>
             <a:r>
               <a:rPr lang="nl-NL" dirty="0"/>
-              <a:t>, (1,1,1</a:t>
+              <a:t> </a:t>
+            </a:r>
+            <a:r>
+              <a:rPr lang="nl-NL" dirty="0" smtClean="0"/>
+              <a:t>(1 1 1</a:t>
             </a:r>
             <a:r>
               <a:rPr lang="nl-NL" dirty="0" smtClean="0"/>
@@ -7345,16 +7991,20 @@
           </a:p>
           <a:p>
             <a:r>
+              <a:rPr lang="nl-NL" dirty="0" smtClean="0"/>
+              <a:t>(C</a:t>
+            </a:r>
+            <a:r>
+              <a:rPr lang="nl-NL" baseline="-25000" dirty="0" smtClean="0"/>
+              <a:t>a</a:t>
+            </a:r>
+            <a:r>
+              <a:rPr lang="nl-NL" dirty="0" smtClean="0"/>
+              <a:t> </a:t>
+            </a:r>
+            <a:r>
               <a:rPr lang="nl-NL" dirty="0"/>
-              <a:t>C</a:t>
-            </a:r>
-            <a:r>
-              <a:rPr lang="nl-NL" baseline="-25000" dirty="0"/>
-              <a:t>a</a:t>
-            </a:r>
-            <a:r>
-              <a:rPr lang="nl-NL" dirty="0"/>
-              <a:t> ≤</a:t>
+              <a:t>≤</a:t>
             </a:r>
             <a:r>
               <a:rPr lang="nl-NL" baseline="-25000" dirty="0"/>
@@ -7365,23 +8015,23 @@
               <a:t> </a:t>
             </a:r>
             <a:r>
-              <a:rPr lang="nl-NL" dirty="0" err="1" smtClean="0"/>
+              <a:rPr lang="nl-NL" dirty="0" smtClean="0"/>
               <a:t>C</a:t>
             </a:r>
             <a:r>
-              <a:rPr lang="nl-NL" baseline="-25000" dirty="0" err="1" smtClean="0"/>
+              <a:rPr lang="nl-NL" baseline="-25000" dirty="0" smtClean="0"/>
               <a:t>b</a:t>
             </a:r>
             <a:r>
               <a:rPr lang="nl-NL" dirty="0" smtClean="0"/>
-              <a:t> ⇒ </a:t>
-            </a:r>
-            <a:r>
-              <a:rPr lang="nl-NL" dirty="0" err="1" smtClean="0"/>
-              <a:t>C</a:t>
-            </a:r>
-            <a:r>
-              <a:rPr lang="nl-NL" baseline="-25000" dirty="0" err="1" smtClean="0"/>
+              <a:t>) </a:t>
+            </a:r>
+            <a:r>
+              <a:rPr lang="nl-NL" dirty="0" smtClean="0"/>
+              <a:t>⇒ C</a:t>
+            </a:r>
+            <a:r>
+              <a:rPr lang="nl-NL" baseline="-25000" dirty="0" smtClean="0"/>
               <a:t>b</a:t>
             </a:r>
             <a:r>
@@ -7390,13 +8040,8 @@
             </a:r>
             <a:r>
               <a:rPr lang="nl-NL" dirty="0" smtClean="0"/>
-              <a:t>niet uitbreiden (</a:t>
-            </a:r>
-            <a:r>
-              <a:rPr lang="nl-NL" smtClean="0"/>
-              <a:t>als |a|=|b|)</a:t>
-            </a:r>
-            <a:endParaRPr lang="nl-NL" dirty="0" smtClean="0"/>
+              <a:t>niet uitbreiden (als |a|=|b|)</a:t>
+            </a:r>
           </a:p>
         </p:txBody>
       </p:sp>
@@ -7709,7 +8354,6 @@
               <a:rPr lang="nl-NL" dirty="0" smtClean="0"/>
               <a:t>)</a:t>
             </a:r>
-            <a:endParaRPr lang="nl-NL" dirty="0" smtClean="0"/>
           </a:p>
         </p:txBody>
       </p:sp>
@@ -7726,7 +8370,7 @@
   <p:timing>
     <p:tnLst>
       <p:par>
-        <p:cTn xmlns:p14="http://schemas.microsoft.com/office/powerpoint/2010/main" id="1" dur="indefinite" restart="never" nodeType="tmRoot"/>
+        <p:cTn id="1" dur="indefinite" restart="never" nodeType="tmRoot"/>
       </p:par>
     </p:tnLst>
   </p:timing>
@@ -7798,6 +8442,13 @@
   <p:clrMapOvr>
     <a:masterClrMapping/>
   </p:clrMapOvr>
+  <p:timing>
+    <p:tnLst>
+      <p:par>
+        <p:cTn id="1" dur="indefinite" restart="never" nodeType="tmRoot"/>
+      </p:par>
+    </p:tnLst>
+  </p:timing>
 </p:sld>
 </file>
 
@@ -7873,7 +8524,7 @@
   <p:timing>
     <p:tnLst>
       <p:par>
-        <p:cTn xmlns:p14="http://schemas.microsoft.com/office/powerpoint/2010/main" id="1" dur="indefinite" restart="never" nodeType="tmRoot"/>
+        <p:cTn id="1" dur="indefinite" restart="never" nodeType="tmRoot"/>
       </p:par>
     </p:tnLst>
   </p:timing>
@@ -7914,7 +8565,19 @@
           <a:p>
             <a:r>
               <a:rPr lang="nl-NL" dirty="0" smtClean="0"/>
-              <a:t>Wat is een netwerk?</a:t>
+              <a:t>Wat is een </a:t>
+            </a:r>
+            <a:r>
+              <a:rPr lang="nl-NL" dirty="0" smtClean="0"/>
+              <a:t>comparator </a:t>
+            </a:r>
+            <a:r>
+              <a:rPr lang="nl-NL" dirty="0" smtClean="0"/>
+              <a:t>network</a:t>
+            </a:r>
+            <a:r>
+              <a:rPr lang="nl-NL" dirty="0" smtClean="0"/>
+              <a:t>?</a:t>
             </a:r>
             <a:endParaRPr lang="nl-NL" dirty="0"/>
           </a:p>
@@ -7930,31 +8593,41 @@
             <p:ph sz="half" idx="1"/>
           </p:nvPr>
         </p:nvSpPr>
-        <p:spPr/>
+        <p:spPr>
+          <a:xfrm>
+            <a:off x="737121" y="1981201"/>
+            <a:ext cx="3657600" cy="3975100"/>
+          </a:xfrm>
+        </p:spPr>
         <p:txBody>
           <a:bodyPr/>
           <a:lstStyle/>
           <a:p>
-            <a:r>
-              <a:rPr lang="nl-NL" dirty="0" smtClean="0"/>
-              <a:t>Hier komt een foto van een netwerk met </a:t>
-            </a:r>
-            <a:r>
-              <a:rPr lang="nl-NL" dirty="0" err="1" smtClean="0"/>
-              <a:t>comparators</a:t>
-            </a:r>
-            <a:r>
-              <a:rPr lang="nl-NL" dirty="0"/>
-              <a:t/>
-            </a:r>
-            <a:br>
-              <a:rPr lang="nl-NL" dirty="0"/>
-            </a:br>
-            <a:r>
-              <a:rPr lang="nl-NL" dirty="0" smtClean="0"/>
-              <a:t>+ onderaan de tekstuele voorstelling en i&lt;j vermelden</a:t>
-            </a:r>
+            <a:pPr marL="0" indent="0">
+              <a:buNone/>
+            </a:pPr>
             <a:endParaRPr lang="nl-NL" dirty="0" smtClean="0"/>
+          </a:p>
+          <a:p>
+            <a:pPr marL="0" indent="0">
+              <a:buNone/>
+            </a:pPr>
+            <a:endParaRPr lang="nl-NL" dirty="0"/>
+          </a:p>
+          <a:p>
+            <a:pPr marL="0" indent="0">
+              <a:buNone/>
+            </a:pPr>
+            <a:endParaRPr lang="nl-NL" dirty="0"/>
+          </a:p>
+          <a:p>
+            <a:pPr marL="0" indent="0">
+              <a:buNone/>
+            </a:pPr>
+            <a:r>
+              <a:rPr lang="nl-NL" dirty="0" smtClean="0"/>
+              <a:t>   (1 2)(3 4)(2 3)(1 2)</a:t>
+            </a:r>
           </a:p>
         </p:txBody>
       </p:sp>
@@ -8029,33 +8702,106 @@
             </a:pPr>
             <a:r>
               <a:rPr lang="nl-NL" dirty="0" smtClean="0"/>
-              <a:t>a &gt; b:  a&lt;-&gt;b</a:t>
-            </a:r>
-          </a:p>
-          <a:p>
-            <a:pPr lvl="1">
-              <a:buFont typeface="Wingdings" charset="2"/>
-              <a:buChar char="Ø"/>
-            </a:pPr>
-            <a:r>
-              <a:rPr lang="nl-NL" dirty="0" smtClean="0"/>
-              <a:t>(extra foto </a:t>
-            </a:r>
-            <a:r>
-              <a:rPr lang="nl-NL" dirty="0" err="1" smtClean="0"/>
-              <a:t>comparator</a:t>
-            </a:r>
-            <a:r>
-              <a:rPr lang="nl-NL" dirty="0" smtClean="0"/>
-              <a:t>)</a:t>
-            </a:r>
-          </a:p>
-          <a:p>
-            <a:pPr lvl="1"/>
-            <a:endParaRPr lang="nl-NL" dirty="0"/>
-          </a:p>
-        </p:txBody>
-      </p:sp>
+              <a:t>a &gt; b:  </a:t>
+            </a:r>
+            <a:r>
+              <a:rPr lang="nl-NL" dirty="0" smtClean="0"/>
+              <a:t>a</a:t>
+            </a:r>
+            <a:r>
+              <a:rPr lang="nl-BE" dirty="0"/>
+              <a:t>↔</a:t>
+            </a:r>
+            <a:r>
+              <a:rPr lang="nl-NL" dirty="0" smtClean="0"/>
+              <a:t>b</a:t>
+            </a:r>
+            <a:endParaRPr lang="nl-NL" dirty="0" smtClean="0"/>
+          </a:p>
+        </p:txBody>
+      </p:sp>
+      <p:pic>
+        <p:nvPicPr>
+          <p:cNvPr id="4098" name="Picture 2" descr="C:\Users\Admin\Desktop\Comparator.png"/>
+          <p:cNvPicPr>
+            <a:picLocks noChangeAspect="1" noChangeArrowheads="1"/>
+          </p:cNvPicPr>
+          <p:nvPr/>
+        </p:nvPicPr>
+        <p:blipFill>
+          <a:blip r:embed="rId3">
+            <a:extLst>
+              <a:ext uri="{28A0092B-C50C-407E-A947-70E740481C1C}">
+                <a14:useLocalDpi xmlns:a14="http://schemas.microsoft.com/office/drawing/2010/main" val="0"/>
+              </a:ext>
+            </a:extLst>
+          </a:blip>
+          <a:srcRect/>
+          <a:stretch>
+            <a:fillRect/>
+          </a:stretch>
+        </p:blipFill>
+        <p:spPr bwMode="auto">
+          <a:xfrm>
+            <a:off x="4991771" y="4654146"/>
+            <a:ext cx="3000794" cy="1362265"/>
+          </a:xfrm>
+          <a:prstGeom prst="rect">
+            <a:avLst/>
+          </a:prstGeom>
+          <a:noFill/>
+          <a:extLst>
+            <a:ext uri="{909E8E84-426E-40DD-AFC4-6F175D3DCCD1}">
+              <a14:hiddenFill xmlns:a14="http://schemas.microsoft.com/office/drawing/2010/main">
+                <a:solidFill>
+                  <a:srgbClr val="FFFFFF"/>
+                </a:solidFill>
+              </a14:hiddenFill>
+            </a:ext>
+          </a:extLst>
+        </p:spPr>
+      </p:pic>
+      <p:pic>
+        <p:nvPicPr>
+          <p:cNvPr id="4099" name="Picture 3" descr="C:\Users\Admin\Desktop\Overbodige5Parallel.png"/>
+          <p:cNvPicPr>
+            <a:picLocks noChangeAspect="1" noChangeArrowheads="1"/>
+          </p:cNvPicPr>
+          <p:nvPr/>
+        </p:nvPicPr>
+        <p:blipFill>
+          <a:blip r:embed="rId4">
+            <a:extLst>
+              <a:ext uri="{28A0092B-C50C-407E-A947-70E740481C1C}">
+                <a14:useLocalDpi xmlns:a14="http://schemas.microsoft.com/office/drawing/2010/main" val="0"/>
+              </a:ext>
+            </a:extLst>
+          </a:blip>
+          <a:srcRect/>
+          <a:stretch>
+            <a:fillRect/>
+          </a:stretch>
+        </p:blipFill>
+        <p:spPr bwMode="auto">
+          <a:xfrm>
+            <a:off x="960699" y="2132813"/>
+            <a:ext cx="2141316" cy="1548713"/>
+          </a:xfrm>
+          <a:prstGeom prst="rect">
+            <a:avLst/>
+          </a:prstGeom>
+          <a:noFill/>
+          <a:extLst>
+            <a:ext uri="{909E8E84-426E-40DD-AFC4-6F175D3DCCD1}">
+              <a14:hiddenFill xmlns:a14="http://schemas.microsoft.com/office/drawing/2010/main">
+                <a:solidFill>
+                  <a:srgbClr val="FFFFFF"/>
+                </a:solidFill>
+              </a14:hiddenFill>
+            </a:ext>
+          </a:extLst>
+        </p:spPr>
+      </p:pic>
     </p:spTree>
     <p:extLst>
       <p:ext uri="{BB962C8B-B14F-4D97-AF65-F5344CB8AC3E}">
@@ -8069,7 +8815,7 @@
   <p:timing>
     <p:tnLst>
       <p:par>
-        <p:cTn xmlns:p14="http://schemas.microsoft.com/office/powerpoint/2010/main" id="1" dur="indefinite" restart="never" nodeType="tmRoot"/>
+        <p:cTn id="1" dur="indefinite" restart="never" nodeType="tmRoot"/>
       </p:par>
     </p:tnLst>
   </p:timing>
@@ -8134,7 +8880,12 @@
             <p:ph type="body" idx="1"/>
           </p:nvPr>
         </p:nvSpPr>
-        <p:spPr/>
+        <p:spPr>
+          <a:xfrm>
+            <a:off x="490088" y="1852426"/>
+            <a:ext cx="3657600" cy="868362"/>
+          </a:xfrm>
+        </p:spPr>
         <p:txBody>
           <a:bodyPr/>
           <a:lstStyle/>
@@ -8157,27 +8908,28 @@
             <p:ph sz="half" idx="2"/>
           </p:nvPr>
         </p:nvSpPr>
-        <p:spPr/>
+        <p:spPr>
+          <a:xfrm>
+            <a:off x="779463" y="3032568"/>
+            <a:ext cx="4012456" cy="3213100"/>
+          </a:xfrm>
+        </p:spPr>
         <p:txBody>
           <a:bodyPr/>
           <a:lstStyle/>
           <a:p>
-            <a:r>
-              <a:rPr lang="nl-NL" dirty="0" smtClean="0"/>
-              <a:t>(foto)</a:t>
-            </a:r>
-          </a:p>
-          <a:p>
-            <a:r>
-              <a:rPr lang="nl-NL" dirty="0"/>
-              <a:t>O</a:t>
-            </a:r>
-            <a:r>
-              <a:rPr lang="nl-NL" dirty="0" smtClean="0"/>
-              <a:t>utput is gesorteerd</a:t>
-            </a:r>
+            <a:endParaRPr lang="nl-NL" dirty="0" smtClean="0"/>
+          </a:p>
+          <a:p>
             <a:endParaRPr lang="nl-NL" dirty="0"/>
           </a:p>
+          <a:p>
+            <a:r>
+              <a:rPr lang="nl-NL" sz="2200" dirty="0" smtClean="0"/>
+              <a:t>Output is gesorteerd</a:t>
+            </a:r>
+            <a:endParaRPr lang="nl-NL" sz="2200" dirty="0"/>
+          </a:p>
         </p:txBody>
       </p:sp>
       <p:sp>
@@ -8190,7 +8942,12 @@
             <p:ph type="body" sz="quarter" idx="3"/>
           </p:nvPr>
         </p:nvSpPr>
-        <p:spPr/>
+        <p:spPr>
+          <a:xfrm>
+            <a:off x="4624326" y="1864001"/>
+            <a:ext cx="3657600" cy="868362"/>
+          </a:xfrm>
+        </p:spPr>
         <p:txBody>
           <a:bodyPr/>
           <a:lstStyle/>
@@ -8213,25 +8970,123 @@
             <p:ph sz="quarter" idx="4"/>
           </p:nvPr>
         </p:nvSpPr>
-        <p:spPr/>
+        <p:spPr>
+          <a:xfrm>
+            <a:off x="4757194" y="3032568"/>
+            <a:ext cx="3848832" cy="3213100"/>
+          </a:xfrm>
+        </p:spPr>
         <p:txBody>
           <a:bodyPr/>
           <a:lstStyle/>
           <a:p>
-            <a:r>
-              <a:rPr lang="nl-NL" dirty="0" smtClean="0"/>
-              <a:t>(foto)</a:t>
-            </a:r>
-          </a:p>
-          <a:p>
-            <a:r>
-              <a:rPr lang="nl-NL" dirty="0" smtClean="0"/>
-              <a:t>(tekst: voorbeeld ongesorteerd)</a:t>
-            </a:r>
+            <a:endParaRPr lang="nl-NL" dirty="0" smtClean="0"/>
+          </a:p>
+          <a:p>
             <a:endParaRPr lang="nl-NL" dirty="0"/>
           </a:p>
-        </p:txBody>
-      </p:sp>
+          <a:p>
+            <a:r>
+              <a:rPr lang="nl-NL" sz="2200" dirty="0" smtClean="0"/>
+              <a:t>Niet alle output gesorteerd.</a:t>
+            </a:r>
+            <a:br>
+              <a:rPr lang="nl-NL" sz="2200" dirty="0" smtClean="0"/>
+            </a:br>
+            <a:r>
+              <a:rPr lang="nl-NL" sz="2200" dirty="0" smtClean="0"/>
+              <a:t>(110 </a:t>
+            </a:r>
+            <a:r>
+              <a:rPr lang="nl-BE" sz="2400" dirty="0" smtClean="0"/>
+              <a:t>→ 101)</a:t>
+            </a:r>
+            <a:endParaRPr lang="nl-NL" sz="2200" dirty="0" smtClean="0"/>
+          </a:p>
+        </p:txBody>
+      </p:sp>
+      <p:pic>
+        <p:nvPicPr>
+          <p:cNvPr id="1026" name="Picture 2" descr="C:\Users\Admin\Desktop\PresentatieSorted4.png"/>
+          <p:cNvPicPr>
+            <a:picLocks noChangeAspect="1" noChangeArrowheads="1"/>
+          </p:cNvPicPr>
+          <p:nvPr/>
+        </p:nvPicPr>
+        <p:blipFill>
+          <a:blip r:embed="rId2">
+            <a:extLst>
+              <a:ext uri="{28A0092B-C50C-407E-A947-70E740481C1C}">
+                <a14:useLocalDpi xmlns:a14="http://schemas.microsoft.com/office/drawing/2010/main" val="0"/>
+              </a:ext>
+            </a:extLst>
+          </a:blip>
+          <a:srcRect/>
+          <a:stretch>
+            <a:fillRect/>
+          </a:stretch>
+        </p:blipFill>
+        <p:spPr bwMode="auto">
+          <a:xfrm>
+            <a:off x="1238492" y="2495508"/>
+            <a:ext cx="2345271" cy="1615139"/>
+          </a:xfrm>
+          <a:prstGeom prst="rect">
+            <a:avLst/>
+          </a:prstGeom>
+          <a:noFill/>
+          <a:extLst>
+            <a:ext uri="{909E8E84-426E-40DD-AFC4-6F175D3DCCD1}">
+              <a14:hiddenFill xmlns:a14="http://schemas.microsoft.com/office/drawing/2010/main">
+                <a:solidFill>
+                  <a:srgbClr val="FFFFFF"/>
+                </a:solidFill>
+              </a14:hiddenFill>
+            </a:ext>
+          </a:extLst>
+        </p:spPr>
+      </p:pic>
+      <p:pic>
+        <p:nvPicPr>
+          <p:cNvPr id="1027" name="Picture 3" descr="C:\Users\Admin\Desktop\PresentatieUnsorted4.png"/>
+          <p:cNvPicPr>
+            <a:picLocks noChangeAspect="1" noChangeArrowheads="1"/>
+          </p:cNvPicPr>
+          <p:nvPr/>
+        </p:nvPicPr>
+        <p:blipFill>
+          <a:blip r:embed="rId3">
+            <a:extLst>
+              <a:ext uri="{28A0092B-C50C-407E-A947-70E740481C1C}">
+                <a14:useLocalDpi xmlns:a14="http://schemas.microsoft.com/office/drawing/2010/main" val="0"/>
+              </a:ext>
+            </a:extLst>
+          </a:blip>
+          <a:srcRect/>
+          <a:stretch>
+            <a:fillRect/>
+          </a:stretch>
+        </p:blipFill>
+        <p:spPr bwMode="auto">
+          <a:xfrm>
+            <a:off x="5278056" y="2495507"/>
+            <a:ext cx="2413571" cy="1573131"/>
+          </a:xfrm>
+          <a:prstGeom prst="rect">
+            <a:avLst/>
+          </a:prstGeom>
+          <a:noFill/>
+          <a:extLst>
+            <a:ext uri="{909E8E84-426E-40DD-AFC4-6F175D3DCCD1}">
+              <a14:hiddenFill xmlns:a14="http://schemas.microsoft.com/office/drawing/2010/main">
+                <a:solidFill>
+                  <a:srgbClr val="FFFFFF"/>
+                </a:solidFill>
+              </a14:hiddenFill>
+            </a:ext>
+          </a:extLst>
+        </p:spPr>
+      </p:pic>
     </p:spTree>
     <p:extLst>
       <p:ext uri="{BB962C8B-B14F-4D97-AF65-F5344CB8AC3E}">
@@ -8245,7 +9100,7 @@
   <p:timing>
     <p:tnLst>
       <p:par>
-        <p:cTn xmlns:p14="http://schemas.microsoft.com/office/powerpoint/2010/main" id="1" dur="indefinite" restart="never" nodeType="tmRoot"/>
+        <p:cTn id="1" dur="indefinite" restart="never" nodeType="tmRoot"/>
       </p:par>
     </p:tnLst>
   </p:timing>
@@ -8360,12 +9215,17 @@
             </a:r>
             <a:r>
               <a:rPr lang="is-IS" dirty="0"/>
-              <a:t> ∈{0,1}</a:t>
+              <a:t> ∈{</a:t>
+            </a:r>
+            <a:r>
+              <a:rPr lang="is-IS" dirty="0" smtClean="0"/>
+              <a:t>0,1}</a:t>
             </a:r>
             <a:r>
               <a:rPr lang="is-IS" baseline="30000" dirty="0" smtClean="0"/>
               <a:t>n</a:t>
             </a:r>
+            <a:endParaRPr lang="is-IS" baseline="30000" dirty="0" smtClean="0"/>
           </a:p>
           <a:p>
             <a:r>
@@ -8395,7 +9255,7 @@
   <p:timing>
     <p:tnLst>
       <p:par>
-        <p:cTn xmlns:p14="http://schemas.microsoft.com/office/powerpoint/2010/main" id="1" dur="indefinite" restart="never" nodeType="tmRoot"/>
+        <p:cTn id="1" dur="indefinite" restart="never" nodeType="tmRoot"/>
       </p:par>
     </p:tnLst>
   </p:timing>
@@ -8556,7 +9416,7 @@
   <p:timing>
     <p:tnLst>
       <p:par>
-        <p:cTn xmlns:p14="http://schemas.microsoft.com/office/powerpoint/2010/main" id="1" dur="indefinite" restart="never" nodeType="tmRoot"/>
+        <p:cTn id="1" dur="indefinite" restart="never" nodeType="tmRoot"/>
       </p:par>
     </p:tnLst>
   </p:timing>
@@ -8743,7 +9603,7 @@
   <p:timing>
     <p:tnLst>
       <p:par>
-        <p:cTn xmlns:p14="http://schemas.microsoft.com/office/powerpoint/2010/main" id="1" dur="indefinite" restart="never" nodeType="tmRoot"/>
+        <p:cTn id="1" dur="indefinite" restart="never" nodeType="tmRoot"/>
       </p:par>
     </p:tnLst>
   </p:timing>
@@ -8941,7 +9801,7 @@
   <p:timing>
     <p:tnLst>
       <p:par>
-        <p:cTn xmlns:p14="http://schemas.microsoft.com/office/powerpoint/2010/main" id="1" dur="indefinite" restart="never" nodeType="tmRoot"/>
+        <p:cTn id="1" dur="indefinite" restart="never" nodeType="tmRoot"/>
       </p:par>
     </p:tnLst>
   </p:timing>
@@ -9931,7 +10791,7 @@
   <p:timing>
     <p:tnLst>
       <p:par>
-        <p:cTn xmlns:p14="http://schemas.microsoft.com/office/powerpoint/2010/main" id="1" dur="indefinite" restart="never" nodeType="tmRoot"/>
+        <p:cTn id="1" dur="indefinite" restart="never" nodeType="tmRoot"/>
       </p:par>
     </p:tnLst>
   </p:timing>

</xml_diff>

<commit_message>
Toevoegingen aan de eerste presentatie
</commit_message>
<xml_diff>
--- a/PPP1_WV.pptx
+++ b/PPP1_WV.pptx
@@ -10094,6 +10094,29 @@
               <a:rPr lang="nl-NL" dirty="0" smtClean="0"/>
               <a:t>)</a:t>
             </a:r>
+            <a:br>
+              <a:rPr lang="nl-NL" dirty="0" smtClean="0"/>
+            </a:br>
+            <a:r>
+              <a:rPr lang="nl-NL" dirty="0" smtClean="0"/>
+              <a:t>p(</a:t>
+            </a:r>
+            <a:r>
+              <a:rPr lang="nl-NL" dirty="0" err="1" smtClean="0"/>
+              <a:t>outputs</a:t>
+            </a:r>
+            <a:r>
+              <a:rPr lang="nl-NL" smtClean="0"/>
+              <a:t>(C</a:t>
+            </a:r>
+            <a:r>
+              <a:rPr lang="nl-NL" baseline="-25000" smtClean="0"/>
+              <a:t>a</a:t>
+            </a:r>
+            <a:r>
+              <a:rPr lang="nl-NL" smtClean="0"/>
+              <a:t>)) = {(0,0,0), (1,0,0), (0,0,1), (1,0,1), (0,1,1), (1,1,1)}</a:t>
+            </a:r>
             <a:endParaRPr lang="nl-NL" dirty="0" smtClean="0"/>
           </a:p>
         </p:txBody>
@@ -10533,11 +10556,11 @@
               <a:t>R</a:t>
             </a:r>
             <a:r>
-              <a:rPr lang="nl-NL" i="1" baseline="30000" smtClean="0"/>
+              <a:rPr lang="nl-NL" i="1" baseline="30000" dirty="0" err="1" smtClean="0"/>
               <a:t>n</a:t>
             </a:r>
             <a:r>
-              <a:rPr lang="nl-NL" i="1" baseline="-25000" smtClean="0"/>
+              <a:rPr lang="nl-NL" i="1" baseline="-25000" dirty="0" err="1" smtClean="0"/>
               <a:t>k</a:t>
             </a:r>
             <a:r>

</xml_diff>

<commit_message>
(voorlopig) definitieve versie van de eerste presentatie
</commit_message>
<xml_diff>
--- a/PPP1_WV.pptx
+++ b/PPP1_WV.pptx
@@ -5,10 +5,10 @@
     <p:sldMasterId id="2147483677" r:id="rId1"/>
   </p:sldMasterIdLst>
   <p:notesMasterIdLst>
-    <p:notesMasterId r:id="rId21"/>
+    <p:notesMasterId r:id="rId25"/>
   </p:notesMasterIdLst>
   <p:handoutMasterIdLst>
-    <p:handoutMasterId r:id="rId22"/>
+    <p:handoutMasterId r:id="rId26"/>
   </p:handoutMasterIdLst>
   <p:sldIdLst>
     <p:sldId id="256" r:id="rId2"/>
@@ -29,7 +29,11 @@
     <p:sldId id="275" r:id="rId17"/>
     <p:sldId id="276" r:id="rId18"/>
     <p:sldId id="277" r:id="rId19"/>
-    <p:sldId id="278" r:id="rId20"/>
+    <p:sldId id="279" r:id="rId20"/>
+    <p:sldId id="280" r:id="rId21"/>
+    <p:sldId id="281" r:id="rId22"/>
+    <p:sldId id="283" r:id="rId23"/>
+    <p:sldId id="278" r:id="rId24"/>
   </p:sldIdLst>
   <p:sldSz cx="9144000" cy="6858000" type="screen4x3"/>
   <p:notesSz cx="6858000" cy="9144000"/>
@@ -690,6 +694,10 @@
           <a:bodyPr/>
           <a:lstStyle/>
           <a:p>
+            <a:r>
+              <a:rPr lang="nl-NL" dirty="0" smtClean="0"/>
+              <a:t>M</a:t>
+            </a:r>
             <a:endParaRPr lang="nl-NL" dirty="0"/>
           </a:p>
         </p:txBody>
@@ -776,6 +784,13 @@
           <a:p>
             <a:r>
               <a:rPr lang="nl-NL" dirty="0" smtClean="0"/>
+              <a:t>V</a:t>
+            </a:r>
+            <a:br>
+              <a:rPr lang="nl-NL" dirty="0" smtClean="0"/>
+            </a:br>
+            <a:r>
+              <a:rPr lang="nl-NL" dirty="0" smtClean="0"/>
               <a:t>Uitleggen </a:t>
             </a:r>
             <a:r>
@@ -880,7 +895,18 @@
           <a:p>
             <a:r>
               <a:rPr lang="nl-NL" dirty="0" smtClean="0"/>
-              <a:t>Uitleg hoe we aan de 55^33 komen.</a:t>
+              <a:t>V</a:t>
+            </a:r>
+            <a:br>
+              <a:rPr lang="nl-NL" dirty="0" smtClean="0"/>
+            </a:br>
+            <a:r>
+              <a:rPr lang="nl-NL" dirty="0" smtClean="0"/>
+              <a:t>Uitleg </a:t>
+            </a:r>
+            <a:r>
+              <a:rPr lang="nl-NL" dirty="0" smtClean="0"/>
+              <a:t>hoe we aan de 55^33 komen.</a:t>
             </a:r>
           </a:p>
           <a:p>
@@ -984,7 +1010,18 @@
           <a:p>
             <a:r>
               <a:rPr lang="nl-NL" dirty="0" smtClean="0"/>
-              <a:t>Als n</a:t>
+              <a:t>M</a:t>
+            </a:r>
+            <a:br>
+              <a:rPr lang="nl-NL" dirty="0" smtClean="0"/>
+            </a:br>
+            <a:r>
+              <a:rPr lang="nl-NL" dirty="0" smtClean="0"/>
+              <a:t>Als </a:t>
+            </a:r>
+            <a:r>
+              <a:rPr lang="nl-NL" dirty="0" smtClean="0"/>
+              <a:t>n</a:t>
             </a:r>
             <a:r>
               <a:rPr lang="nl-NL" baseline="0" dirty="0" smtClean="0"/>
@@ -1099,13 +1136,44 @@
           <a:lstStyle/>
           <a:p>
             <a:r>
+              <a:rPr lang="nl-NL" dirty="0" smtClean="0"/>
+              <a:t>M</a:t>
+            </a:r>
+            <a:br>
+              <a:rPr lang="nl-NL" dirty="0" smtClean="0"/>
+            </a:br>
+            <a:r>
               <a:rPr lang="nl-NL" dirty="0" err="1" smtClean="0"/>
               <a:t>Prunen</a:t>
             </a:r>
             <a:r>
               <a:rPr lang="nl-NL" baseline="0" dirty="0" smtClean="0"/>
-              <a:t> = schrap de HELE TAK voor de generatie</a:t>
-            </a:r>
+              <a:t> </a:t>
+            </a:r>
+            <a:r>
+              <a:rPr lang="nl-NL" baseline="0" dirty="0" smtClean="0"/>
+              <a:t>= schrap de HELE TAK voor de </a:t>
+            </a:r>
+            <a:r>
+              <a:rPr lang="nl-NL" baseline="0" dirty="0" smtClean="0"/>
+              <a:t>generatie</a:t>
+            </a:r>
+            <a:br>
+              <a:rPr lang="nl-NL" baseline="0" dirty="0" smtClean="0"/>
+            </a:br>
+            <a:r>
+              <a:rPr lang="nl-NL" baseline="0" dirty="0" smtClean="0"/>
+              <a:t>2 voorbeelden: zelfde </a:t>
+            </a:r>
+            <a:r>
+              <a:rPr lang="nl-NL" baseline="0" dirty="0" err="1" smtClean="0"/>
+              <a:t>comps</a:t>
+            </a:r>
+            <a:r>
+              <a:rPr lang="nl-NL" baseline="0" dirty="0" smtClean="0"/>
+              <a:t> na elkaar EN parallel</a:t>
+            </a:r>
+            <a:endParaRPr lang="nl-NL" baseline="0" dirty="0" smtClean="0"/>
           </a:p>
           <a:p>
             <a:endParaRPr lang="nl-NL" baseline="0" dirty="0" smtClean="0"/>
@@ -1281,12 +1349,23 @@
           <a:lstStyle/>
           <a:p>
             <a:r>
+              <a:rPr lang="nl-NL" dirty="0" smtClean="0"/>
+              <a:t>V</a:t>
+            </a:r>
+            <a:br>
+              <a:rPr lang="nl-NL" dirty="0" smtClean="0"/>
+            </a:br>
+            <a:r>
               <a:rPr lang="nl-NL" dirty="0" err="1" smtClean="0"/>
               <a:t>Cb</a:t>
             </a:r>
             <a:r>
               <a:rPr lang="nl-NL" dirty="0" smtClean="0"/>
-              <a:t> niet uitbreiden want als er een een </a:t>
+              <a:t> </a:t>
+            </a:r>
+            <a:r>
+              <a:rPr lang="nl-NL" dirty="0" smtClean="0"/>
+              <a:t>niet uitbreiden want als er een een </a:t>
             </a:r>
             <a:r>
               <a:rPr lang="nl-NL" dirty="0" err="1" smtClean="0"/>
@@ -1302,17 +1381,13 @@
             </a:r>
             <a:r>
               <a:rPr lang="nl-NL" dirty="0" smtClean="0"/>
-              <a:t> volgt dan bestaat er ook 1 van </a:t>
-            </a:r>
-            <a:r>
-              <a:rPr lang="nl-NL" smtClean="0"/>
-              <a:t>zelfde</a:t>
-            </a:r>
-            <a:r>
-              <a:rPr lang="nl-NL" baseline="0" smtClean="0"/>
+              <a:t> volgt dan bestaat er ook 1 van zelfde</a:t>
+            </a:r>
+            <a:r>
+              <a:rPr lang="nl-NL" baseline="0" dirty="0" smtClean="0"/>
               <a:t> lengte dat uit Ca volgt.</a:t>
             </a:r>
-            <a:endParaRPr lang="nl-NL"/>
+            <a:endParaRPr lang="nl-NL" dirty="0"/>
           </a:p>
         </p:txBody>
       </p:sp>
@@ -1398,7 +1473,18 @@
           <a:p>
             <a:r>
               <a:rPr lang="nl-NL" dirty="0" smtClean="0"/>
-              <a:t>n = #</a:t>
+              <a:t>V</a:t>
+            </a:r>
+            <a:br>
+              <a:rPr lang="nl-NL" dirty="0" smtClean="0"/>
+            </a:br>
+            <a:r>
+              <a:rPr lang="nl-NL" dirty="0" smtClean="0"/>
+              <a:t>n </a:t>
+            </a:r>
+            <a:r>
+              <a:rPr lang="nl-NL" dirty="0" smtClean="0"/>
+              <a:t>= #</a:t>
             </a:r>
             <a:r>
               <a:rPr lang="nl-NL" baseline="0" dirty="0" smtClean="0"/>
@@ -1429,7 +1515,11 @@
             </a:r>
             <a:r>
               <a:rPr lang="nl-NL" baseline="0" dirty="0" smtClean="0"/>
-              <a:t>) =&gt; VOOR ALLE a != b</a:t>
+              <a:t>) =&gt; VOOR ALLE a != </a:t>
+            </a:r>
+            <a:r>
+              <a:rPr lang="nl-NL" baseline="0" dirty="0" smtClean="0"/>
+              <a:t>b</a:t>
             </a:r>
             <a:endParaRPr lang="nl-NL" dirty="0"/>
           </a:p>
@@ -1515,7 +1605,11 @@
           <a:bodyPr/>
           <a:lstStyle/>
           <a:p>
-            <a:endParaRPr lang="nl-NL"/>
+            <a:r>
+              <a:rPr lang="nl-NL" dirty="0" smtClean="0"/>
+              <a:t>V</a:t>
+            </a:r>
+            <a:endParaRPr lang="nl-NL" dirty="0"/>
           </a:p>
         </p:txBody>
       </p:sp>
@@ -1639,6 +1733,148 @@
 </p:notes>
 </file>
 
+<file path=ppt/notesSlides/notesSlide19.xml><?xml version="1.0" encoding="utf-8"?>
+<p:notes xmlns:a="http://schemas.openxmlformats.org/drawingml/2006/main" xmlns:r="http://schemas.openxmlformats.org/officeDocument/2006/relationships" xmlns:p="http://schemas.openxmlformats.org/presentationml/2006/main">
+  <p:cSld>
+    <p:spTree>
+      <p:nvGrpSpPr>
+        <p:cNvPr id="1" name=""/>
+        <p:cNvGrpSpPr/>
+        <p:nvPr/>
+      </p:nvGrpSpPr>
+      <p:grpSpPr>
+        <a:xfrm>
+          <a:off x="0" y="0"/>
+          <a:ext cx="0" cy="0"/>
+          <a:chOff x="0" y="0"/>
+          <a:chExt cx="0" cy="0"/>
+        </a:xfrm>
+      </p:grpSpPr>
+      <p:sp>
+        <p:nvSpPr>
+          <p:cNvPr id="2" name="Tijdelijke aanduiding voor dia-afbeelding 1"/>
+          <p:cNvSpPr>
+            <a:spLocks noGrp="1" noRot="1" noChangeAspect="1"/>
+          </p:cNvSpPr>
+          <p:nvPr>
+            <p:ph type="sldImg"/>
+          </p:nvPr>
+        </p:nvSpPr>
+        <p:spPr/>
+      </p:sp>
+      <p:sp>
+        <p:nvSpPr>
+          <p:cNvPr id="3" name="Tijdelijke aanduiding voor notities 2"/>
+          <p:cNvSpPr>
+            <a:spLocks noGrp="1"/>
+          </p:cNvSpPr>
+          <p:nvPr>
+            <p:ph type="body" idx="1"/>
+          </p:nvPr>
+        </p:nvSpPr>
+        <p:spPr/>
+        <p:txBody>
+          <a:bodyPr/>
+          <a:lstStyle/>
+          <a:p>
+            <a:r>
+              <a:rPr lang="nl-NL" dirty="0" smtClean="0"/>
+              <a:t>V</a:t>
+            </a:r>
+            <a:br>
+              <a:rPr lang="nl-NL" dirty="0" smtClean="0"/>
+            </a:br>
+            <a:r>
+              <a:rPr lang="nl-NL" dirty="0" smtClean="0"/>
+              <a:t>Parallel:</a:t>
+            </a:r>
+            <a:r>
+              <a:rPr lang="nl-NL" baseline="0" dirty="0" smtClean="0"/>
+              <a:t> </a:t>
+            </a:r>
+            <a:r>
+              <a:rPr lang="nl-NL" baseline="0" dirty="0" err="1" smtClean="0"/>
+              <a:t>generate</a:t>
+            </a:r>
+            <a:r>
+              <a:rPr lang="nl-NL" baseline="0" dirty="0" smtClean="0"/>
+              <a:t> + </a:t>
+            </a:r>
+            <a:r>
+              <a:rPr lang="nl-NL" baseline="0" dirty="0" err="1" smtClean="0"/>
+              <a:t>merge</a:t>
+            </a:r>
+            <a:r>
+              <a:rPr lang="nl-NL" baseline="0" dirty="0" smtClean="0"/>
+              <a:t>;</a:t>
+            </a:r>
+            <a:br>
+              <a:rPr lang="nl-NL" baseline="0" dirty="0" smtClean="0"/>
+            </a:br>
+            <a:r>
+              <a:rPr lang="nl-NL" baseline="0" dirty="0" smtClean="0"/>
+              <a:t>Parallel: prune = 1) </a:t>
+            </a:r>
+            <a:r>
+              <a:rPr lang="nl-NL" baseline="0" dirty="0" err="1" smtClean="0"/>
+              <a:t>Subsumes</a:t>
+            </a:r>
+            <a:r>
+              <a:rPr lang="nl-NL" baseline="0" dirty="0" smtClean="0"/>
+              <a:t> BINNEN set 2) </a:t>
+            </a:r>
+            <a:r>
+              <a:rPr lang="nl-NL" baseline="0" dirty="0" err="1" smtClean="0"/>
+              <a:t>Subsumes</a:t>
+            </a:r>
+            <a:r>
+              <a:rPr lang="nl-NL" baseline="0" dirty="0" smtClean="0"/>
+              <a:t> over Sets; + </a:t>
+            </a:r>
+            <a:r>
+              <a:rPr lang="nl-NL" baseline="0" dirty="0" err="1" smtClean="0"/>
+              <a:t>merge</a:t>
+            </a:r>
+            <a:endParaRPr lang="nl-NL" dirty="0"/>
+          </a:p>
+        </p:txBody>
+      </p:sp>
+      <p:sp>
+        <p:nvSpPr>
+          <p:cNvPr id="4" name="Tijdelijke aanduiding voor dianummer 3"/>
+          <p:cNvSpPr>
+            <a:spLocks noGrp="1"/>
+          </p:cNvSpPr>
+          <p:nvPr>
+            <p:ph type="sldNum" sz="quarter" idx="10"/>
+          </p:nvPr>
+        </p:nvSpPr>
+        <p:spPr/>
+        <p:txBody>
+          <a:bodyPr/>
+          <a:lstStyle/>
+          <a:p>
+            <a:fld id="{8787E021-A170-414E-8B92-16820204145C}" type="slidenum">
+              <a:rPr lang="nl-NL" smtClean="0"/>
+              <a:t>19</a:t>
+            </a:fld>
+            <a:endParaRPr lang="nl-NL"/>
+          </a:p>
+        </p:txBody>
+      </p:sp>
+    </p:spTree>
+    <p:extLst>
+      <p:ext uri="{BB962C8B-B14F-4D97-AF65-F5344CB8AC3E}">
+        <p14:creationId xmlns:p14="http://schemas.microsoft.com/office/powerpoint/2010/main" val="1696110007"/>
+      </p:ext>
+    </p:extLst>
+  </p:cSld>
+  <p:clrMapOvr>
+    <a:masterClrMapping/>
+  </p:clrMapOvr>
+</p:notes>
+</file>
+
 <file path=ppt/notesSlides/notesSlide2.xml><?xml version="1.0" encoding="utf-8"?>
 <p:notes xmlns:a="http://schemas.openxmlformats.org/drawingml/2006/main" xmlns:r="http://schemas.openxmlformats.org/officeDocument/2006/relationships" xmlns:p="http://schemas.openxmlformats.org/presentationml/2006/main">
   <p:cSld>
@@ -1683,7 +1919,11 @@
           <a:bodyPr/>
           <a:lstStyle/>
           <a:p>
-            <a:endParaRPr lang="nl-NL"/>
+            <a:r>
+              <a:rPr lang="nl-NL" dirty="0" smtClean="0"/>
+              <a:t>M</a:t>
+            </a:r>
+            <a:endParaRPr lang="nl-NL" dirty="0"/>
           </a:p>
         </p:txBody>
       </p:sp>
@@ -1714,6 +1954,306 @@
     <p:extLst>
       <p:ext uri="{BB962C8B-B14F-4D97-AF65-F5344CB8AC3E}">
         <p14:creationId xmlns:p14="http://schemas.microsoft.com/office/powerpoint/2010/main" val="601608008"/>
+      </p:ext>
+    </p:extLst>
+  </p:cSld>
+  <p:clrMapOvr>
+    <a:masterClrMapping/>
+  </p:clrMapOvr>
+</p:notes>
+</file>
+
+<file path=ppt/notesSlides/notesSlide20.xml><?xml version="1.0" encoding="utf-8"?>
+<p:notes xmlns:a="http://schemas.openxmlformats.org/drawingml/2006/main" xmlns:r="http://schemas.openxmlformats.org/officeDocument/2006/relationships" xmlns:p="http://schemas.openxmlformats.org/presentationml/2006/main">
+  <p:cSld>
+    <p:spTree>
+      <p:nvGrpSpPr>
+        <p:cNvPr id="1" name=""/>
+        <p:cNvGrpSpPr/>
+        <p:nvPr/>
+      </p:nvGrpSpPr>
+      <p:grpSpPr>
+        <a:xfrm>
+          <a:off x="0" y="0"/>
+          <a:ext cx="0" cy="0"/>
+          <a:chOff x="0" y="0"/>
+          <a:chExt cx="0" cy="0"/>
+        </a:xfrm>
+      </p:grpSpPr>
+      <p:sp>
+        <p:nvSpPr>
+          <p:cNvPr id="2" name="Tijdelijke aanduiding voor dia-afbeelding 1"/>
+          <p:cNvSpPr>
+            <a:spLocks noGrp="1" noRot="1" noChangeAspect="1"/>
+          </p:cNvSpPr>
+          <p:nvPr>
+            <p:ph type="sldImg"/>
+          </p:nvPr>
+        </p:nvSpPr>
+        <p:spPr/>
+      </p:sp>
+      <p:sp>
+        <p:nvSpPr>
+          <p:cNvPr id="3" name="Tijdelijke aanduiding voor notities 2"/>
+          <p:cNvSpPr>
+            <a:spLocks noGrp="1"/>
+          </p:cNvSpPr>
+          <p:nvPr>
+            <p:ph type="body" idx="1"/>
+          </p:nvPr>
+        </p:nvSpPr>
+        <p:spPr/>
+        <p:txBody>
+          <a:bodyPr/>
+          <a:lstStyle/>
+          <a:p>
+            <a:r>
+              <a:rPr lang="nl-NL" dirty="0" smtClean="0"/>
+              <a:t>M</a:t>
+            </a:r>
+            <a:endParaRPr lang="nl-NL" dirty="0"/>
+          </a:p>
+        </p:txBody>
+      </p:sp>
+      <p:sp>
+        <p:nvSpPr>
+          <p:cNvPr id="4" name="Tijdelijke aanduiding voor dianummer 3"/>
+          <p:cNvSpPr>
+            <a:spLocks noGrp="1"/>
+          </p:cNvSpPr>
+          <p:nvPr>
+            <p:ph type="sldNum" sz="quarter" idx="10"/>
+          </p:nvPr>
+        </p:nvSpPr>
+        <p:spPr/>
+        <p:txBody>
+          <a:bodyPr/>
+          <a:lstStyle/>
+          <a:p>
+            <a:fld id="{8787E021-A170-414E-8B92-16820204145C}" type="slidenum">
+              <a:rPr lang="nl-NL" smtClean="0"/>
+              <a:t>20</a:t>
+            </a:fld>
+            <a:endParaRPr lang="nl-NL"/>
+          </a:p>
+        </p:txBody>
+      </p:sp>
+    </p:spTree>
+    <p:extLst>
+      <p:ext uri="{BB962C8B-B14F-4D97-AF65-F5344CB8AC3E}">
+        <p14:creationId xmlns:p14="http://schemas.microsoft.com/office/powerpoint/2010/main" val="1022905567"/>
+      </p:ext>
+    </p:extLst>
+  </p:cSld>
+  <p:clrMapOvr>
+    <a:masterClrMapping/>
+  </p:clrMapOvr>
+</p:notes>
+</file>
+
+<file path=ppt/notesSlides/notesSlide21.xml><?xml version="1.0" encoding="utf-8"?>
+<p:notes xmlns:a="http://schemas.openxmlformats.org/drawingml/2006/main" xmlns:r="http://schemas.openxmlformats.org/officeDocument/2006/relationships" xmlns:p="http://schemas.openxmlformats.org/presentationml/2006/main">
+  <p:cSld>
+    <p:spTree>
+      <p:nvGrpSpPr>
+        <p:cNvPr id="1" name=""/>
+        <p:cNvGrpSpPr/>
+        <p:nvPr/>
+      </p:nvGrpSpPr>
+      <p:grpSpPr>
+        <a:xfrm>
+          <a:off x="0" y="0"/>
+          <a:ext cx="0" cy="0"/>
+          <a:chOff x="0" y="0"/>
+          <a:chExt cx="0" cy="0"/>
+        </a:xfrm>
+      </p:grpSpPr>
+      <p:sp>
+        <p:nvSpPr>
+          <p:cNvPr id="2" name="Tijdelijke aanduiding voor dia-afbeelding 1"/>
+          <p:cNvSpPr>
+            <a:spLocks noGrp="1" noRot="1" noChangeAspect="1"/>
+          </p:cNvSpPr>
+          <p:nvPr>
+            <p:ph type="sldImg"/>
+          </p:nvPr>
+        </p:nvSpPr>
+        <p:spPr/>
+      </p:sp>
+      <p:sp>
+        <p:nvSpPr>
+          <p:cNvPr id="3" name="Tijdelijke aanduiding voor notities 2"/>
+          <p:cNvSpPr>
+            <a:spLocks noGrp="1"/>
+          </p:cNvSpPr>
+          <p:nvPr>
+            <p:ph type="body" idx="1"/>
+          </p:nvPr>
+        </p:nvSpPr>
+        <p:spPr/>
+        <p:txBody>
+          <a:bodyPr/>
+          <a:lstStyle/>
+          <a:p>
+            <a:r>
+              <a:rPr lang="nl-NL" dirty="0" smtClean="0"/>
+              <a:t>M</a:t>
+            </a:r>
+          </a:p>
+          <a:p>
+            <a:r>
+              <a:rPr lang="nl-NL" dirty="0" smtClean="0"/>
+              <a:t>Ons</a:t>
+            </a:r>
+            <a:r>
+              <a:rPr lang="nl-NL" baseline="0" dirty="0" smtClean="0"/>
+              <a:t> probleem in het kort is dus eigenlijk: Wat is het minimum aantal </a:t>
+            </a:r>
+            <a:r>
+              <a:rPr lang="nl-NL" baseline="0" dirty="0" err="1" smtClean="0"/>
+              <a:t>comparators</a:t>
+            </a:r>
+            <a:r>
+              <a:rPr lang="nl-NL" baseline="0" dirty="0" smtClean="0"/>
+              <a:t> bij een </a:t>
+            </a:r>
+            <a:r>
+              <a:rPr lang="nl-NL" baseline="0" dirty="0" err="1" smtClean="0"/>
+              <a:t>sorteernetwork</a:t>
+            </a:r>
+            <a:r>
+              <a:rPr lang="nl-NL" baseline="0" dirty="0" smtClean="0"/>
+              <a:t> van 11 </a:t>
+            </a:r>
+            <a:r>
+              <a:rPr lang="nl-NL" baseline="0" dirty="0" err="1" smtClean="0"/>
+              <a:t>kanelen</a:t>
+            </a:r>
+            <a:r>
+              <a:rPr lang="nl-NL" baseline="0" dirty="0" smtClean="0"/>
+              <a:t>?</a:t>
+            </a:r>
+            <a:endParaRPr lang="nl-NL" dirty="0"/>
+          </a:p>
+        </p:txBody>
+      </p:sp>
+      <p:sp>
+        <p:nvSpPr>
+          <p:cNvPr id="4" name="Tijdelijke aanduiding voor dianummer 3"/>
+          <p:cNvSpPr>
+            <a:spLocks noGrp="1"/>
+          </p:cNvSpPr>
+          <p:nvPr>
+            <p:ph type="sldNum" sz="quarter" idx="10"/>
+          </p:nvPr>
+        </p:nvSpPr>
+        <p:spPr/>
+        <p:txBody>
+          <a:bodyPr/>
+          <a:lstStyle/>
+          <a:p>
+            <a:fld id="{8787E021-A170-414E-8B92-16820204145C}" type="slidenum">
+              <a:rPr lang="nl-NL" smtClean="0"/>
+              <a:t>21</a:t>
+            </a:fld>
+            <a:endParaRPr lang="nl-NL"/>
+          </a:p>
+        </p:txBody>
+      </p:sp>
+    </p:spTree>
+    <p:extLst>
+      <p:ext uri="{BB962C8B-B14F-4D97-AF65-F5344CB8AC3E}">
+        <p14:creationId xmlns:p14="http://schemas.microsoft.com/office/powerpoint/2010/main" val="27870416"/>
+      </p:ext>
+    </p:extLst>
+  </p:cSld>
+  <p:clrMapOvr>
+    <a:masterClrMapping/>
+  </p:clrMapOvr>
+</p:notes>
+</file>
+
+<file path=ppt/notesSlides/notesSlide22.xml><?xml version="1.0" encoding="utf-8"?>
+<p:notes xmlns:a="http://schemas.openxmlformats.org/drawingml/2006/main" xmlns:r="http://schemas.openxmlformats.org/officeDocument/2006/relationships" xmlns:p="http://schemas.openxmlformats.org/presentationml/2006/main">
+  <p:cSld>
+    <p:spTree>
+      <p:nvGrpSpPr>
+        <p:cNvPr id="1" name=""/>
+        <p:cNvGrpSpPr/>
+        <p:nvPr/>
+      </p:nvGrpSpPr>
+      <p:grpSpPr>
+        <a:xfrm>
+          <a:off x="0" y="0"/>
+          <a:ext cx="0" cy="0"/>
+          <a:chOff x="0" y="0"/>
+          <a:chExt cx="0" cy="0"/>
+        </a:xfrm>
+      </p:grpSpPr>
+      <p:sp>
+        <p:nvSpPr>
+          <p:cNvPr id="2" name="Tijdelijke aanduiding voor dia-afbeelding 1"/>
+          <p:cNvSpPr>
+            <a:spLocks noGrp="1" noRot="1" noChangeAspect="1"/>
+          </p:cNvSpPr>
+          <p:nvPr>
+            <p:ph type="sldImg"/>
+          </p:nvPr>
+        </p:nvSpPr>
+        <p:spPr/>
+      </p:sp>
+      <p:sp>
+        <p:nvSpPr>
+          <p:cNvPr id="3" name="Tijdelijke aanduiding voor notities 2"/>
+          <p:cNvSpPr>
+            <a:spLocks noGrp="1"/>
+          </p:cNvSpPr>
+          <p:nvPr>
+            <p:ph type="body" idx="1"/>
+          </p:nvPr>
+        </p:nvSpPr>
+        <p:spPr/>
+        <p:txBody>
+          <a:bodyPr/>
+          <a:lstStyle/>
+          <a:p>
+            <a:r>
+              <a:rPr lang="nl-NL" dirty="0" smtClean="0"/>
+              <a:t>M</a:t>
+            </a:r>
+          </a:p>
+          <a:p>
+            <a:endParaRPr lang="nl-NL" dirty="0"/>
+          </a:p>
+        </p:txBody>
+      </p:sp>
+      <p:sp>
+        <p:nvSpPr>
+          <p:cNvPr id="4" name="Tijdelijke aanduiding voor dianummer 3"/>
+          <p:cNvSpPr>
+            <a:spLocks noGrp="1"/>
+          </p:cNvSpPr>
+          <p:nvPr>
+            <p:ph type="sldNum" sz="quarter" idx="10"/>
+          </p:nvPr>
+        </p:nvSpPr>
+        <p:spPr/>
+        <p:txBody>
+          <a:bodyPr/>
+          <a:lstStyle/>
+          <a:p>
+            <a:fld id="{8787E021-A170-414E-8B92-16820204145C}" type="slidenum">
+              <a:rPr lang="nl-NL" smtClean="0"/>
+              <a:t>22</a:t>
+            </a:fld>
+            <a:endParaRPr lang="nl-NL"/>
+          </a:p>
+        </p:txBody>
+      </p:sp>
+    </p:spTree>
+    <p:extLst>
+      <p:ext uri="{BB962C8B-B14F-4D97-AF65-F5344CB8AC3E}">
+        <p14:creationId xmlns:p14="http://schemas.microsoft.com/office/powerpoint/2010/main" val="1692200381"/>
       </p:ext>
     </p:extLst>
   </p:cSld>
@@ -1769,13 +2309,32 @@
           <a:p>
             <a:r>
               <a:rPr lang="nl-BE" dirty="0" smtClean="0"/>
-              <a:t>i</a:t>
+              <a:t>M</a:t>
+            </a:r>
+            <a:br>
+              <a:rPr lang="nl-BE" dirty="0" smtClean="0"/>
+            </a:br>
+            <a:r>
+              <a:rPr lang="nl-BE" dirty="0" smtClean="0"/>
+              <a:t>Layer</a:t>
             </a:r>
             <a:r>
               <a:rPr lang="nl-BE" baseline="0" dirty="0" smtClean="0"/>
-              <a:t> &lt; j vermelden!</a:t>
-            </a:r>
-            <a:endParaRPr lang="nl-BE" dirty="0"/>
+              <a:t> vermelden! (parallel uitgevoerd)</a:t>
+            </a:r>
+          </a:p>
+          <a:p>
+            <a:r>
+              <a:rPr lang="nl-BE" dirty="0" smtClean="0"/>
+              <a:t>w(</a:t>
+            </a:r>
+            <a:r>
+              <a:rPr lang="nl-BE" baseline="0" dirty="0" smtClean="0"/>
+              <a:t> ) uitleggen</a:t>
+            </a:r>
+          </a:p>
+          <a:p>
+            <a:endParaRPr lang="nl-BE" baseline="0" dirty="0" smtClean="0"/>
           </a:p>
         </p:txBody>
       </p:sp>
@@ -1859,7 +2418,11 @@
           <a:bodyPr/>
           <a:lstStyle/>
           <a:p>
-            <a:endParaRPr lang="nl-NL"/>
+            <a:r>
+              <a:rPr lang="nl-NL" dirty="0" smtClean="0"/>
+              <a:t>M</a:t>
+            </a:r>
+            <a:endParaRPr lang="nl-NL" dirty="0"/>
           </a:p>
         </p:txBody>
       </p:sp>
@@ -1943,7 +2506,11 @@
           <a:bodyPr/>
           <a:lstStyle/>
           <a:p>
-            <a:endParaRPr lang="nl-NL"/>
+            <a:r>
+              <a:rPr lang="nl-NL" dirty="0" smtClean="0"/>
+              <a:t>V</a:t>
+            </a:r>
+            <a:endParaRPr lang="nl-NL" dirty="0"/>
           </a:p>
         </p:txBody>
       </p:sp>
@@ -2027,7 +2594,11 @@
           <a:bodyPr/>
           <a:lstStyle/>
           <a:p>
-            <a:endParaRPr lang="nl-NL"/>
+            <a:r>
+              <a:rPr lang="nl-NL" dirty="0" smtClean="0"/>
+              <a:t>V</a:t>
+            </a:r>
+            <a:endParaRPr lang="nl-NL" dirty="0"/>
           </a:p>
         </p:txBody>
       </p:sp>
@@ -2279,7 +2850,11 @@
           <a:bodyPr/>
           <a:lstStyle/>
           <a:p>
-            <a:endParaRPr lang="nl-NL"/>
+            <a:r>
+              <a:rPr lang="nl-NL" dirty="0" smtClean="0"/>
+              <a:t>V</a:t>
+            </a:r>
+            <a:endParaRPr lang="nl-NL" dirty="0"/>
           </a:p>
         </p:txBody>
       </p:sp>
@@ -8466,6 +9041,7 @@
               <a:rPr lang="nl-NL" dirty="0" smtClean="0"/>
               <a:t>n⎤</a:t>
             </a:r>
+            <a:endParaRPr lang="nl-NL" dirty="0" smtClean="0"/>
           </a:p>
         </p:txBody>
       </p:sp>
@@ -9322,6 +9898,105 @@
           </a:graphicData>
         </a:graphic>
       </p:graphicFrame>
+      <p:sp>
+        <p:nvSpPr>
+          <p:cNvPr id="7" name="Tijdelijke aanduiding voor voettekst 6"/>
+          <p:cNvSpPr>
+            <a:spLocks noGrp="1"/>
+          </p:cNvSpPr>
+          <p:nvPr>
+            <p:ph type="ftr" sz="quarter" idx="11"/>
+          </p:nvPr>
+        </p:nvSpPr>
+        <p:spPr>
+          <a:xfrm>
+            <a:off x="3972227" y="6248400"/>
+            <a:ext cx="4790773" cy="365125"/>
+          </a:xfrm>
+        </p:spPr>
+        <p:txBody>
+          <a:bodyPr/>
+          <a:lstStyle/>
+          <a:p>
+            <a:r>
+              <a:rPr lang="nl-NL" dirty="0" smtClean="0"/>
+              <a:t>[3] </a:t>
+            </a:r>
+            <a:r>
+              <a:rPr lang="nl-NL" dirty="0" err="1" smtClean="0"/>
+              <a:t>Bounds</a:t>
+            </a:r>
+            <a:r>
+              <a:rPr lang="nl-NL" dirty="0" smtClean="0"/>
+              <a:t> on the </a:t>
+            </a:r>
+            <a:r>
+              <a:rPr lang="nl-NL" dirty="0" err="1" smtClean="0"/>
+              <a:t>size</a:t>
+            </a:r>
+            <a:r>
+              <a:rPr lang="nl-NL" dirty="0" smtClean="0"/>
+              <a:t> of test sets </a:t>
+            </a:r>
+            <a:r>
+              <a:rPr lang="nl-NL" dirty="0" err="1" smtClean="0"/>
+              <a:t>for</a:t>
+            </a:r>
+            <a:r>
+              <a:rPr lang="nl-NL" dirty="0" smtClean="0"/>
+              <a:t> </a:t>
+            </a:r>
+            <a:r>
+              <a:rPr lang="nl-NL" dirty="0" err="1" smtClean="0"/>
+              <a:t>sorting</a:t>
+            </a:r>
+            <a:r>
+              <a:rPr lang="nl-NL" dirty="0" smtClean="0"/>
+              <a:t> </a:t>
+            </a:r>
+            <a:r>
+              <a:rPr lang="nl-NL" dirty="0" err="1" smtClean="0"/>
+              <a:t>and</a:t>
+            </a:r>
+            <a:r>
+              <a:rPr lang="nl-NL" dirty="0" smtClean="0"/>
+              <a:t> </a:t>
+            </a:r>
+            <a:r>
+              <a:rPr lang="nl-NL" dirty="0" err="1" smtClean="0"/>
+              <a:t>related</a:t>
+            </a:r>
+            <a:r>
+              <a:rPr lang="nl-NL" dirty="0" smtClean="0"/>
+              <a:t> </a:t>
+            </a:r>
+            <a:r>
+              <a:rPr lang="nl-NL" dirty="0" err="1" smtClean="0"/>
+              <a:t>networks</a:t>
+            </a:r>
+            <a:r>
+              <a:rPr lang="nl-NL" dirty="0" smtClean="0"/>
+              <a:t/>
+            </a:r>
+            <a:br>
+              <a:rPr lang="nl-NL" dirty="0" smtClean="0"/>
+            </a:br>
+            <a:r>
+              <a:rPr lang="nl-NL" dirty="0" smtClean="0"/>
+              <a:t>M</a:t>
+            </a:r>
+            <a:r>
+              <a:rPr lang="nl-NL" dirty="0"/>
+              <a:t>. J. Chung, B. </a:t>
+            </a:r>
+            <a:r>
+              <a:rPr lang="nl-NL" dirty="0" err="1"/>
+              <a:t>Ravikumar</a:t>
+            </a:r>
+            <a:endParaRPr lang="nl-NL" dirty="0"/>
+          </a:p>
+        </p:txBody>
+      </p:sp>
     </p:spTree>
     <p:extLst>
       <p:ext uri="{BB962C8B-B14F-4D97-AF65-F5344CB8AC3E}">
@@ -9586,7 +10261,7 @@
 </file>
 
 <file path=ppt/slides/slide14.xml><?xml version="1.0" encoding="utf-8"?>
-<p:sld xmlns:a="http://schemas.openxmlformats.org/drawingml/2006/main" xmlns:r="http://schemas.openxmlformats.org/officeDocument/2006/relationships" xmlns:p="http://schemas.openxmlformats.org/presentationml/2006/main">
+<p:sld xmlns:a="http://schemas.openxmlformats.org/drawingml/2006/main" xmlns:r="http://schemas.openxmlformats.org/officeDocument/2006/relationships" xmlns:p="http://schemas.openxmlformats.org/presentationml/2006/main" show="0">
   <p:cSld>
     <p:spTree>
       <p:nvGrpSpPr>
@@ -9917,13 +10592,13 @@
   <p:clrMapOvr>
     <a:masterClrMapping/>
   </p:clrMapOvr>
-  <mc:AlternateContent xmlns:mc="http://schemas.openxmlformats.org/markup-compatibility/2006" xmlns:p14="http://schemas.microsoft.com/office/powerpoint/2010/main">
-    <mc:Choice Requires="p14">
+  <mc:AlternateContent xmlns:mc="http://schemas.openxmlformats.org/markup-compatibility/2006">
+    <mc:Choice xmlns:p14="http://schemas.microsoft.com/office/powerpoint/2010/main" Requires="p14">
       <p:transition spd="med" p14:dur="700">
         <p:fade/>
       </p:transition>
     </mc:Choice>
-    <mc:Fallback xmlns="">
+    <mc:Fallback>
       <p:transition xmlns:p14="http://schemas.microsoft.com/office/powerpoint/2010/main" spd="med">
         <p:fade/>
       </p:transition>
@@ -9972,8 +10647,16 @@
           <a:lstStyle/>
           <a:p>
             <a:r>
+              <a:rPr lang="nl-NL" dirty="0" smtClean="0"/>
+              <a:t>Concept </a:t>
+            </a:r>
+            <a:r>
+              <a:rPr lang="nl-NL" dirty="0" err="1"/>
+              <a:t>s</a:t>
+            </a:r>
+            <a:r>
               <a:rPr lang="nl-NL" dirty="0" err="1" smtClean="0"/>
-              <a:t>Subsumes</a:t>
+              <a:t>ubsumes</a:t>
             </a:r>
             <a:endParaRPr lang="nl-NL" dirty="0"/>
           </a:p>
@@ -10800,13 +11483,8 @@
             </a:r>
             <a:r>
               <a:rPr lang="nl-NL" i="1" baseline="-25000" dirty="0" smtClean="0"/>
-              <a:t>k+</a:t>
-            </a:r>
-            <a:r>
-              <a:rPr lang="nl-NL" i="1" baseline="-25000" dirty="0" smtClean="0"/>
-              <a:t>1 </a:t>
-            </a:r>
-            <a:endParaRPr lang="nl-NL" i="1" baseline="-25000" dirty="0" smtClean="0"/>
+              <a:t>k+1 </a:t>
+            </a:r>
           </a:p>
           <a:p>
             <a:pPr marL="457200" indent="-457200">
@@ -10815,8 +11493,29 @@
             </a:pPr>
             <a:r>
               <a:rPr lang="nl-NL" dirty="0" smtClean="0"/>
-              <a:t>Herhaal het proces</a:t>
-            </a:r>
+              <a:t>Herhaal het </a:t>
+            </a:r>
+            <a:r>
+              <a:rPr lang="nl-NL" dirty="0" smtClean="0"/>
+              <a:t>proces tot |</a:t>
+            </a:r>
+            <a:r>
+              <a:rPr lang="nl-NL" dirty="0" err="1" smtClean="0"/>
+              <a:t>N</a:t>
+            </a:r>
+            <a:r>
+              <a:rPr lang="nl-NL" baseline="30000" dirty="0" err="1" smtClean="0"/>
+              <a:t>n</a:t>
+            </a:r>
+            <a:r>
+              <a:rPr lang="nl-NL" baseline="-25000" dirty="0" err="1"/>
+              <a:t>c</a:t>
+            </a:r>
+            <a:r>
+              <a:rPr lang="nl-NL" dirty="0" smtClean="0"/>
+              <a:t>| = 1</a:t>
+            </a:r>
+            <a:endParaRPr lang="nl-NL" dirty="0" smtClean="0"/>
           </a:p>
           <a:p>
             <a:endParaRPr lang="nl-NL" dirty="0"/>
@@ -11051,7 +11750,7 @@
 </file>
 
 <file path=ppt/slides/slide18.xml><?xml version="1.0" encoding="utf-8"?>
-<p:sld xmlns:a="http://schemas.openxmlformats.org/drawingml/2006/main" xmlns:r="http://schemas.openxmlformats.org/officeDocument/2006/relationships" xmlns:p="http://schemas.openxmlformats.org/presentationml/2006/main">
+<p:sld xmlns:a="http://schemas.openxmlformats.org/drawingml/2006/main" xmlns:r="http://schemas.openxmlformats.org/officeDocument/2006/relationships" xmlns:p="http://schemas.openxmlformats.org/presentationml/2006/main" show="0">
   <p:cSld>
     <p:spTree>
       <p:nvGrpSpPr>
@@ -11244,13 +11943,13 @@
   <p:clrMapOvr>
     <a:masterClrMapping/>
   </p:clrMapOvr>
-  <mc:AlternateContent xmlns:mc="http://schemas.openxmlformats.org/markup-compatibility/2006" xmlns:p14="http://schemas.microsoft.com/office/powerpoint/2010/main">
-    <mc:Choice Requires="p14">
+  <mc:AlternateContent xmlns:mc="http://schemas.openxmlformats.org/markup-compatibility/2006">
+    <mc:Choice xmlns:p14="http://schemas.microsoft.com/office/powerpoint/2010/main" Requires="p14">
       <p:transition spd="med" p14:dur="700">
         <p:fade/>
       </p:transition>
     </mc:Choice>
-    <mc:Fallback xmlns="">
+    <mc:Fallback>
       <p:transition xmlns:p14="http://schemas.microsoft.com/office/powerpoint/2010/main" spd="med">
         <p:fade/>
       </p:transition>
@@ -11299,8 +11998,12 @@
           <a:lstStyle/>
           <a:p>
             <a:r>
-              <a:rPr lang="nl-NL" dirty="0" smtClean="0"/>
-              <a:t>Papers</a:t>
+              <a:rPr lang="nl-NL" dirty="0" err="1" smtClean="0"/>
+              <a:t>Generate</a:t>
+            </a:r>
+            <a:r>
+              <a:rPr lang="nl-NL" dirty="0" smtClean="0"/>
+              <a:t> &amp; prune</a:t>
             </a:r>
             <a:endParaRPr lang="nl-NL" dirty="0"/>
           </a:p>
@@ -11321,150 +12024,132 @@
           <a:bodyPr/>
           <a:lstStyle/>
           <a:p>
-            <a:r>
-              <a:rPr lang="nl-NL" b="1" dirty="0" err="1" smtClean="0"/>
-              <a:t>Twenty</a:t>
-            </a:r>
-            <a:r>
-              <a:rPr lang="nl-NL" b="1" dirty="0" smtClean="0"/>
-              <a:t>-Five </a:t>
-            </a:r>
-            <a:r>
-              <a:rPr lang="nl-NL" b="1" dirty="0" err="1" smtClean="0"/>
-              <a:t>Comparators</a:t>
-            </a:r>
-            <a:r>
-              <a:rPr lang="nl-NL" b="1" dirty="0" smtClean="0"/>
-              <a:t> is </a:t>
-            </a:r>
-            <a:r>
-              <a:rPr lang="nl-NL" b="1" dirty="0" err="1" smtClean="0"/>
-              <a:t>Optimal</a:t>
-            </a:r>
-            <a:r>
-              <a:rPr lang="nl-NL" b="1" dirty="0" smtClean="0"/>
+            <a:pPr marL="0" indent="0">
+              <a:buNone/>
+            </a:pPr>
+            <a:r>
+              <a:rPr lang="nl-NL" dirty="0" err="1" smtClean="0"/>
+              <a:t>Subsumes</a:t>
+            </a:r>
+            <a:r>
+              <a:rPr lang="nl-NL" dirty="0" smtClean="0"/>
+              <a:t> = dure operatie ⇒ extra prune methodes</a:t>
+            </a:r>
+            <a:br>
+              <a:rPr lang="nl-NL" dirty="0" smtClean="0"/>
+            </a:br>
+            <a:r>
+              <a:rPr lang="nl-NL" dirty="0" smtClean="0"/>
               <a:t> </a:t>
             </a:r>
-            <a:r>
-              <a:rPr lang="nl-NL" b="1" dirty="0" err="1" smtClean="0"/>
-              <a:t>when</a:t>
-            </a:r>
-            <a:r>
-              <a:rPr lang="nl-NL" b="1" dirty="0" smtClean="0"/>
-              <a:t> </a:t>
-            </a:r>
-            <a:r>
-              <a:rPr lang="nl-NL" b="1" dirty="0" err="1" smtClean="0"/>
-              <a:t>Sorting</a:t>
-            </a:r>
-            <a:r>
-              <a:rPr lang="nl-NL" b="1" dirty="0" smtClean="0"/>
-              <a:t> </a:t>
-            </a:r>
-            <a:r>
-              <a:rPr lang="nl-NL" b="1" dirty="0" err="1" smtClean="0"/>
-              <a:t>Nine</a:t>
-            </a:r>
-            <a:r>
-              <a:rPr lang="nl-NL" b="1" dirty="0" smtClean="0"/>
-              <a:t> </a:t>
-            </a:r>
-            <a:r>
-              <a:rPr lang="nl-NL" b="1" dirty="0" err="1" smtClean="0"/>
-              <a:t>Inputs</a:t>
-            </a:r>
-            <a:r>
-              <a:rPr lang="nl-NL" b="1" dirty="0" smtClean="0"/>
-              <a:t> (</a:t>
-            </a:r>
-            <a:r>
-              <a:rPr lang="nl-NL" b="1" dirty="0" err="1" smtClean="0"/>
-              <a:t>and</a:t>
-            </a:r>
-            <a:r>
-              <a:rPr lang="nl-NL" b="1" dirty="0" smtClean="0"/>
-              <a:t> </a:t>
-            </a:r>
-            <a:r>
-              <a:rPr lang="nl-NL" b="1" dirty="0" err="1" smtClean="0"/>
-              <a:t>Twenty-Nine</a:t>
-            </a:r>
-            <a:r>
-              <a:rPr lang="nl-NL" b="1" dirty="0" smtClean="0"/>
-              <a:t> </a:t>
-            </a:r>
-            <a:r>
-              <a:rPr lang="nl-NL" b="1" dirty="0" err="1" smtClean="0"/>
-              <a:t>for</a:t>
-            </a:r>
-            <a:r>
-              <a:rPr lang="nl-NL" b="1" dirty="0" smtClean="0"/>
-              <a:t> Ten)</a:t>
-            </a:r>
-            <a:r>
-              <a:rPr lang="nl-NL" dirty="0" smtClean="0"/>
-              <a:t>, M. </a:t>
+          </a:p>
+          <a:p>
+            <a:pPr lvl="1">
+              <a:lnSpc>
+                <a:spcPct val="70000"/>
+              </a:lnSpc>
+            </a:pPr>
+            <a:r>
+              <a:rPr lang="nl-NL" dirty="0" smtClean="0"/>
+              <a:t>Contradicties bij </a:t>
             </a:r>
             <a:r>
               <a:rPr lang="nl-NL" dirty="0" err="1" smtClean="0"/>
-              <a:t>Codish</a:t>
-            </a:r>
-            <a:r>
-              <a:rPr lang="nl-NL" dirty="0" smtClean="0"/>
-              <a:t>, L. Cruz-</a:t>
+              <a:t>subsumes</a:t>
+            </a:r>
+            <a:r>
+              <a:rPr lang="nl-NL" dirty="0" smtClean="0"/>
+              <a:t/>
+            </a:r>
+            <a:br>
+              <a:rPr lang="nl-NL" dirty="0" smtClean="0"/>
+            </a:br>
+            <a:endParaRPr lang="nl-NL" dirty="0"/>
+          </a:p>
+          <a:p>
+            <a:pPr lvl="1">
+              <a:lnSpc>
+                <a:spcPct val="70000"/>
+              </a:lnSpc>
+            </a:pPr>
+            <a:r>
+              <a:rPr lang="nl-NL" dirty="0" smtClean="0"/>
+              <a:t>Verwijderen overbodige </a:t>
             </a:r>
             <a:r>
               <a:rPr lang="nl-NL" dirty="0" err="1" smtClean="0"/>
-              <a:t>Filipe</a:t>
-            </a:r>
-            <a:r>
-              <a:rPr lang="nl-NL" dirty="0" smtClean="0"/>
-              <a:t>, M. Frank, P. Schneider-Kamp, 24 juni 2014.</a:t>
-            </a:r>
-          </a:p>
-          <a:p>
-            <a:r>
-              <a:rPr lang="nl-NL" b="1" dirty="0" err="1" smtClean="0"/>
-              <a:t>Sorting</a:t>
-            </a:r>
-            <a:r>
-              <a:rPr lang="nl-NL" b="1" dirty="0" smtClean="0"/>
-              <a:t> Networks </a:t>
-            </a:r>
-            <a:r>
-              <a:rPr lang="nl-NL" b="1" dirty="0" err="1" smtClean="0"/>
-              <a:t>and</a:t>
-            </a:r>
-            <a:r>
-              <a:rPr lang="nl-NL" b="1" dirty="0" smtClean="0"/>
-              <a:t> </a:t>
-            </a:r>
-            <a:r>
-              <a:rPr lang="nl-NL" b="1" dirty="0" err="1" smtClean="0"/>
-              <a:t>Their</a:t>
-            </a:r>
-            <a:r>
-              <a:rPr lang="nl-NL" b="1" dirty="0" smtClean="0"/>
-              <a:t> Applications</a:t>
-            </a:r>
-            <a:r>
-              <a:rPr lang="nl-NL" dirty="0" smtClean="0"/>
-              <a:t>, </a:t>
-            </a:r>
+              <a:t>comparators</a:t>
+            </a:r>
+            <a:r>
+              <a:rPr lang="nl-NL" dirty="0" smtClean="0"/>
+              <a:t> (i j) :</a:t>
+            </a:r>
+            <a:br>
+              <a:rPr lang="nl-NL" dirty="0" smtClean="0"/>
+            </a:br>
+            <a:r>
+              <a:rPr lang="nl-NL" dirty="0" smtClean="0"/>
+              <a:t>∀</a:t>
+            </a:r>
+            <a:r>
+              <a:rPr lang="nl-NL" dirty="0" err="1" smtClean="0"/>
+              <a:t>outputs</a:t>
+            </a:r>
+            <a:r>
+              <a:rPr lang="nl-NL" dirty="0" smtClean="0"/>
+              <a:t>(C) : x</a:t>
+            </a:r>
+            <a:r>
+              <a:rPr lang="nl-NL" baseline="-25000" dirty="0" smtClean="0"/>
+              <a:t>i</a:t>
+            </a:r>
+            <a:r>
+              <a:rPr lang="nl-NL" dirty="0" smtClean="0"/>
+              <a:t> ≤ </a:t>
+            </a:r>
+            <a:r>
+              <a:rPr lang="nl-NL" dirty="0" err="1" smtClean="0"/>
+              <a:t>x</a:t>
+            </a:r>
+            <a:r>
+              <a:rPr lang="nl-NL" baseline="-25000" dirty="0" err="1" smtClean="0"/>
+              <a:t>j</a:t>
+            </a:r>
+            <a:r>
+              <a:rPr lang="nl-NL" baseline="-25000" dirty="0" smtClean="0"/>
+              <a:t/>
+            </a:r>
+            <a:br>
+              <a:rPr lang="nl-NL" baseline="-25000" dirty="0" smtClean="0"/>
+            </a:br>
             <a:endParaRPr lang="nl-NL" dirty="0"/>
+          </a:p>
+          <a:p>
+            <a:pPr lvl="1"/>
+            <a:r>
+              <a:rPr lang="nl-NL" dirty="0" smtClean="0"/>
+              <a:t>Parallel uitvoeren</a:t>
+            </a:r>
           </a:p>
         </p:txBody>
       </p:sp>
     </p:spTree>
     <p:extLst>
       <p:ext uri="{BB962C8B-B14F-4D97-AF65-F5344CB8AC3E}">
-        <p14:creationId xmlns:p14="http://schemas.microsoft.com/office/powerpoint/2010/main" val="3644345602"/>
+        <p14:creationId xmlns:p14="http://schemas.microsoft.com/office/powerpoint/2010/main" val="1458489023"/>
       </p:ext>
     </p:extLst>
   </p:cSld>
   <p:clrMapOvr>
     <a:masterClrMapping/>
   </p:clrMapOvr>
+  <p:timing>
+    <p:tnLst>
+      <p:par>
+        <p:cTn xmlns:p14="http://schemas.microsoft.com/office/powerpoint/2010/main" id="1" dur="indefinite" restart="never" nodeType="tmRoot"/>
+      </p:par>
+    </p:tnLst>
+  </p:timing>
 </p:sld>
 </file>
 
@@ -11518,12 +12203,126 @@
             <p:ph idx="1"/>
           </p:nvPr>
         </p:nvSpPr>
-        <p:spPr/>
-        <p:txBody>
-          <a:bodyPr/>
+        <p:spPr>
+          <a:xfrm>
+            <a:off x="779463" y="1949824"/>
+            <a:ext cx="7583488" cy="4667084"/>
+          </a:xfrm>
+        </p:spPr>
+        <p:txBody>
+          <a:bodyPr>
+            <a:normAutofit/>
+          </a:bodyPr>
           <a:lstStyle/>
           <a:p>
-            <a:endParaRPr lang="nl-NL"/>
+            <a:r>
+              <a:rPr lang="nl-NL" dirty="0" smtClean="0"/>
+              <a:t>Wat is een </a:t>
+            </a:r>
+            <a:r>
+              <a:rPr lang="nl-NL" dirty="0" err="1" smtClean="0"/>
+              <a:t>comparator</a:t>
+            </a:r>
+            <a:r>
+              <a:rPr lang="nl-NL" dirty="0" smtClean="0"/>
+              <a:t> </a:t>
+            </a:r>
+            <a:r>
+              <a:rPr lang="nl-NL" dirty="0" err="1" smtClean="0"/>
+              <a:t>network</a:t>
+            </a:r>
+            <a:r>
+              <a:rPr lang="nl-NL" dirty="0" smtClean="0"/>
+              <a:t>?</a:t>
+            </a:r>
+          </a:p>
+          <a:p>
+            <a:r>
+              <a:rPr lang="nl-NL" dirty="0" smtClean="0"/>
+              <a:t>Wat is een </a:t>
+            </a:r>
+            <a:r>
+              <a:rPr lang="nl-NL" dirty="0" err="1" smtClean="0"/>
+              <a:t>sorting</a:t>
+            </a:r>
+            <a:r>
+              <a:rPr lang="nl-NL" dirty="0" smtClean="0"/>
+              <a:t> </a:t>
+            </a:r>
+            <a:r>
+              <a:rPr lang="nl-NL" dirty="0" err="1" smtClean="0"/>
+              <a:t>network</a:t>
+            </a:r>
+            <a:r>
+              <a:rPr lang="nl-NL" dirty="0" smtClean="0"/>
+              <a:t>?</a:t>
+            </a:r>
+          </a:p>
+          <a:p>
+            <a:r>
+              <a:rPr lang="nl-NL" dirty="0" smtClean="0"/>
+              <a:t>Nul – één principe</a:t>
+            </a:r>
+          </a:p>
+          <a:p>
+            <a:r>
+              <a:rPr lang="nl-NL" dirty="0" smtClean="0"/>
+              <a:t>Toepassingen</a:t>
+            </a:r>
+          </a:p>
+          <a:p>
+            <a:r>
+              <a:rPr lang="nl-NL" dirty="0" smtClean="0"/>
+              <a:t>Doel</a:t>
+            </a:r>
+          </a:p>
+          <a:p>
+            <a:r>
+              <a:rPr lang="nl-NL" dirty="0" smtClean="0"/>
+              <a:t>Concept </a:t>
+            </a:r>
+            <a:r>
+              <a:rPr lang="nl-NL" dirty="0" err="1"/>
+              <a:t>s</a:t>
+            </a:r>
+            <a:r>
+              <a:rPr lang="nl-NL" dirty="0" err="1" smtClean="0"/>
+              <a:t>ubsumes</a:t>
+            </a:r>
+            <a:endParaRPr lang="nl-NL" dirty="0" smtClean="0"/>
+          </a:p>
+          <a:p>
+            <a:r>
+              <a:rPr lang="nl-NL" dirty="0" err="1" smtClean="0"/>
+              <a:t>Generate</a:t>
+            </a:r>
+            <a:r>
+              <a:rPr lang="nl-NL" dirty="0" smtClean="0"/>
+              <a:t> &amp; prune</a:t>
+            </a:r>
+          </a:p>
+          <a:p>
+            <a:r>
+              <a:rPr lang="nl-NL" dirty="0" err="1" smtClean="0"/>
+              <a:t>Optimal</a:t>
+            </a:r>
+            <a:r>
+              <a:rPr lang="nl-NL" dirty="0" smtClean="0"/>
+              <a:t> </a:t>
+            </a:r>
+            <a:r>
+              <a:rPr lang="nl-NL" dirty="0" err="1" smtClean="0"/>
+              <a:t>size</a:t>
+            </a:r>
+            <a:r>
+              <a:rPr lang="nl-NL" dirty="0" smtClean="0"/>
+              <a:t>, 9 </a:t>
+            </a:r>
+            <a:r>
+              <a:rPr lang="nl-NL" dirty="0" err="1" smtClean="0"/>
+              <a:t>channels</a:t>
+            </a:r>
+            <a:endParaRPr lang="nl-NL" dirty="0" smtClean="0"/>
           </a:p>
         </p:txBody>
       </p:sp>
@@ -11559,6 +12358,1168 @@
 </p:sld>
 </file>
 
+<file path=ppt/slides/slide20.xml><?xml version="1.0" encoding="utf-8"?>
+<p:sld xmlns:a="http://schemas.openxmlformats.org/drawingml/2006/main" xmlns:r="http://schemas.openxmlformats.org/officeDocument/2006/relationships" xmlns:p="http://schemas.openxmlformats.org/presentationml/2006/main">
+  <p:cSld>
+    <p:spTree>
+      <p:nvGrpSpPr>
+        <p:cNvPr id="1" name=""/>
+        <p:cNvGrpSpPr/>
+        <p:nvPr/>
+      </p:nvGrpSpPr>
+      <p:grpSpPr>
+        <a:xfrm>
+          <a:off x="0" y="0"/>
+          <a:ext cx="0" cy="0"/>
+          <a:chOff x="0" y="0"/>
+          <a:chExt cx="0" cy="0"/>
+        </a:xfrm>
+      </p:grpSpPr>
+      <p:sp>
+        <p:nvSpPr>
+          <p:cNvPr id="2" name="Titel 1"/>
+          <p:cNvSpPr>
+            <a:spLocks noGrp="1"/>
+          </p:cNvSpPr>
+          <p:nvPr>
+            <p:ph type="title"/>
+          </p:nvPr>
+        </p:nvSpPr>
+        <p:spPr/>
+        <p:txBody>
+          <a:bodyPr/>
+          <a:lstStyle/>
+          <a:p>
+            <a:r>
+              <a:rPr lang="nl-NL" dirty="0" err="1" smtClean="0"/>
+              <a:t>Optimal</a:t>
+            </a:r>
+            <a:r>
+              <a:rPr lang="nl-NL" dirty="0" smtClean="0"/>
+              <a:t> </a:t>
+            </a:r>
+            <a:r>
+              <a:rPr lang="nl-NL" dirty="0" err="1" smtClean="0"/>
+              <a:t>size</a:t>
+            </a:r>
+            <a:r>
+              <a:rPr lang="nl-NL" dirty="0" smtClean="0"/>
+              <a:t>, 9 </a:t>
+            </a:r>
+            <a:r>
+              <a:rPr lang="nl-NL" dirty="0" err="1" smtClean="0"/>
+              <a:t>channels</a:t>
+            </a:r>
+            <a:endParaRPr lang="nl-NL" dirty="0"/>
+          </a:p>
+        </p:txBody>
+      </p:sp>
+      <p:sp>
+        <p:nvSpPr>
+          <p:cNvPr id="3" name="Tijdelijke aanduiding voor inhoud 2"/>
+          <p:cNvSpPr>
+            <a:spLocks noGrp="1"/>
+          </p:cNvSpPr>
+          <p:nvPr>
+            <p:ph idx="1"/>
+          </p:nvPr>
+        </p:nvSpPr>
+        <p:spPr>
+          <a:xfrm>
+            <a:off x="779463" y="2241176"/>
+            <a:ext cx="7583488" cy="4007224"/>
+          </a:xfrm>
+        </p:spPr>
+        <p:txBody>
+          <a:bodyPr/>
+          <a:lstStyle/>
+          <a:p>
+            <a:r>
+              <a:rPr lang="nl-NL" dirty="0" err="1" smtClean="0"/>
+              <a:t>Generate</a:t>
+            </a:r>
+            <a:r>
+              <a:rPr lang="nl-NL" dirty="0" smtClean="0"/>
+              <a:t> &amp; prune tot |R</a:t>
+            </a:r>
+            <a:r>
+              <a:rPr lang="nl-NL" baseline="30000" dirty="0" smtClean="0"/>
+              <a:t>9</a:t>
+            </a:r>
+            <a:r>
+              <a:rPr lang="nl-NL" baseline="-25000" dirty="0" smtClean="0"/>
+              <a:t>14</a:t>
+            </a:r>
+            <a:r>
+              <a:rPr lang="nl-NL" dirty="0" smtClean="0"/>
+              <a:t>| = 914 444	(1 week)</a:t>
+            </a:r>
+          </a:p>
+          <a:p>
+            <a:pPr marL="800100" lvl="1" indent="-457200">
+              <a:buFont typeface="+mj-lt"/>
+              <a:buAutoNum type="arabicPeriod"/>
+            </a:pPr>
+            <a:r>
+              <a:rPr lang="nl-NL" sz="2200" dirty="0" err="1" smtClean="0"/>
+              <a:t>Generate</a:t>
+            </a:r>
+            <a:r>
+              <a:rPr lang="nl-NL" sz="2200" dirty="0" smtClean="0"/>
+              <a:t> &amp; prune tot |R</a:t>
+            </a:r>
+            <a:r>
+              <a:rPr lang="nl-NL" sz="2200" baseline="30000" dirty="0" smtClean="0"/>
+              <a:t>9</a:t>
+            </a:r>
+            <a:r>
+              <a:rPr lang="nl-NL" sz="2200" baseline="-25000" dirty="0" smtClean="0"/>
+              <a:t>25</a:t>
+            </a:r>
+            <a:r>
+              <a:rPr lang="nl-NL" sz="2200" dirty="0" smtClean="0"/>
+              <a:t>|</a:t>
+            </a:r>
+            <a:r>
+              <a:rPr lang="nl-NL" sz="2200" baseline="-25000" dirty="0" smtClean="0"/>
+              <a:t> </a:t>
+            </a:r>
+            <a:r>
+              <a:rPr lang="nl-NL" sz="2200" dirty="0" smtClean="0"/>
+              <a:t>= 1		(5 dagen)</a:t>
+            </a:r>
+          </a:p>
+          <a:p>
+            <a:pPr marL="800100" lvl="1" indent="-457200">
+              <a:buFont typeface="+mj-lt"/>
+              <a:buAutoNum type="arabicPeriod"/>
+            </a:pPr>
+            <a:r>
+              <a:rPr lang="nl-NL" sz="2200" dirty="0" smtClean="0"/>
+              <a:t>SAT </a:t>
+            </a:r>
+            <a:r>
+              <a:rPr lang="nl-NL" sz="2200" dirty="0" err="1" smtClean="0"/>
+              <a:t>encoding</a:t>
+            </a:r>
+            <a:r>
+              <a:rPr lang="nl-NL" sz="2200" dirty="0" smtClean="0"/>
+              <a:t> methode			(halve dag)</a:t>
+            </a:r>
+          </a:p>
+          <a:p>
+            <a:pPr marL="342900" lvl="1" indent="0">
+              <a:buNone/>
+            </a:pPr>
+            <a:r>
+              <a:rPr lang="nl-NL" dirty="0"/>
+              <a:t/>
+            </a:r>
+            <a:br>
+              <a:rPr lang="nl-NL" dirty="0"/>
+            </a:br>
+            <a:endParaRPr lang="nl-NL" dirty="0"/>
+          </a:p>
+          <a:p>
+            <a:pPr marL="0" indent="0">
+              <a:buNone/>
+            </a:pPr>
+            <a:r>
+              <a:rPr lang="nl-NL" dirty="0" smtClean="0"/>
+              <a:t>SAT </a:t>
+            </a:r>
+            <a:r>
+              <a:rPr lang="nl-NL" dirty="0" err="1" smtClean="0"/>
+              <a:t>encoding</a:t>
+            </a:r>
+            <a:r>
+              <a:rPr lang="nl-NL" dirty="0" smtClean="0"/>
+              <a:t>: Gegeven </a:t>
+            </a:r>
+            <a:r>
+              <a:rPr lang="nl-NL" dirty="0" err="1" smtClean="0"/>
+              <a:t>constraints</a:t>
+            </a:r>
+            <a:r>
+              <a:rPr lang="nl-NL" dirty="0" smtClean="0"/>
+              <a:t>, via SAT </a:t>
+            </a:r>
+            <a:r>
+              <a:rPr lang="nl-NL" dirty="0" err="1"/>
+              <a:t>s</a:t>
+            </a:r>
+            <a:r>
+              <a:rPr lang="nl-NL" dirty="0" err="1" smtClean="0"/>
+              <a:t>olver</a:t>
+            </a:r>
+            <a:r>
+              <a:rPr lang="nl-NL" dirty="0" smtClean="0"/>
+              <a:t> bestaand model zoeken.</a:t>
+            </a:r>
+          </a:p>
+        </p:txBody>
+      </p:sp>
+      <p:sp>
+        <p:nvSpPr>
+          <p:cNvPr id="4" name="Tijdelijke aanduiding voor voettekst 3"/>
+          <p:cNvSpPr>
+            <a:spLocks noGrp="1"/>
+          </p:cNvSpPr>
+          <p:nvPr>
+            <p:ph type="ftr" sz="quarter" idx="11"/>
+          </p:nvPr>
+        </p:nvSpPr>
+        <p:spPr>
+          <a:xfrm>
+            <a:off x="2664066" y="6248400"/>
+            <a:ext cx="6098935" cy="365125"/>
+          </a:xfrm>
+        </p:spPr>
+        <p:txBody>
+          <a:bodyPr/>
+          <a:lstStyle/>
+          <a:p>
+            <a:r>
+              <a:rPr lang="nl-NL" dirty="0" smtClean="0"/>
+              <a:t>[1] </a:t>
+            </a:r>
+            <a:r>
+              <a:rPr lang="nl-NL" dirty="0" err="1" smtClean="0"/>
+              <a:t>Twenty</a:t>
+            </a:r>
+            <a:r>
+              <a:rPr lang="nl-NL" dirty="0" smtClean="0"/>
+              <a:t>-Five </a:t>
+            </a:r>
+            <a:r>
+              <a:rPr lang="nl-NL" dirty="0" err="1" smtClean="0"/>
+              <a:t>Comparators</a:t>
+            </a:r>
+            <a:r>
+              <a:rPr lang="nl-NL" dirty="0" smtClean="0"/>
+              <a:t> is </a:t>
+            </a:r>
+            <a:r>
+              <a:rPr lang="nl-NL" dirty="0" err="1" smtClean="0"/>
+              <a:t>Optimal</a:t>
+            </a:r>
+            <a:r>
+              <a:rPr lang="nl-NL" dirty="0" smtClean="0"/>
+              <a:t> </a:t>
+            </a:r>
+            <a:r>
+              <a:rPr lang="nl-NL" dirty="0" err="1" smtClean="0"/>
+              <a:t>when</a:t>
+            </a:r>
+            <a:r>
+              <a:rPr lang="nl-NL" dirty="0" smtClean="0"/>
+              <a:t> </a:t>
+            </a:r>
+            <a:r>
+              <a:rPr lang="nl-NL" dirty="0" err="1" smtClean="0"/>
+              <a:t>Sorting</a:t>
+            </a:r>
+            <a:r>
+              <a:rPr lang="nl-NL" dirty="0" smtClean="0"/>
+              <a:t> </a:t>
+            </a:r>
+            <a:r>
+              <a:rPr lang="nl-NL" dirty="0" err="1" smtClean="0"/>
+              <a:t>Nine</a:t>
+            </a:r>
+            <a:r>
+              <a:rPr lang="nl-NL" dirty="0" smtClean="0"/>
+              <a:t> </a:t>
+            </a:r>
+            <a:r>
+              <a:rPr lang="nl-NL" dirty="0" err="1" smtClean="0"/>
+              <a:t>Inputs</a:t>
+            </a:r>
+            <a:r>
+              <a:rPr lang="nl-NL" dirty="0" smtClean="0"/>
+              <a:t> (</a:t>
+            </a:r>
+            <a:r>
+              <a:rPr lang="nl-NL" dirty="0" err="1" smtClean="0"/>
+              <a:t>and</a:t>
+            </a:r>
+            <a:r>
+              <a:rPr lang="nl-NL" dirty="0" smtClean="0"/>
+              <a:t> </a:t>
+            </a:r>
+            <a:r>
+              <a:rPr lang="nl-NL" dirty="0" err="1" smtClean="0"/>
+              <a:t>Twenty-Nine</a:t>
+            </a:r>
+            <a:r>
+              <a:rPr lang="nl-NL" dirty="0" smtClean="0"/>
+              <a:t> </a:t>
+            </a:r>
+            <a:r>
+              <a:rPr lang="nl-NL" dirty="0" err="1" smtClean="0"/>
+              <a:t>for</a:t>
+            </a:r>
+            <a:r>
+              <a:rPr lang="nl-NL" dirty="0" smtClean="0"/>
+              <a:t> Ten)</a:t>
+            </a:r>
+          </a:p>
+          <a:p>
+            <a:r>
+              <a:rPr lang="nl-NL" dirty="0"/>
+              <a:t>M. </a:t>
+            </a:r>
+            <a:r>
+              <a:rPr lang="nl-NL" dirty="0" err="1"/>
+              <a:t>Codish</a:t>
+            </a:r>
+            <a:r>
+              <a:rPr lang="nl-NL" dirty="0"/>
+              <a:t>, L. Cruz-</a:t>
+            </a:r>
+            <a:r>
+              <a:rPr lang="nl-NL" dirty="0" err="1"/>
+              <a:t>Filipe</a:t>
+            </a:r>
+            <a:r>
+              <a:rPr lang="nl-NL" dirty="0"/>
+              <a:t>, M. Frank, P. Schneider-Kamp </a:t>
+            </a:r>
+            <a:endParaRPr lang="nl-NL" dirty="0"/>
+          </a:p>
+        </p:txBody>
+      </p:sp>
+    </p:spTree>
+    <p:extLst>
+      <p:ext uri="{BB962C8B-B14F-4D97-AF65-F5344CB8AC3E}">
+        <p14:creationId xmlns:p14="http://schemas.microsoft.com/office/powerpoint/2010/main" val="2717097136"/>
+      </p:ext>
+    </p:extLst>
+  </p:cSld>
+  <p:clrMapOvr>
+    <a:masterClrMapping/>
+  </p:clrMapOvr>
+  <p:timing>
+    <p:tnLst>
+      <p:par>
+        <p:cTn xmlns:p14="http://schemas.microsoft.com/office/powerpoint/2010/main" id="1" dur="indefinite" restart="never" nodeType="tmRoot"/>
+      </p:par>
+    </p:tnLst>
+  </p:timing>
+</p:sld>
+</file>
+
+<file path=ppt/slides/slide21.xml><?xml version="1.0" encoding="utf-8"?>
+<p:sld xmlns:a="http://schemas.openxmlformats.org/drawingml/2006/main" xmlns:r="http://schemas.openxmlformats.org/officeDocument/2006/relationships" xmlns:p="http://schemas.openxmlformats.org/presentationml/2006/main">
+  <p:cSld>
+    <p:spTree>
+      <p:nvGrpSpPr>
+        <p:cNvPr id="1" name=""/>
+        <p:cNvGrpSpPr/>
+        <p:nvPr/>
+      </p:nvGrpSpPr>
+      <p:grpSpPr>
+        <a:xfrm>
+          <a:off x="0" y="0"/>
+          <a:ext cx="0" cy="0"/>
+          <a:chOff x="0" y="0"/>
+          <a:chExt cx="0" cy="0"/>
+        </a:xfrm>
+      </p:grpSpPr>
+      <p:sp>
+        <p:nvSpPr>
+          <p:cNvPr id="2" name="Titel 1"/>
+          <p:cNvSpPr>
+            <a:spLocks noGrp="1"/>
+          </p:cNvSpPr>
+          <p:nvPr>
+            <p:ph type="title"/>
+          </p:nvPr>
+        </p:nvSpPr>
+        <p:spPr/>
+        <p:txBody>
+          <a:bodyPr/>
+          <a:lstStyle/>
+          <a:p>
+            <a:r>
+              <a:rPr lang="nl-NL" dirty="0" err="1" smtClean="0"/>
+              <a:t>Optimal</a:t>
+            </a:r>
+            <a:r>
+              <a:rPr lang="nl-NL" dirty="0" smtClean="0"/>
+              <a:t> </a:t>
+            </a:r>
+            <a:r>
+              <a:rPr lang="nl-NL" dirty="0" err="1" smtClean="0"/>
+              <a:t>size</a:t>
+            </a:r>
+            <a:r>
+              <a:rPr lang="nl-NL" dirty="0" smtClean="0"/>
+              <a:t>, 9 </a:t>
+            </a:r>
+            <a:r>
+              <a:rPr lang="nl-NL" dirty="0" err="1" smtClean="0"/>
+              <a:t>channels</a:t>
+            </a:r>
+            <a:r>
+              <a:rPr lang="nl-NL" dirty="0" smtClean="0"/>
+              <a:t>: resultaten</a:t>
+            </a:r>
+            <a:endParaRPr lang="nl-NL" dirty="0"/>
+          </a:p>
+        </p:txBody>
+      </p:sp>
+      <p:sp>
+        <p:nvSpPr>
+          <p:cNvPr id="3" name="Tijdelijke aanduiding voor inhoud 2"/>
+          <p:cNvSpPr>
+            <a:spLocks noGrp="1"/>
+          </p:cNvSpPr>
+          <p:nvPr>
+            <p:ph idx="1"/>
+          </p:nvPr>
+        </p:nvSpPr>
+        <p:spPr>
+          <a:xfrm>
+            <a:off x="779463" y="1949824"/>
+            <a:ext cx="7583488" cy="4667084"/>
+          </a:xfrm>
+        </p:spPr>
+        <p:txBody>
+          <a:bodyPr>
+            <a:normAutofit/>
+          </a:bodyPr>
+          <a:lstStyle/>
+          <a:p>
+            <a:pPr marL="457200" indent="-457200">
+              <a:buFont typeface="+mj-lt"/>
+              <a:buAutoNum type="arabicPeriod"/>
+            </a:pPr>
+            <a:r>
+              <a:rPr lang="nl-NL" dirty="0" err="1" smtClean="0"/>
+              <a:t>Size</a:t>
+            </a:r>
+            <a:r>
+              <a:rPr lang="nl-NL" dirty="0" smtClean="0"/>
+              <a:t>(9) = 25</a:t>
+            </a:r>
+            <a:br>
+              <a:rPr lang="nl-NL" dirty="0" smtClean="0"/>
+            </a:br>
+            <a:r>
+              <a:rPr lang="nl-NL" dirty="0" smtClean="0"/>
+              <a:t/>
+            </a:r>
+            <a:br>
+              <a:rPr lang="nl-NL" dirty="0" smtClean="0"/>
+            </a:br>
+            <a:r>
+              <a:rPr lang="nl-NL" dirty="0" smtClean="0"/>
+              <a:t/>
+            </a:r>
+            <a:br>
+              <a:rPr lang="nl-NL" dirty="0" smtClean="0"/>
+            </a:br>
+            <a:r>
+              <a:rPr lang="nl-NL" dirty="0" smtClean="0"/>
+              <a:t/>
+            </a:r>
+            <a:br>
+              <a:rPr lang="nl-NL" dirty="0" smtClean="0"/>
+            </a:br>
+            <a:endParaRPr lang="nl-NL" dirty="0" smtClean="0"/>
+          </a:p>
+          <a:p>
+            <a:pPr marL="457200" indent="-457200">
+              <a:buFont typeface="+mj-lt"/>
+              <a:buAutoNum type="arabicPeriod"/>
+            </a:pPr>
+            <a:r>
+              <a:rPr lang="nl-NL" dirty="0" err="1" smtClean="0"/>
+              <a:t>Size</a:t>
+            </a:r>
+            <a:r>
+              <a:rPr lang="nl-NL" dirty="0" smtClean="0"/>
+              <a:t>(10) = 29</a:t>
+            </a:r>
+          </a:p>
+          <a:p>
+            <a:pPr lvl="1"/>
+            <a:r>
+              <a:rPr lang="nl-NL" dirty="0" err="1" smtClean="0"/>
+              <a:t>Lower</a:t>
+            </a:r>
+            <a:r>
+              <a:rPr lang="nl-NL" dirty="0" smtClean="0"/>
+              <a:t> </a:t>
+            </a:r>
+            <a:r>
+              <a:rPr lang="nl-NL" dirty="0" err="1" smtClean="0"/>
+              <a:t>bound</a:t>
+            </a:r>
+            <a:r>
+              <a:rPr lang="nl-NL" dirty="0" smtClean="0"/>
+              <a:t> S(10) ≥ S(9) </a:t>
+            </a:r>
+            <a:r>
+              <a:rPr lang="nl-NL" dirty="0"/>
+              <a:t>+ ⎡</a:t>
+            </a:r>
+            <a:r>
+              <a:rPr lang="nl-NL" dirty="0" smtClean="0"/>
+              <a:t>log</a:t>
+            </a:r>
+            <a:r>
+              <a:rPr lang="nl-NL" baseline="-25000" dirty="0" smtClean="0"/>
+              <a:t>2</a:t>
+            </a:r>
+            <a:r>
+              <a:rPr lang="nl-NL" dirty="0" smtClean="0"/>
+              <a:t>9⎤ ≥ 25 + 4 ≥ 29</a:t>
+            </a:r>
+          </a:p>
+          <a:p>
+            <a:pPr lvl="1"/>
+            <a:r>
+              <a:rPr lang="nl-NL" dirty="0" err="1" smtClean="0"/>
+              <a:t>Upper</a:t>
+            </a:r>
+            <a:r>
+              <a:rPr lang="nl-NL" dirty="0"/>
+              <a:t> </a:t>
+            </a:r>
+            <a:r>
+              <a:rPr lang="nl-NL" dirty="0" err="1" smtClean="0"/>
+              <a:t>bound</a:t>
+            </a:r>
+            <a:r>
+              <a:rPr lang="nl-NL" dirty="0" smtClean="0"/>
+              <a:t>: 29</a:t>
+            </a:r>
+          </a:p>
+          <a:p>
+            <a:pPr lvl="1">
+              <a:buFont typeface="Wingdings" charset="2"/>
+              <a:buChar char="Ø"/>
+            </a:pPr>
+            <a:r>
+              <a:rPr lang="nl-NL" dirty="0" err="1" smtClean="0"/>
+              <a:t>Size</a:t>
+            </a:r>
+            <a:r>
+              <a:rPr lang="nl-NL" dirty="0" smtClean="0"/>
+              <a:t>(10) = 29</a:t>
+            </a:r>
+          </a:p>
+          <a:p>
+            <a:pPr marL="0" indent="0">
+              <a:buNone/>
+            </a:pPr>
+            <a:endParaRPr lang="nl-NL" dirty="0"/>
+          </a:p>
+          <a:p>
+            <a:endParaRPr lang="nl-NL" dirty="0"/>
+          </a:p>
+        </p:txBody>
+      </p:sp>
+      <p:pic>
+        <p:nvPicPr>
+          <p:cNvPr id="4" name="Afbeelding 3" descr="SortingNetworkSize9.png"/>
+          <p:cNvPicPr>
+            <a:picLocks noChangeAspect="1"/>
+          </p:cNvPicPr>
+          <p:nvPr/>
+        </p:nvPicPr>
+        <p:blipFill>
+          <a:blip r:embed="rId3">
+            <a:extLst>
+              <a:ext uri="{28A0092B-C50C-407E-A947-70E740481C1C}">
+                <a14:useLocalDpi xmlns:a14="http://schemas.microsoft.com/office/drawing/2010/main" val="0"/>
+              </a:ext>
+            </a:extLst>
+          </a:blip>
+          <a:stretch>
+            <a:fillRect/>
+          </a:stretch>
+        </p:blipFill>
+        <p:spPr>
+          <a:xfrm>
+            <a:off x="3182550" y="1949825"/>
+            <a:ext cx="2794887" cy="1897762"/>
+          </a:xfrm>
+          <a:prstGeom prst="rect">
+            <a:avLst/>
+          </a:prstGeom>
+        </p:spPr>
+      </p:pic>
+    </p:spTree>
+    <p:extLst>
+      <p:ext uri="{BB962C8B-B14F-4D97-AF65-F5344CB8AC3E}">
+        <p14:creationId xmlns:p14="http://schemas.microsoft.com/office/powerpoint/2010/main" val="3221524727"/>
+      </p:ext>
+    </p:extLst>
+  </p:cSld>
+  <p:clrMapOvr>
+    <a:masterClrMapping/>
+  </p:clrMapOvr>
+  <p:timing>
+    <p:tnLst>
+      <p:par>
+        <p:cTn xmlns:p14="http://schemas.microsoft.com/office/powerpoint/2010/main" id="1" dur="indefinite" restart="never" nodeType="tmRoot"/>
+      </p:par>
+    </p:tnLst>
+  </p:timing>
+</p:sld>
+</file>
+
+<file path=ppt/slides/slide22.xml><?xml version="1.0" encoding="utf-8"?>
+<p:sld xmlns:a="http://schemas.openxmlformats.org/drawingml/2006/main" xmlns:r="http://schemas.openxmlformats.org/officeDocument/2006/relationships" xmlns:p="http://schemas.openxmlformats.org/presentationml/2006/main">
+  <p:cSld>
+    <p:spTree>
+      <p:nvGrpSpPr>
+        <p:cNvPr id="1" name=""/>
+        <p:cNvGrpSpPr/>
+        <p:nvPr/>
+      </p:nvGrpSpPr>
+      <p:grpSpPr>
+        <a:xfrm>
+          <a:off x="0" y="0"/>
+          <a:ext cx="0" cy="0"/>
+          <a:chOff x="0" y="0"/>
+          <a:chExt cx="0" cy="0"/>
+        </a:xfrm>
+      </p:grpSpPr>
+      <p:pic>
+        <p:nvPicPr>
+          <p:cNvPr id="4" name="Afbeelding 3" descr="Question-transparent.png"/>
+          <p:cNvPicPr>
+            <a:picLocks noChangeAspect="1"/>
+          </p:cNvPicPr>
+          <p:nvPr/>
+        </p:nvPicPr>
+        <p:blipFill>
+          <a:blip r:embed="rId3">
+            <a:extLst>
+              <a:ext uri="{28A0092B-C50C-407E-A947-70E740481C1C}">
+                <a14:useLocalDpi xmlns:a14="http://schemas.microsoft.com/office/drawing/2010/main" val="0"/>
+              </a:ext>
+            </a:extLst>
+          </a:blip>
+          <a:stretch>
+            <a:fillRect/>
+          </a:stretch>
+        </p:blipFill>
+        <p:spPr>
+          <a:xfrm>
+            <a:off x="1146" y="-200508"/>
+            <a:ext cx="2785872" cy="3048000"/>
+          </a:xfrm>
+          <a:prstGeom prst="rect">
+            <a:avLst/>
+          </a:prstGeom>
+        </p:spPr>
+      </p:pic>
+      <p:pic>
+        <p:nvPicPr>
+          <p:cNvPr id="5" name="Afbeelding 4" descr="faq.png"/>
+          <p:cNvPicPr>
+            <a:picLocks noChangeAspect="1"/>
+          </p:cNvPicPr>
+          <p:nvPr/>
+        </p:nvPicPr>
+        <p:blipFill>
+          <a:blip r:embed="rId4">
+            <a:extLst>
+              <a:ext uri="{28A0092B-C50C-407E-A947-70E740481C1C}">
+                <a14:useLocalDpi xmlns:a14="http://schemas.microsoft.com/office/drawing/2010/main" val="0"/>
+              </a:ext>
+            </a:extLst>
+          </a:blip>
+          <a:stretch>
+            <a:fillRect/>
+          </a:stretch>
+        </p:blipFill>
+        <p:spPr>
+          <a:xfrm>
+            <a:off x="5962528" y="2978156"/>
+            <a:ext cx="3181472" cy="3879844"/>
+          </a:xfrm>
+          <a:prstGeom prst="rect">
+            <a:avLst/>
+          </a:prstGeom>
+        </p:spPr>
+      </p:pic>
+      <p:sp>
+        <p:nvSpPr>
+          <p:cNvPr id="6" name="Rechthoek 5"/>
+          <p:cNvSpPr/>
+          <p:nvPr/>
+        </p:nvSpPr>
+        <p:spPr>
+          <a:xfrm>
+            <a:off x="763888" y="2780650"/>
+            <a:ext cx="5328132" cy="1446550"/>
+          </a:xfrm>
+          <a:prstGeom prst="rect">
+            <a:avLst/>
+          </a:prstGeom>
+          <a:noFill/>
+          <a:ln>
+            <a:noFill/>
+          </a:ln>
+        </p:spPr>
+        <p:txBody>
+          <a:bodyPr wrap="square" lIns="91440" tIns="45720" rIns="91440" bIns="45720">
+            <a:spAutoFit/>
+          </a:bodyPr>
+          <a:lstStyle/>
+          <a:p>
+            <a:pPr algn="ctr"/>
+            <a:r>
+              <a:rPr lang="nl-BE" sz="8800" b="1" cap="none" spc="0" dirty="0" smtClean="0">
+                <a:ln w="12700">
+                  <a:solidFill>
+                    <a:srgbClr val="000000"/>
+                  </a:solidFill>
+                  <a:prstDash val="solid"/>
+                </a:ln>
+                <a:solidFill>
+                  <a:srgbClr val="0000FF"/>
+                </a:solidFill>
+                <a:effectLst>
+                  <a:outerShdw blurRad="41275" dist="20320" dir="1800000" algn="tl" rotWithShape="0">
+                    <a:srgbClr val="000000">
+                      <a:alpha val="40000"/>
+                    </a:srgbClr>
+                  </a:outerShdw>
+                </a:effectLst>
+              </a:rPr>
+              <a:t>VRAGEN?</a:t>
+            </a:r>
+            <a:endParaRPr lang="nl-BE" sz="8800" b="1" cap="none" spc="0" dirty="0">
+              <a:ln w="12700">
+                <a:solidFill>
+                  <a:srgbClr val="000000"/>
+                </a:solidFill>
+                <a:prstDash val="solid"/>
+              </a:ln>
+              <a:solidFill>
+                <a:srgbClr val="0000FF"/>
+              </a:solidFill>
+              <a:effectLst>
+                <a:outerShdw blurRad="41275" dist="20320" dir="1800000" algn="tl" rotWithShape="0">
+                  <a:srgbClr val="000000">
+                    <a:alpha val="40000"/>
+                  </a:srgbClr>
+                </a:outerShdw>
+              </a:effectLst>
+            </a:endParaRPr>
+          </a:p>
+        </p:txBody>
+      </p:sp>
+    </p:spTree>
+    <p:extLst>
+      <p:ext uri="{BB962C8B-B14F-4D97-AF65-F5344CB8AC3E}">
+        <p14:creationId xmlns:p14="http://schemas.microsoft.com/office/powerpoint/2010/main" val="2744547577"/>
+      </p:ext>
+    </p:extLst>
+  </p:cSld>
+  <p:clrMapOvr>
+    <a:masterClrMapping/>
+  </p:clrMapOvr>
+  <p:timing>
+    <p:tnLst>
+      <p:par>
+        <p:cTn xmlns:p14="http://schemas.microsoft.com/office/powerpoint/2010/main" id="1" dur="indefinite" restart="never" nodeType="tmRoot"/>
+      </p:par>
+    </p:tnLst>
+  </p:timing>
+</p:sld>
+</file>
+
+<file path=ppt/slides/slide23.xml><?xml version="1.0" encoding="utf-8"?>
+<p:sld xmlns:a="http://schemas.openxmlformats.org/drawingml/2006/main" xmlns:r="http://schemas.openxmlformats.org/officeDocument/2006/relationships" xmlns:p="http://schemas.openxmlformats.org/presentationml/2006/main">
+  <p:cSld>
+    <p:spTree>
+      <p:nvGrpSpPr>
+        <p:cNvPr id="1" name=""/>
+        <p:cNvGrpSpPr/>
+        <p:nvPr/>
+      </p:nvGrpSpPr>
+      <p:grpSpPr>
+        <a:xfrm>
+          <a:off x="0" y="0"/>
+          <a:ext cx="0" cy="0"/>
+          <a:chOff x="0" y="0"/>
+          <a:chExt cx="0" cy="0"/>
+        </a:xfrm>
+      </p:grpSpPr>
+      <p:sp>
+        <p:nvSpPr>
+          <p:cNvPr id="2" name="Titel 1"/>
+          <p:cNvSpPr>
+            <a:spLocks noGrp="1"/>
+          </p:cNvSpPr>
+          <p:nvPr>
+            <p:ph type="title"/>
+          </p:nvPr>
+        </p:nvSpPr>
+        <p:spPr/>
+        <p:txBody>
+          <a:bodyPr/>
+          <a:lstStyle/>
+          <a:p>
+            <a:r>
+              <a:rPr lang="nl-NL" dirty="0" smtClean="0"/>
+              <a:t>Papers</a:t>
+            </a:r>
+            <a:endParaRPr lang="nl-NL" dirty="0"/>
+          </a:p>
+        </p:txBody>
+      </p:sp>
+      <p:sp>
+        <p:nvSpPr>
+          <p:cNvPr id="3" name="Tijdelijke aanduiding voor inhoud 2"/>
+          <p:cNvSpPr>
+            <a:spLocks noGrp="1"/>
+          </p:cNvSpPr>
+          <p:nvPr>
+            <p:ph idx="1"/>
+          </p:nvPr>
+        </p:nvSpPr>
+        <p:spPr/>
+        <p:txBody>
+          <a:bodyPr>
+            <a:normAutofit fontScale="85000" lnSpcReduction="20000"/>
+          </a:bodyPr>
+          <a:lstStyle/>
+          <a:p>
+            <a:r>
+              <a:rPr lang="nl-NL" b="1" dirty="0" err="1" smtClean="0"/>
+              <a:t>Twenty</a:t>
+            </a:r>
+            <a:r>
+              <a:rPr lang="nl-NL" b="1" dirty="0" smtClean="0"/>
+              <a:t>-Five </a:t>
+            </a:r>
+            <a:r>
+              <a:rPr lang="nl-NL" b="1" dirty="0" err="1" smtClean="0"/>
+              <a:t>Comparators</a:t>
+            </a:r>
+            <a:r>
+              <a:rPr lang="nl-NL" b="1" dirty="0" smtClean="0"/>
+              <a:t> is </a:t>
+            </a:r>
+            <a:r>
+              <a:rPr lang="nl-NL" b="1" dirty="0" err="1" smtClean="0"/>
+              <a:t>Optimal</a:t>
+            </a:r>
+            <a:r>
+              <a:rPr lang="nl-NL" b="1" dirty="0" smtClean="0"/>
+              <a:t> </a:t>
+            </a:r>
+            <a:r>
+              <a:rPr lang="nl-NL" b="1" dirty="0" err="1" smtClean="0"/>
+              <a:t>when</a:t>
+            </a:r>
+            <a:r>
+              <a:rPr lang="nl-NL" b="1" dirty="0" smtClean="0"/>
+              <a:t> </a:t>
+            </a:r>
+            <a:r>
+              <a:rPr lang="nl-NL" b="1" dirty="0" err="1" smtClean="0"/>
+              <a:t>Sorting</a:t>
+            </a:r>
+            <a:r>
+              <a:rPr lang="nl-NL" b="1" dirty="0" smtClean="0"/>
+              <a:t> </a:t>
+            </a:r>
+            <a:r>
+              <a:rPr lang="nl-NL" b="1" dirty="0" err="1" smtClean="0"/>
+              <a:t>Nine</a:t>
+            </a:r>
+            <a:r>
+              <a:rPr lang="nl-NL" b="1" dirty="0" smtClean="0"/>
+              <a:t> </a:t>
+            </a:r>
+            <a:r>
+              <a:rPr lang="nl-NL" b="1" dirty="0" err="1" smtClean="0"/>
+              <a:t>Inputs</a:t>
+            </a:r>
+            <a:r>
+              <a:rPr lang="nl-NL" b="1" dirty="0" smtClean="0"/>
+              <a:t> (</a:t>
+            </a:r>
+            <a:r>
+              <a:rPr lang="nl-NL" b="1" dirty="0" err="1" smtClean="0"/>
+              <a:t>and</a:t>
+            </a:r>
+            <a:r>
+              <a:rPr lang="nl-NL" b="1" dirty="0" smtClean="0"/>
+              <a:t> </a:t>
+            </a:r>
+            <a:r>
+              <a:rPr lang="nl-NL" b="1" dirty="0" err="1" smtClean="0"/>
+              <a:t>Twenty-Nine</a:t>
+            </a:r>
+            <a:r>
+              <a:rPr lang="nl-NL" b="1" dirty="0" smtClean="0"/>
+              <a:t> </a:t>
+            </a:r>
+            <a:r>
+              <a:rPr lang="nl-NL" b="1" dirty="0" err="1" smtClean="0"/>
+              <a:t>for</a:t>
+            </a:r>
+            <a:r>
+              <a:rPr lang="nl-NL" b="1" dirty="0" smtClean="0"/>
+              <a:t> Ten)</a:t>
+            </a:r>
+            <a:r>
+              <a:rPr lang="nl-NL" dirty="0" smtClean="0"/>
+              <a:t/>
+            </a:r>
+            <a:br>
+              <a:rPr lang="nl-NL" dirty="0" smtClean="0"/>
+            </a:br>
+            <a:r>
+              <a:rPr lang="nl-NL" dirty="0" smtClean="0"/>
+              <a:t>M</a:t>
+            </a:r>
+            <a:r>
+              <a:rPr lang="nl-NL" dirty="0" smtClean="0"/>
+              <a:t>. </a:t>
+            </a:r>
+            <a:r>
+              <a:rPr lang="nl-NL" dirty="0" err="1" smtClean="0"/>
+              <a:t>Codish</a:t>
+            </a:r>
+            <a:r>
+              <a:rPr lang="nl-NL" dirty="0" smtClean="0"/>
+              <a:t>, L. Cruz-</a:t>
+            </a:r>
+            <a:r>
+              <a:rPr lang="nl-NL" dirty="0" err="1" smtClean="0"/>
+              <a:t>Filipe</a:t>
+            </a:r>
+            <a:r>
+              <a:rPr lang="nl-NL" dirty="0" smtClean="0"/>
+              <a:t>, M. Frank, P. Schneider-</a:t>
+            </a:r>
+            <a:r>
+              <a:rPr lang="nl-NL" dirty="0" smtClean="0"/>
+              <a:t>Kamp</a:t>
+            </a:r>
+            <a:br>
+              <a:rPr lang="nl-NL" dirty="0" smtClean="0"/>
+            </a:br>
+            <a:r>
+              <a:rPr lang="nl-NL" dirty="0" smtClean="0"/>
+              <a:t>24 </a:t>
+            </a:r>
+            <a:r>
+              <a:rPr lang="nl-NL" dirty="0" smtClean="0"/>
+              <a:t>juni 2014.</a:t>
+            </a:r>
+          </a:p>
+          <a:p>
+            <a:r>
+              <a:rPr lang="nl-NL" b="1" dirty="0" err="1" smtClean="0"/>
+              <a:t>Sorting</a:t>
+            </a:r>
+            <a:r>
+              <a:rPr lang="nl-NL" b="1" dirty="0" smtClean="0"/>
+              <a:t> Networks </a:t>
+            </a:r>
+            <a:r>
+              <a:rPr lang="nl-NL" b="1" dirty="0" err="1" smtClean="0"/>
+              <a:t>and</a:t>
+            </a:r>
+            <a:r>
+              <a:rPr lang="nl-NL" b="1" dirty="0" smtClean="0"/>
+              <a:t> </a:t>
+            </a:r>
+            <a:r>
+              <a:rPr lang="nl-NL" b="1" dirty="0" err="1" smtClean="0"/>
+              <a:t>Their</a:t>
+            </a:r>
+            <a:r>
+              <a:rPr lang="nl-NL" b="1" dirty="0" smtClean="0"/>
+              <a:t> </a:t>
+            </a:r>
+            <a:r>
+              <a:rPr lang="nl-NL" b="1" dirty="0" smtClean="0"/>
+              <a:t>Applications</a:t>
+            </a:r>
+            <a:r>
+              <a:rPr lang="nl-NL" dirty="0"/>
+              <a:t/>
+            </a:r>
+            <a:br>
+              <a:rPr lang="nl-NL" dirty="0"/>
+            </a:br>
+            <a:r>
+              <a:rPr lang="nl-NL" dirty="0" smtClean="0"/>
+              <a:t>K.E. </a:t>
+            </a:r>
+            <a:r>
+              <a:rPr lang="nl-NL" dirty="0" err="1" smtClean="0"/>
+              <a:t>Batcher</a:t>
+            </a:r>
+            <a:r>
+              <a:rPr lang="nl-NL" dirty="0" smtClean="0"/>
+              <a:t/>
+            </a:r>
+            <a:br>
+              <a:rPr lang="nl-NL" dirty="0" smtClean="0"/>
+            </a:br>
+            <a:r>
+              <a:rPr lang="nl-NL" dirty="0" smtClean="0"/>
+              <a:t>2 mei 1968</a:t>
+            </a:r>
+          </a:p>
+          <a:p>
+            <a:r>
+              <a:rPr lang="nl-NL" b="1" dirty="0" err="1" smtClean="0"/>
+              <a:t>Bounds</a:t>
+            </a:r>
+            <a:r>
+              <a:rPr lang="nl-NL" b="1" dirty="0" smtClean="0"/>
+              <a:t> on the </a:t>
+            </a:r>
+            <a:r>
+              <a:rPr lang="nl-NL" b="1" dirty="0" err="1" smtClean="0"/>
+              <a:t>size</a:t>
+            </a:r>
+            <a:r>
+              <a:rPr lang="nl-NL" b="1" dirty="0" smtClean="0"/>
+              <a:t> of test sets </a:t>
+            </a:r>
+            <a:r>
+              <a:rPr lang="nl-NL" b="1" dirty="0" err="1" smtClean="0"/>
+              <a:t>for</a:t>
+            </a:r>
+            <a:r>
+              <a:rPr lang="nl-NL" b="1" dirty="0" smtClean="0"/>
+              <a:t> </a:t>
+            </a:r>
+            <a:r>
+              <a:rPr lang="nl-NL" b="1" dirty="0" err="1" smtClean="0"/>
+              <a:t>sorting</a:t>
+            </a:r>
+            <a:r>
+              <a:rPr lang="nl-NL" b="1" dirty="0" smtClean="0"/>
+              <a:t> </a:t>
+            </a:r>
+            <a:r>
+              <a:rPr lang="nl-NL" b="1" dirty="0" err="1" smtClean="0"/>
+              <a:t>and</a:t>
+            </a:r>
+            <a:r>
+              <a:rPr lang="nl-NL" b="1" dirty="0" smtClean="0"/>
+              <a:t> </a:t>
+            </a:r>
+            <a:r>
+              <a:rPr lang="nl-NL" b="1" dirty="0" err="1" smtClean="0"/>
+              <a:t>related</a:t>
+            </a:r>
+            <a:r>
+              <a:rPr lang="nl-NL" b="1" dirty="0" smtClean="0"/>
+              <a:t> </a:t>
+            </a:r>
+            <a:r>
+              <a:rPr lang="nl-NL" b="1" dirty="0" err="1" smtClean="0"/>
+              <a:t>networks</a:t>
+            </a:r>
+            <a:r>
+              <a:rPr lang="nl-NL" dirty="0" smtClean="0"/>
+              <a:t/>
+            </a:r>
+            <a:br>
+              <a:rPr lang="nl-NL" dirty="0" smtClean="0"/>
+            </a:br>
+            <a:r>
+              <a:rPr lang="nl-NL" dirty="0" smtClean="0"/>
+              <a:t>M. J. Chung, B. </a:t>
+            </a:r>
+            <a:r>
+              <a:rPr lang="nl-NL" dirty="0" err="1" smtClean="0"/>
+              <a:t>Ravikumar</a:t>
+            </a:r>
+            <a:r>
+              <a:rPr lang="nl-NL" dirty="0" smtClean="0"/>
+              <a:t/>
+            </a:r>
+            <a:br>
+              <a:rPr lang="nl-NL" dirty="0" smtClean="0"/>
+            </a:br>
+            <a:r>
+              <a:rPr lang="nl-NL" dirty="0" smtClean="0"/>
+              <a:t>1990.</a:t>
+            </a:r>
+          </a:p>
+          <a:p>
+            <a:r>
+              <a:rPr lang="nl-NL" b="1" dirty="0" err="1" smtClean="0"/>
+              <a:t>Sorting</a:t>
+            </a:r>
+            <a:r>
+              <a:rPr lang="nl-NL" b="1" dirty="0" smtClean="0"/>
+              <a:t> Networks: the End Game</a:t>
+            </a:r>
+            <a:br>
+              <a:rPr lang="nl-NL" b="1" dirty="0" smtClean="0"/>
+            </a:br>
+            <a:r>
+              <a:rPr lang="nl-NL" dirty="0" smtClean="0"/>
+              <a:t>M. </a:t>
+            </a:r>
+            <a:r>
+              <a:rPr lang="nl-NL" dirty="0" err="1" smtClean="0"/>
+              <a:t>Codish</a:t>
+            </a:r>
+            <a:r>
+              <a:rPr lang="nl-NL" dirty="0" smtClean="0"/>
+              <a:t>, L. Cruz-</a:t>
+            </a:r>
+            <a:r>
+              <a:rPr lang="nl-NL" dirty="0" err="1" smtClean="0"/>
+              <a:t>Filipe</a:t>
+            </a:r>
+            <a:r>
+              <a:rPr lang="nl-NL" dirty="0" smtClean="0"/>
+              <a:t>, P. Schneider-Kamp</a:t>
+            </a:r>
+            <a:br>
+              <a:rPr lang="nl-NL" dirty="0" smtClean="0"/>
+            </a:br>
+            <a:r>
+              <a:rPr lang="nl-NL" dirty="0" smtClean="0"/>
+              <a:t>24 november 2014.</a:t>
+            </a:r>
+            <a:endParaRPr lang="nl-NL" dirty="0"/>
+          </a:p>
+        </p:txBody>
+      </p:sp>
+    </p:spTree>
+    <p:extLst>
+      <p:ext uri="{BB962C8B-B14F-4D97-AF65-F5344CB8AC3E}">
+        <p14:creationId xmlns:p14="http://schemas.microsoft.com/office/powerpoint/2010/main" val="3644345602"/>
+      </p:ext>
+    </p:extLst>
+  </p:cSld>
+  <p:clrMapOvr>
+    <a:masterClrMapping/>
+  </p:clrMapOvr>
+  <p:timing>
+    <p:tnLst>
+      <p:par>
+        <p:cTn xmlns:p14="http://schemas.microsoft.com/office/powerpoint/2010/main" id="1" dur="indefinite" restart="never" nodeType="tmRoot"/>
+      </p:par>
+    </p:tnLst>
+  </p:timing>
+</p:sld>
+</file>
+
 <file path=ppt/slides/slide3.xml><?xml version="1.0" encoding="utf-8"?>
 <p:sld xmlns:a="http://schemas.openxmlformats.org/drawingml/2006/main" xmlns:r="http://schemas.openxmlformats.org/officeDocument/2006/relationships" xmlns:p="http://schemas.openxmlformats.org/presentationml/2006/main">
   <p:cSld>
@@ -11657,7 +13618,12 @@
             <p:ph sz="half" idx="2"/>
           </p:nvPr>
         </p:nvSpPr>
-        <p:spPr/>
+        <p:spPr>
+          <a:xfrm>
+            <a:off x="4583339" y="1981201"/>
+            <a:ext cx="3779612" cy="3975100"/>
+          </a:xfrm>
+        </p:spPr>
         <p:txBody>
           <a:bodyPr/>
           <a:lstStyle/>
@@ -11698,8 +13664,13 @@
             </a:r>
             <a:r>
               <a:rPr lang="nl-NL" dirty="0" smtClean="0"/>
-              <a:t>(a b)</a:t>
-            </a:r>
+              <a:t>(a b</a:t>
+            </a:r>
+            <a:r>
+              <a:rPr lang="nl-NL" dirty="0" smtClean="0"/>
+              <a:t>) met a &lt; b</a:t>
+            </a:r>
+            <a:endParaRPr lang="nl-NL" dirty="0" smtClean="0"/>
           </a:p>
           <a:p>
             <a:pPr lvl="1">
@@ -11707,9 +13678,22 @@
               <a:buChar char="Ø"/>
             </a:pPr>
             <a:r>
-              <a:rPr lang="nl-NL" dirty="0" smtClean="0"/>
-              <a:t>a &lt; b</a:t>
-            </a:r>
+              <a:rPr lang="nl-NL" dirty="0"/>
+              <a:t>w</a:t>
+            </a:r>
+            <a:r>
+              <a:rPr lang="nl-NL" dirty="0" smtClean="0"/>
+              <a:t>(a) </a:t>
+            </a:r>
+            <a:r>
+              <a:rPr lang="nl-NL" dirty="0" smtClean="0"/>
+              <a:t>&lt; </a:t>
+            </a:r>
+            <a:r>
+              <a:rPr lang="nl-NL" dirty="0" smtClean="0"/>
+              <a:t>w(b)</a:t>
+            </a:r>
+            <a:endParaRPr lang="nl-NL" dirty="0" smtClean="0"/>
           </a:p>
           <a:p>
             <a:pPr lvl="1">
@@ -11717,17 +13701,34 @@
               <a:buChar char="Ø"/>
             </a:pPr>
             <a:r>
-              <a:rPr lang="nl-NL" dirty="0" smtClean="0"/>
-              <a:t>a &gt; b:  a </a:t>
+              <a:rPr lang="nl-NL" dirty="0"/>
+              <a:t>w</a:t>
+            </a:r>
+            <a:r>
+              <a:rPr lang="nl-NL" dirty="0" smtClean="0"/>
+              <a:t>(a) </a:t>
+            </a:r>
+            <a:r>
+              <a:rPr lang="nl-NL" dirty="0" smtClean="0"/>
+              <a:t>&gt; </a:t>
+            </a:r>
+            <a:r>
+              <a:rPr lang="nl-NL" dirty="0" smtClean="0"/>
+              <a:t>w(b):  w(a) </a:t>
             </a:r>
             <a:r>
               <a:rPr lang="nl-BE" dirty="0" smtClean="0"/>
               <a:t>↔ </a:t>
             </a:r>
             <a:r>
-              <a:rPr lang="nl-NL" dirty="0" smtClean="0"/>
-              <a:t>b</a:t>
-            </a:r>
+              <a:rPr lang="nl-BE" dirty="0" smtClean="0"/>
+              <a:t>w(</a:t>
+            </a:r>
+            <a:r>
+              <a:rPr lang="nl-NL" dirty="0" smtClean="0"/>
+              <a:t>b)</a:t>
+            </a:r>
+            <a:endParaRPr lang="nl-NL" dirty="0" smtClean="0"/>
           </a:p>
         </p:txBody>
       </p:sp>
@@ -13003,13 +15004,13 @@
   <p:clrMapOvr>
     <a:masterClrMapping/>
   </p:clrMapOvr>
-  <mc:AlternateContent xmlns:mc="http://schemas.openxmlformats.org/markup-compatibility/2006">
-    <mc:Choice xmlns:p14="http://schemas.microsoft.com/office/powerpoint/2010/main" Requires="p14">
+  <mc:AlternateContent xmlns:mc="http://schemas.openxmlformats.org/markup-compatibility/2006" xmlns:p14="http://schemas.microsoft.com/office/powerpoint/2010/main">
+    <mc:Choice Requires="p14">
       <p:transition spd="med" p14:dur="700">
         <p:fade/>
       </p:transition>
     </mc:Choice>
-    <mc:Fallback>
+    <mc:Fallback xmlns="">
       <p:transition xmlns:p14="http://schemas.microsoft.com/office/powerpoint/2010/main" spd="med">
         <p:fade/>
       </p:transition>

</xml_diff>